<commit_message>
revenged bash scripts for hue
</commit_message>
<xml_diff>
--- a/phase3_pres.pptx
+++ b/phase3_pres.pptx
@@ -110,7 +110,16 @@
       </a:defRPr>
     </a:lvl9pPr>
   </p:defaultTextStyle>
+  <p:extLst>
+    <p:ext uri="{EFAFB233-063F-42B5-8137-9DF3F51BA10A}">
+      <p15:sldGuideLst xmlns:p15="http://schemas.microsoft.com/office/powerpoint/2012/main"/>
+    </p:ext>
+  </p:extLst>
 </p:presentation>
+</file>
+
+<file path=ppt/revisionInfo.xml><?xml version="1.0" encoding="utf-8"?>
+<p1510:revInfo xmlns:a="http://schemas.openxmlformats.org/drawingml/2006/main" xmlns:r="http://schemas.openxmlformats.org/officeDocument/2006/relationships" xmlns:p1510="http://schemas.microsoft.com/office/powerpoint/2015/10/main"/>
 </file>
 
 <file path=ppt/slideLayouts/slideLayout1.xml><?xml version="1.0" encoding="utf-8"?>
@@ -3549,8 +3558,8 @@
         </p:blipFill>
         <p:spPr>
           <a:xfrm>
-            <a:off x="0" y="0"/>
-            <a:ext cx="4876707" cy="2743148"/>
+            <a:off x="3456972" y="0"/>
+            <a:ext cx="5278056" cy="2968907"/>
           </a:xfrm>
           <a:prstGeom prst="rect">
             <a:avLst/>
@@ -5031,8 +5040,8 @@
           </a:p>
         </p:txBody>
       </p:sp>
-      <mc:AlternateContent xmlns:mc="http://schemas.openxmlformats.org/markup-compatibility/2006">
-        <mc:Choice xmlns:a14="http://schemas.microsoft.com/office/drawing/2010/main" Requires="a14">
+      <mc:AlternateContent xmlns:mc="http://schemas.openxmlformats.org/markup-compatibility/2006" xmlns:a14="http://schemas.microsoft.com/office/drawing/2010/main">
+        <mc:Choice Requires="a14">
           <p:sp>
             <p:nvSpPr>
               <p:cNvPr id="3" name="Content Placeholder 2">
@@ -5156,7 +5165,7 @@
             </p:txBody>
           </p:sp>
         </mc:Choice>
-        <mc:Fallback>
+        <mc:Fallback xmlns="">
           <p:sp>
             <p:nvSpPr>
               <p:cNvPr id="3" name="Content Placeholder 2">
@@ -5368,6 +5377,13 @@
                   <a:t>capt.pcap</a:t>
                 </a:r>
                 <a:endParaRPr lang="en-GB" dirty="0"/>
+              </a:p>
+              <a:p>
+                <a:pPr lvl="1"/>
+                <a:r>
+                  <a:rPr lang="en-GB" dirty="0"/>
+                  <a:t>REVERSE ENGINEERING</a:t>
+                </a:r>
               </a:p>
               <a:p>
                 <a:pPr lvl="1"/>

</xml_diff>

<commit_message>
finalized phase 3 pres as pdf
</commit_message>
<xml_diff>
--- a/phase3_pres.pptx
+++ b/phase3_pres.pptx
@@ -7,11 +7,13 @@
   <p:sldIdLst>
     <p:sldId id="258" r:id="rId2"/>
     <p:sldId id="261" r:id="rId3"/>
-    <p:sldId id="256" r:id="rId4"/>
-    <p:sldId id="259" r:id="rId5"/>
-    <p:sldId id="260" r:id="rId6"/>
-    <p:sldId id="257" r:id="rId7"/>
-    <p:sldId id="262" r:id="rId8"/>
+    <p:sldId id="264" r:id="rId4"/>
+    <p:sldId id="256" r:id="rId5"/>
+    <p:sldId id="259" r:id="rId6"/>
+    <p:sldId id="260" r:id="rId7"/>
+    <p:sldId id="257" r:id="rId8"/>
+    <p:sldId id="263" r:id="rId9"/>
+    <p:sldId id="262" r:id="rId10"/>
   </p:sldIdLst>
   <p:sldSz cx="12192000" cy="6858000"/>
   <p:notesSz cx="6858000" cy="9144000"/>
@@ -3388,10 +3390,10 @@
               <a:t>Phase 3: SSL-Stripping und </a:t>
             </a:r>
             <a:r>
-              <a:rPr lang="en-GB" dirty="0" err="1"/>
+              <a:rPr lang="en-GB" b="1" dirty="0" err="1"/>
               <a:t>Verwandtes</a:t>
             </a:r>
-            <a:endParaRPr lang="en-GB" dirty="0"/>
+            <a:endParaRPr lang="en-GB" b="1" dirty="0"/>
           </a:p>
         </p:txBody>
       </p:sp>
@@ -3647,11 +3649,24 @@
           <a:lstStyle/>
           <a:p>
             <a:r>
+              <a:rPr lang="en-GB" dirty="0" err="1"/>
+              <a:t>Wiederholung</a:t>
+            </a:r>
+            <a:endParaRPr lang="en-GB" dirty="0"/>
+          </a:p>
+          <a:p>
+            <a:endParaRPr lang="en-GB" dirty="0"/>
+          </a:p>
+          <a:p>
+            <a:r>
               <a:rPr lang="en-GB" dirty="0"/>
               <a:t>Setup</a:t>
             </a:r>
           </a:p>
           <a:p>
+            <a:endParaRPr lang="en-GB" dirty="0"/>
+          </a:p>
+          <a:p>
             <a:r>
               <a:rPr lang="en-GB" dirty="0"/>
               <a:t>Philips Hue</a:t>
@@ -3668,8 +3683,11 @@
             <a:pPr lvl="1"/>
             <a:r>
               <a:rPr lang="en-GB" dirty="0"/>
-              <a:t>Playback (ON-OFF)</a:t>
-            </a:r>
+              <a:t>Playback</a:t>
+            </a:r>
+          </a:p>
+          <a:p>
+            <a:endParaRPr lang="en-GB" dirty="0"/>
           </a:p>
           <a:p>
             <a:r>
@@ -3700,6 +3718,114 @@
 </file>
 
 <file path=ppt/slides/slide3.xml><?xml version="1.0" encoding="utf-8"?>
+<p:sld xmlns:a="http://schemas.openxmlformats.org/drawingml/2006/main" xmlns:r="http://schemas.openxmlformats.org/officeDocument/2006/relationships" xmlns:p="http://schemas.openxmlformats.org/presentationml/2006/main">
+  <p:cSld>
+    <p:spTree>
+      <p:nvGrpSpPr>
+        <p:cNvPr id="1" name=""/>
+        <p:cNvGrpSpPr/>
+        <p:nvPr/>
+      </p:nvGrpSpPr>
+      <p:grpSpPr>
+        <a:xfrm>
+          <a:off x="0" y="0"/>
+          <a:ext cx="0" cy="0"/>
+          <a:chOff x="0" y="0"/>
+          <a:chExt cx="0" cy="0"/>
+        </a:xfrm>
+      </p:grpSpPr>
+      <p:sp>
+        <p:nvSpPr>
+          <p:cNvPr id="2" name="Title 1">
+            <a:extLst>
+              <a:ext uri="{FF2B5EF4-FFF2-40B4-BE49-F238E27FC236}">
+                <a16:creationId xmlns:a16="http://schemas.microsoft.com/office/drawing/2014/main" id="{49D74F2B-D665-4BEB-BD5A-0E4E6B25B63E}"/>
+              </a:ext>
+            </a:extLst>
+          </p:cNvPr>
+          <p:cNvSpPr>
+            <a:spLocks noGrp="1"/>
+          </p:cNvSpPr>
+          <p:nvPr>
+            <p:ph type="title"/>
+          </p:nvPr>
+        </p:nvSpPr>
+        <p:spPr/>
+        <p:txBody>
+          <a:bodyPr/>
+          <a:lstStyle/>
+          <a:p>
+            <a:r>
+              <a:rPr lang="en-GB" dirty="0" err="1"/>
+              <a:t>Wiederholung</a:t>
+            </a:r>
+            <a:endParaRPr lang="en-GB" dirty="0"/>
+          </a:p>
+        </p:txBody>
+      </p:sp>
+      <p:pic>
+        <p:nvPicPr>
+          <p:cNvPr id="1026" name="Picture 2" descr="http://i.imgur.com/FG0LEHk.png">
+            <a:extLst>
+              <a:ext uri="{FF2B5EF4-FFF2-40B4-BE49-F238E27FC236}">
+                <a16:creationId xmlns:a16="http://schemas.microsoft.com/office/drawing/2014/main" id="{22125CB5-4CD6-4716-87F0-E86A8B0E5D61}"/>
+              </a:ext>
+            </a:extLst>
+          </p:cNvPr>
+          <p:cNvPicPr>
+            <a:picLocks noGrp="1" noChangeAspect="1" noChangeArrowheads="1"/>
+          </p:cNvPicPr>
+          <p:nvPr>
+            <p:ph idx="1"/>
+          </p:nvPr>
+        </p:nvPicPr>
+        <p:blipFill>
+          <a:blip r:embed="rId2">
+            <a:extLst>
+              <a:ext uri="{28A0092B-C50C-407E-A947-70E740481C1C}">
+                <a14:useLocalDpi xmlns:a14="http://schemas.microsoft.com/office/drawing/2010/main" val="0"/>
+              </a:ext>
+            </a:extLst>
+          </a:blip>
+          <a:srcRect/>
+          <a:stretch>
+            <a:fillRect/>
+          </a:stretch>
+        </p:blipFill>
+        <p:spPr bwMode="auto">
+          <a:xfrm>
+            <a:off x="2528389" y="1843580"/>
+            <a:ext cx="7135221" cy="4315427"/>
+          </a:xfrm>
+          <a:prstGeom prst="rect">
+            <a:avLst/>
+          </a:prstGeom>
+          <a:noFill/>
+          <a:extLst>
+            <a:ext uri="{909E8E84-426E-40DD-AFC4-6F175D3DCCD1}">
+              <a14:hiddenFill xmlns:a14="http://schemas.microsoft.com/office/drawing/2010/main">
+                <a:solidFill>
+                  <a:srgbClr val="FFFFFF"/>
+                </a:solidFill>
+              </a14:hiddenFill>
+            </a:ext>
+          </a:extLst>
+        </p:spPr>
+      </p:pic>
+    </p:spTree>
+    <p:extLst>
+      <p:ext uri="{BB962C8B-B14F-4D97-AF65-F5344CB8AC3E}">
+        <p14:creationId xmlns:p14="http://schemas.microsoft.com/office/powerpoint/2010/main" val="3994764518"/>
+      </p:ext>
+    </p:extLst>
+  </p:cSld>
+  <p:clrMapOvr>
+    <a:masterClrMapping/>
+  </p:clrMapOvr>
+</p:sld>
+</file>
+
+<file path=ppt/slides/slide4.xml><?xml version="1.0" encoding="utf-8"?>
 <p:sld xmlns:a="http://schemas.openxmlformats.org/drawingml/2006/main" xmlns:r="http://schemas.openxmlformats.org/officeDocument/2006/relationships" xmlns:p="http://schemas.openxmlformats.org/presentationml/2006/main">
   <p:cSld>
     <p:spTree>
@@ -4995,7 +5121,7 @@
 </p:sld>
 </file>
 
-<file path=ppt/slides/slide4.xml><?xml version="1.0" encoding="utf-8"?>
+<file path=ppt/slides/slide5.xml><?xml version="1.0" encoding="utf-8"?>
 <p:sld xmlns:a="http://schemas.openxmlformats.org/drawingml/2006/main" xmlns:r="http://schemas.openxmlformats.org/officeDocument/2006/relationships" xmlns:p="http://schemas.openxmlformats.org/presentationml/2006/main">
   <p:cSld>
     <p:spTree>
@@ -5222,7 +5348,7 @@
 </p:sld>
 </file>
 
-<file path=ppt/slides/slide5.xml><?xml version="1.0" encoding="utf-8"?>
+<file path=ppt/slides/slide6.xml><?xml version="1.0" encoding="utf-8"?>
 <p:sld xmlns:a="http://schemas.openxmlformats.org/drawingml/2006/main" xmlns:r="http://schemas.openxmlformats.org/officeDocument/2006/relationships" xmlns:p="http://schemas.openxmlformats.org/presentationml/2006/main">
   <p:cSld>
     <p:spTree>
@@ -5337,6 +5463,9 @@
                 <a:endParaRPr lang="en-GB" b="0" dirty="0"/>
               </a:p>
               <a:p>
+                <a:endParaRPr lang="en-GB" dirty="0"/>
+              </a:p>
+              <a:p>
                 <a:r>
                   <a:rPr lang="en-GB" dirty="0"/>
                   <a:t>TCP-Replay 	</a:t>
@@ -5422,18 +5551,8 @@
                 </a:r>
                 <a:r>
                   <a:rPr lang="en-GB" dirty="0"/>
-                  <a:t>   		 </a:t>
-                </a:r>
-                <a:r>
-                  <a:rPr lang="en-GB" sz="2300" dirty="0">
-                    <a:latin typeface="Courier New" panose="02070309020205020404" pitchFamily="49" charset="0"/>
-                    <a:cs typeface="Courier New" panose="02070309020205020404" pitchFamily="49" charset="0"/>
-                  </a:rPr>
-                  <a:t>http</a:t>
-                </a:r>
-              </a:p>
-              <a:p>
-                <a:endParaRPr lang="en-GB" dirty="0"/>
+                  <a:t> </a:t>
+                </a:r>
               </a:p>
               <a:p>
                 <a:endParaRPr lang="en-GB" dirty="0"/>
@@ -5513,7 +5632,7 @@
 </p:sld>
 </file>
 
-<file path=ppt/slides/slide6.xml><?xml version="1.0" encoding="utf-8"?>
+<file path=ppt/slides/slide7.xml><?xml version="1.0" encoding="utf-8"?>
 <p:sld xmlns:a="http://schemas.openxmlformats.org/drawingml/2006/main" xmlns:r="http://schemas.openxmlformats.org/officeDocument/2006/relationships" xmlns:p="http://schemas.openxmlformats.org/presentationml/2006/main">
   <p:cSld>
     <p:spTree>
@@ -5679,7 +5798,7 @@
             </a:r>
             <a:r>
               <a:rPr lang="en-GB" sz="2800" dirty="0" err="1"/>
-              <a:t>mit</a:t>
+              <a:t>durch</a:t>
             </a:r>
             <a:r>
               <a:rPr lang="en-GB" sz="2800" dirty="0"/>
@@ -6559,7 +6678,7 @@
 </p:sld>
 </file>
 
-<file path=ppt/slides/slide7.xml><?xml version="1.0" encoding="utf-8"?>
+<file path=ppt/slides/slide8.xml><?xml version="1.0" encoding="utf-8"?>
 <p:sld xmlns:a="http://schemas.openxmlformats.org/drawingml/2006/main" xmlns:r="http://schemas.openxmlformats.org/officeDocument/2006/relationships" xmlns:p="http://schemas.openxmlformats.org/presentationml/2006/main">
   <p:cSld>
     <p:spTree>
@@ -6581,7 +6700,7 @@
           <p:cNvPr id="2" name="Title 1">
             <a:extLst>
               <a:ext uri="{FF2B5EF4-FFF2-40B4-BE49-F238E27FC236}">
-                <a16:creationId xmlns:a16="http://schemas.microsoft.com/office/drawing/2014/main" id="{CFEF712D-B737-42AB-B983-28B0BCC44D75}"/>
+                <a16:creationId xmlns:a16="http://schemas.microsoft.com/office/drawing/2014/main" id="{4FFE9E36-142B-4BDB-B7D8-E8BD30C626EF}"/>
               </a:ext>
             </a:extLst>
           </p:cNvPr>
@@ -6598,10 +6717,9 @@
           <a:lstStyle/>
           <a:p>
             <a:r>
-              <a:rPr lang="en-GB" dirty="0" err="1"/>
-              <a:t>Schlussfolgerungen</a:t>
-            </a:r>
-            <a:endParaRPr lang="en-GB" dirty="0"/>
+              <a:rPr lang="en-GB" dirty="0"/>
+              <a:t>LED-Matrix</a:t>
+            </a:r>
           </a:p>
         </p:txBody>
       </p:sp>
@@ -6610,7 +6728,7 @@
           <p:cNvPr id="3" name="Content Placeholder 2">
             <a:extLst>
               <a:ext uri="{FF2B5EF4-FFF2-40B4-BE49-F238E27FC236}">
-                <a16:creationId xmlns:a16="http://schemas.microsoft.com/office/drawing/2014/main" id="{A19F2C76-DA68-4365-B768-8EB2C1AE0883}"/>
+                <a16:creationId xmlns:a16="http://schemas.microsoft.com/office/drawing/2014/main" id="{785FB957-94DA-4751-8DA3-4A9737E2E23F}"/>
               </a:ext>
             </a:extLst>
           </p:cNvPr>
@@ -6627,12 +6745,27 @@
           <a:lstStyle/>
           <a:p>
             <a:r>
+              <a:rPr lang="en-GB" dirty="0" err="1"/>
+              <a:t>Blockieren</a:t>
+            </a:r>
+            <a:r>
               <a:rPr lang="en-GB" dirty="0"/>
-              <a:t>Philips Hue: </a:t>
+              <a:t> Port 443, </a:t>
             </a:r>
             <a:r>
               <a:rPr lang="en-GB" dirty="0" err="1"/>
-              <a:t>im</a:t>
+              <a:t>Ausweichen</a:t>
+            </a:r>
+            <a:r>
+              <a:rPr lang="en-GB" dirty="0"/>
+              <a:t> auf Port 80</a:t>
+            </a:r>
+          </a:p>
+          <a:p>
+            <a:pPr lvl="1"/>
+            <a:r>
+              <a:rPr lang="en-GB" dirty="0" err="1"/>
+              <a:t>Keine</a:t>
             </a:r>
             <a:r>
               <a:rPr lang="en-GB" dirty="0"/>
@@ -6640,36 +6773,390 @@
             </a:r>
             <a:r>
               <a:rPr lang="en-GB" dirty="0" err="1"/>
-              <a:t>selbem</a:t>
-            </a:r>
+              <a:t>Verbindung</a:t>
+            </a:r>
+            <a:endParaRPr lang="en-GB" dirty="0"/>
+          </a:p>
+          <a:p>
             <a:r>
               <a:rPr lang="en-GB" dirty="0"/>
-              <a:t> </a:t>
-            </a:r>
+              <a:t>ARP-Spoof &amp; SSL-Strip</a:t>
+            </a:r>
+          </a:p>
+          <a:p>
+            <a:pPr lvl="1"/>
             <a:r>
               <a:rPr lang="en-GB" dirty="0" err="1"/>
-              <a:t>Netzwerk</a:t>
-            </a:r>
+              <a:t>nutzlos</a:t>
+            </a:r>
+            <a:endParaRPr lang="en-GB" dirty="0"/>
+          </a:p>
+          <a:p>
             <a:r>
               <a:rPr lang="en-GB" dirty="0"/>
-              <a:t> </a:t>
+              <a:t>SSL-Sniff</a:t>
+            </a:r>
+          </a:p>
+          <a:p>
+            <a:pPr lvl="1"/>
+            <a:r>
+              <a:rPr lang="en-GB" dirty="0"/>
+              <a:t>Auch </a:t>
             </a:r>
             <a:r>
               <a:rPr lang="en-GB" dirty="0" err="1"/>
-              <a:t>ist</a:t>
-            </a:r>
-            <a:r>
-              <a:rPr lang="en-GB" dirty="0"/>
-              <a:t> SSL-Stripping </a:t>
-            </a:r>
+              <a:t>nicht</a:t>
+            </a:r>
+            <a:endParaRPr lang="en-GB" dirty="0"/>
+          </a:p>
+          <a:p>
+            <a:pPr lvl="1"/>
+            <a:endParaRPr lang="en-GB" dirty="0"/>
+          </a:p>
+          <a:p>
+            <a:endParaRPr lang="en-GB" dirty="0"/>
+          </a:p>
+        </p:txBody>
+      </p:sp>
+    </p:spTree>
+    <p:extLst>
+      <p:ext uri="{BB962C8B-B14F-4D97-AF65-F5344CB8AC3E}">
+        <p14:creationId xmlns:p14="http://schemas.microsoft.com/office/powerpoint/2010/main" val="279793990"/>
+      </p:ext>
+    </p:extLst>
+  </p:cSld>
+  <p:clrMapOvr>
+    <a:masterClrMapping/>
+  </p:clrMapOvr>
+</p:sld>
+</file>
+
+<file path=ppt/slides/slide9.xml><?xml version="1.0" encoding="utf-8"?>
+<p:sld xmlns:a="http://schemas.openxmlformats.org/drawingml/2006/main" xmlns:r="http://schemas.openxmlformats.org/officeDocument/2006/relationships" xmlns:p="http://schemas.openxmlformats.org/presentationml/2006/main">
+  <p:cSld>
+    <p:spTree>
+      <p:nvGrpSpPr>
+        <p:cNvPr id="1" name=""/>
+        <p:cNvGrpSpPr/>
+        <p:nvPr/>
+      </p:nvGrpSpPr>
+      <p:grpSpPr>
+        <a:xfrm>
+          <a:off x="0" y="0"/>
+          <a:ext cx="0" cy="0"/>
+          <a:chOff x="0" y="0"/>
+          <a:chExt cx="0" cy="0"/>
+        </a:xfrm>
+      </p:grpSpPr>
+      <p:sp>
+        <p:nvSpPr>
+          <p:cNvPr id="2" name="Title 1">
+            <a:extLst>
+              <a:ext uri="{FF2B5EF4-FFF2-40B4-BE49-F238E27FC236}">
+                <a16:creationId xmlns:a16="http://schemas.microsoft.com/office/drawing/2014/main" id="{CFEF712D-B737-42AB-B983-28B0BCC44D75}"/>
+              </a:ext>
+            </a:extLst>
+          </p:cNvPr>
+          <p:cNvSpPr>
+            <a:spLocks noGrp="1"/>
+          </p:cNvSpPr>
+          <p:nvPr>
+            <p:ph type="title"/>
+          </p:nvPr>
+        </p:nvSpPr>
+        <p:spPr/>
+        <p:txBody>
+          <a:bodyPr/>
+          <a:lstStyle/>
+          <a:p>
             <a:r>
               <a:rPr lang="en-GB" dirty="0" err="1"/>
-              <a:t>unnötigt</a:t>
+              <a:t>Schlussfolgerungen</a:t>
             </a:r>
             <a:endParaRPr lang="en-GB" dirty="0"/>
           </a:p>
         </p:txBody>
       </p:sp>
+      <mc:AlternateContent xmlns:mc="http://schemas.openxmlformats.org/markup-compatibility/2006">
+        <mc:Choice xmlns:a14="http://schemas.microsoft.com/office/drawing/2010/main" Requires="a14">
+          <p:sp>
+            <p:nvSpPr>
+              <p:cNvPr id="3" name="Content Placeholder 2">
+                <a:extLst>
+                  <a:ext uri="{FF2B5EF4-FFF2-40B4-BE49-F238E27FC236}">
+                    <a16:creationId xmlns:a16="http://schemas.microsoft.com/office/drawing/2014/main" id="{A19F2C76-DA68-4365-B768-8EB2C1AE0883}"/>
+                  </a:ext>
+                </a:extLst>
+              </p:cNvPr>
+              <p:cNvSpPr>
+                <a:spLocks noGrp="1"/>
+              </p:cNvSpPr>
+              <p:nvPr>
+                <p:ph idx="1"/>
+              </p:nvPr>
+            </p:nvSpPr>
+            <p:spPr/>
+            <p:txBody>
+              <a:bodyPr/>
+              <a:lstStyle/>
+              <a:p>
+                <a:pPr marL="0" indent="0">
+                  <a:buNone/>
+                </a:pPr>
+                <a:r>
+                  <a:rPr lang="en-GB" b="1" dirty="0">
+                    <a:solidFill>
+                      <a:srgbClr val="FF0000"/>
+                    </a:solidFill>
+                    <a:ea typeface="Cambria Math" panose="02040503050406030204" pitchFamily="18" charset="0"/>
+                  </a:rPr>
+                  <a:t> </a:t>
+                </a:r>
+                <a14:m>
+                  <m:oMath xmlns:m="http://schemas.openxmlformats.org/officeDocument/2006/math">
+                    <m:r>
+                      <a:rPr lang="en-GB" b="1" i="1">
+                        <a:solidFill>
+                          <a:srgbClr val="FF0000"/>
+                        </a:solidFill>
+                        <a:latin typeface="Cambria Math" panose="02040503050406030204" pitchFamily="18" charset="0"/>
+                        <a:ea typeface="Cambria Math" panose="02040503050406030204" pitchFamily="18" charset="0"/>
+                      </a:rPr>
+                      <m:t>×</m:t>
+                    </m:r>
+                  </m:oMath>
+                </a14:m>
+                <a:r>
+                  <a:rPr lang="en-GB" dirty="0"/>
+                  <a:t> Philips Hue 						</a:t>
+                </a:r>
+              </a:p>
+              <a:p>
+                <a:pPr lvl="1"/>
+                <a:r>
+                  <a:rPr lang="en-GB" dirty="0"/>
+                  <a:t>SSL Strip das </a:t>
+                </a:r>
+                <a:r>
+                  <a:rPr lang="en-GB" dirty="0" err="1"/>
+                  <a:t>falsche</a:t>
+                </a:r>
+                <a:r>
+                  <a:rPr lang="en-GB" dirty="0"/>
+                  <a:t> Tool</a:t>
+                </a:r>
+              </a:p>
+              <a:p>
+                <a:pPr lvl="1"/>
+                <a:r>
+                  <a:rPr lang="en-GB" dirty="0" err="1"/>
+                  <a:t>Kommunikation</a:t>
+                </a:r>
+                <a:r>
+                  <a:rPr lang="en-GB" dirty="0"/>
+                  <a:t> </a:t>
+                </a:r>
+                <a:r>
+                  <a:rPr lang="en-GB" dirty="0" err="1"/>
+                  <a:t>mit</a:t>
+                </a:r>
+                <a:r>
+                  <a:rPr lang="en-GB" dirty="0"/>
+                  <a:t> den </a:t>
+                </a:r>
+                <a:r>
+                  <a:rPr lang="en-GB" dirty="0" err="1"/>
+                  <a:t>Servern</a:t>
+                </a:r>
+                <a:r>
+                  <a:rPr lang="en-GB" dirty="0"/>
+                  <a:t> </a:t>
+                </a:r>
+                <a:r>
+                  <a:rPr lang="en-GB" dirty="0" err="1"/>
+                  <a:t>ist</a:t>
+                </a:r>
+                <a:r>
+                  <a:rPr lang="en-GB" dirty="0"/>
+                  <a:t> </a:t>
+                </a:r>
+                <a:r>
+                  <a:rPr lang="en-GB" dirty="0" err="1"/>
+                  <a:t>verscchlüsselt</a:t>
+                </a:r>
+                <a:endParaRPr lang="en-GB" dirty="0"/>
+              </a:p>
+              <a:p>
+                <a:pPr marL="457200" lvl="1" indent="0">
+                  <a:buNone/>
+                </a:pPr>
+                <a:r>
+                  <a:rPr lang="en-GB" dirty="0"/>
+                  <a:t>	ABER</a:t>
+                </a:r>
+              </a:p>
+              <a:p>
+                <a:pPr lvl="1"/>
+                <a:r>
+                  <a:rPr lang="en-GB" dirty="0" err="1"/>
+                  <a:t>Im</a:t>
+                </a:r>
+                <a:r>
+                  <a:rPr lang="en-GB" dirty="0"/>
+                  <a:t> </a:t>
+                </a:r>
+                <a:r>
+                  <a:rPr lang="en-GB" dirty="0" err="1"/>
+                  <a:t>Netzwerk</a:t>
+                </a:r>
+                <a:r>
+                  <a:rPr lang="en-GB" dirty="0"/>
+                  <a:t> </a:t>
+                </a:r>
+                <a:r>
+                  <a:rPr lang="en-GB" dirty="0" err="1"/>
+                  <a:t>kann</a:t>
+                </a:r>
+                <a:r>
+                  <a:rPr lang="en-GB" dirty="0"/>
+                  <a:t> man </a:t>
+                </a:r>
+                <a:r>
+                  <a:rPr lang="en-GB" sz="2300" dirty="0">
+                    <a:cs typeface="Courier New" panose="02070309020205020404" pitchFamily="49" charset="0"/>
+                  </a:rPr>
+                  <a:t>HTTP</a:t>
+                </a:r>
+                <a:r>
+                  <a:rPr lang="en-GB" dirty="0"/>
+                  <a:t> </a:t>
+                </a:r>
+                <a:r>
+                  <a:rPr lang="en-GB" dirty="0" err="1"/>
+                  <a:t>Pakete</a:t>
+                </a:r>
+                <a:r>
+                  <a:rPr lang="en-GB" dirty="0"/>
+                  <a:t> </a:t>
+                </a:r>
+                <a:r>
+                  <a:rPr lang="en-GB" dirty="0" err="1"/>
+                  <a:t>verschicken</a:t>
+                </a:r>
+                <a:endParaRPr lang="en-GB" dirty="0"/>
+              </a:p>
+              <a:p>
+                <a:endParaRPr lang="en-GB" dirty="0"/>
+              </a:p>
+              <a:p>
+                <a:pPr marL="0" indent="0">
+                  <a:buNone/>
+                </a:pPr>
+                <a:r>
+                  <a:rPr lang="en-GB" dirty="0">
+                    <a:solidFill>
+                      <a:schemeClr val="accent6"/>
+                    </a:solidFill>
+                  </a:rPr>
+                  <a:t> ✔ </a:t>
+                </a:r>
+                <a:r>
+                  <a:rPr lang="en-GB" dirty="0"/>
+                  <a:t>LED-Matrix</a:t>
+                </a:r>
+                <a:endParaRPr lang="en-GB" dirty="0">
+                  <a:solidFill>
+                    <a:schemeClr val="accent6"/>
+                  </a:solidFill>
+                </a:endParaRPr>
+              </a:p>
+              <a:p>
+                <a:pPr lvl="1"/>
+                <a:r>
+                  <a:rPr lang="en-GB" dirty="0" err="1"/>
+                  <a:t>Nicht</a:t>
+                </a:r>
+                <a:r>
+                  <a:rPr lang="en-GB" dirty="0"/>
+                  <a:t> </a:t>
+                </a:r>
+                <a:r>
+                  <a:rPr lang="en-GB" dirty="0" err="1"/>
+                  <a:t>manipulierbar</a:t>
+                </a:r>
+                <a:r>
+                  <a:rPr lang="en-GB" dirty="0"/>
+                  <a:t> (</a:t>
+                </a:r>
+                <a:r>
+                  <a:rPr lang="en-GB" dirty="0" err="1"/>
+                  <a:t>mit</a:t>
+                </a:r>
+                <a:r>
+                  <a:rPr lang="en-GB" dirty="0"/>
+                  <a:t> </a:t>
+                </a:r>
+                <a:r>
+                  <a:rPr lang="en-GB" dirty="0" err="1"/>
+                  <a:t>versuchten</a:t>
+                </a:r>
+                <a:r>
+                  <a:rPr lang="en-GB" dirty="0"/>
+                  <a:t> </a:t>
+                </a:r>
+                <a:r>
+                  <a:rPr lang="en-GB" dirty="0" err="1"/>
+                  <a:t>Mitteln</a:t>
+                </a:r>
+                <a:r>
+                  <a:rPr lang="en-GB"/>
+                  <a:t>)</a:t>
+                </a:r>
+                <a:endParaRPr lang="en-GB" dirty="0"/>
+              </a:p>
+            </p:txBody>
+          </p:sp>
+        </mc:Choice>
+        <mc:Fallback>
+          <p:sp>
+            <p:nvSpPr>
+              <p:cNvPr id="3" name="Content Placeholder 2">
+                <a:extLst>
+                  <a:ext uri="{FF2B5EF4-FFF2-40B4-BE49-F238E27FC236}">
+                    <a16:creationId xmlns:a16="http://schemas.microsoft.com/office/drawing/2014/main" id="{A19F2C76-DA68-4365-B768-8EB2C1AE0883}"/>
+                  </a:ext>
+                </a:extLst>
+              </p:cNvPr>
+              <p:cNvSpPr>
+                <a:spLocks noGrp="1" noRot="1" noChangeAspect="1" noMove="1" noResize="1" noEditPoints="1" noAdjustHandles="1" noChangeArrowheads="1" noChangeShapeType="1" noTextEdit="1"/>
+              </p:cNvSpPr>
+              <p:nvPr>
+                <p:ph idx="1"/>
+              </p:nvPr>
+            </p:nvSpPr>
+            <p:spPr>
+              <a:blipFill>
+                <a:blip r:embed="rId2"/>
+                <a:stretch>
+                  <a:fillRect l="-464" t="-2241"/>
+                </a:stretch>
+              </a:blipFill>
+            </p:spPr>
+            <p:txBody>
+              <a:bodyPr/>
+              <a:lstStyle/>
+              <a:p>
+                <a:r>
+                  <a:rPr lang="en-GB">
+                    <a:noFill/>
+                  </a:rPr>
+                  <a:t> </a:t>
+                </a:r>
+              </a:p>
+            </p:txBody>
+          </p:sp>
+        </mc:Fallback>
+      </mc:AlternateContent>
     </p:spTree>
     <p:extLst>
       <p:ext uri="{BB962C8B-B14F-4D97-AF65-F5344CB8AC3E}">

</xml_diff>

<commit_message>
changes to phase 3 pres and added pdf
</commit_message>
<xml_diff>
--- a/phase3_pres.pptx
+++ b/phase3_pres.pptx
@@ -1,9 +1,12 @@
 
 <file path=ppt/presentation.xml><?xml version="1.0" encoding="utf-8"?>
-<p:presentation xmlns:a="http://schemas.openxmlformats.org/drawingml/2006/main" xmlns:r="http://schemas.openxmlformats.org/officeDocument/2006/relationships" xmlns:p="http://schemas.openxmlformats.org/presentationml/2006/main" saveSubsetFonts="1">
+<p:presentation xmlns:a="http://schemas.openxmlformats.org/drawingml/2006/main" xmlns:r="http://schemas.openxmlformats.org/officeDocument/2006/relationships" xmlns:p="http://schemas.openxmlformats.org/presentationml/2006/main" showSpecialPlsOnTitleSld="0" saveSubsetFonts="1">
   <p:sldMasterIdLst>
     <p:sldMasterId id="2147483648" r:id="rId1"/>
   </p:sldMasterIdLst>
+  <p:notesMasterIdLst>
+    <p:notesMasterId r:id="rId12"/>
+  </p:notesMasterIdLst>
   <p:sldIdLst>
     <p:sldId id="258" r:id="rId2"/>
     <p:sldId id="261" r:id="rId3"/>
@@ -13,7 +16,8 @@
     <p:sldId id="260" r:id="rId7"/>
     <p:sldId id="257" r:id="rId8"/>
     <p:sldId id="263" r:id="rId9"/>
-    <p:sldId id="262" r:id="rId10"/>
+    <p:sldId id="265" r:id="rId10"/>
+    <p:sldId id="262" r:id="rId11"/>
   </p:sldIdLst>
   <p:sldSz cx="12192000" cy="6858000"/>
   <p:notesSz cx="6858000" cy="9144000"/>
@@ -124,6 +128,356 @@
 <p1510:revInfo xmlns:a="http://schemas.openxmlformats.org/drawingml/2006/main" xmlns:r="http://schemas.openxmlformats.org/officeDocument/2006/relationships" xmlns:p1510="http://schemas.microsoft.com/office/powerpoint/2015/10/main"/>
 </file>
 
+<file path=ppt/notesMasters/notesMaster1.xml><?xml version="1.0" encoding="utf-8"?>
+<p:notesMaster xmlns:a="http://schemas.openxmlformats.org/drawingml/2006/main" xmlns:r="http://schemas.openxmlformats.org/officeDocument/2006/relationships" xmlns:p="http://schemas.openxmlformats.org/presentationml/2006/main">
+  <p:cSld>
+    <p:bg>
+      <p:bgRef idx="1001">
+        <a:schemeClr val="bg1"/>
+      </p:bgRef>
+    </p:bg>
+    <p:spTree>
+      <p:nvGrpSpPr>
+        <p:cNvPr id="1" name=""/>
+        <p:cNvGrpSpPr/>
+        <p:nvPr/>
+      </p:nvGrpSpPr>
+      <p:grpSpPr>
+        <a:xfrm>
+          <a:off x="0" y="0"/>
+          <a:ext cx="0" cy="0"/>
+          <a:chOff x="0" y="0"/>
+          <a:chExt cx="0" cy="0"/>
+        </a:xfrm>
+      </p:grpSpPr>
+      <p:sp>
+        <p:nvSpPr>
+          <p:cNvPr id="2" name="Header Placeholder 1"/>
+          <p:cNvSpPr>
+            <a:spLocks noGrp="1"/>
+          </p:cNvSpPr>
+          <p:nvPr>
+            <p:ph type="hdr" sz="quarter"/>
+          </p:nvPr>
+        </p:nvSpPr>
+        <p:spPr>
+          <a:xfrm>
+            <a:off x="0" y="0"/>
+            <a:ext cx="2971800" cy="458788"/>
+          </a:xfrm>
+          <a:prstGeom prst="rect">
+            <a:avLst/>
+          </a:prstGeom>
+        </p:spPr>
+        <p:txBody>
+          <a:bodyPr vert="horz" lIns="91440" tIns="45720" rIns="91440" bIns="45720" rtlCol="0"/>
+          <a:lstStyle>
+            <a:lvl1pPr algn="l">
+              <a:defRPr sz="1200"/>
+            </a:lvl1pPr>
+          </a:lstStyle>
+          <a:p>
+            <a:endParaRPr lang="en-GB"/>
+          </a:p>
+        </p:txBody>
+      </p:sp>
+      <p:sp>
+        <p:nvSpPr>
+          <p:cNvPr id="3" name="Date Placeholder 2"/>
+          <p:cNvSpPr>
+            <a:spLocks noGrp="1"/>
+          </p:cNvSpPr>
+          <p:nvPr>
+            <p:ph type="dt" idx="1"/>
+          </p:nvPr>
+        </p:nvSpPr>
+        <p:spPr>
+          <a:xfrm>
+            <a:off x="3884613" y="0"/>
+            <a:ext cx="2971800" cy="458788"/>
+          </a:xfrm>
+          <a:prstGeom prst="rect">
+            <a:avLst/>
+          </a:prstGeom>
+        </p:spPr>
+        <p:txBody>
+          <a:bodyPr vert="horz" lIns="91440" tIns="45720" rIns="91440" bIns="45720" rtlCol="0"/>
+          <a:lstStyle>
+            <a:lvl1pPr algn="r">
+              <a:defRPr sz="1200"/>
+            </a:lvl1pPr>
+          </a:lstStyle>
+          <a:p>
+            <a:fld id="{ADE80898-8681-427A-A6E6-37C45CD0B708}" type="datetimeFigureOut">
+              <a:rPr lang="en-GB" smtClean="0"/>
+              <a:t>09/12/2017</a:t>
+            </a:fld>
+            <a:endParaRPr lang="en-GB"/>
+          </a:p>
+        </p:txBody>
+      </p:sp>
+      <p:sp>
+        <p:nvSpPr>
+          <p:cNvPr id="4" name="Slide Image Placeholder 3"/>
+          <p:cNvSpPr>
+            <a:spLocks noGrp="1" noRot="1" noChangeAspect="1"/>
+          </p:cNvSpPr>
+          <p:nvPr>
+            <p:ph type="sldImg" idx="2"/>
+          </p:nvPr>
+        </p:nvSpPr>
+        <p:spPr>
+          <a:xfrm>
+            <a:off x="685800" y="1143000"/>
+            <a:ext cx="5486400" cy="3086100"/>
+          </a:xfrm>
+          <a:prstGeom prst="rect">
+            <a:avLst/>
+          </a:prstGeom>
+          <a:noFill/>
+          <a:ln w="12700">
+            <a:solidFill>
+              <a:prstClr val="black"/>
+            </a:solidFill>
+          </a:ln>
+        </p:spPr>
+        <p:txBody>
+          <a:bodyPr vert="horz" lIns="91440" tIns="45720" rIns="91440" bIns="45720" rtlCol="0" anchor="ctr"/>
+          <a:lstStyle/>
+          <a:p>
+            <a:endParaRPr lang="en-GB"/>
+          </a:p>
+        </p:txBody>
+      </p:sp>
+      <p:sp>
+        <p:nvSpPr>
+          <p:cNvPr id="5" name="Notes Placeholder 4"/>
+          <p:cNvSpPr>
+            <a:spLocks noGrp="1"/>
+          </p:cNvSpPr>
+          <p:nvPr>
+            <p:ph type="body" sz="quarter" idx="3"/>
+          </p:nvPr>
+        </p:nvSpPr>
+        <p:spPr>
+          <a:xfrm>
+            <a:off x="685800" y="4400550"/>
+            <a:ext cx="5486400" cy="3600450"/>
+          </a:xfrm>
+          <a:prstGeom prst="rect">
+            <a:avLst/>
+          </a:prstGeom>
+        </p:spPr>
+        <p:txBody>
+          <a:bodyPr vert="horz" lIns="91440" tIns="45720" rIns="91440" bIns="45720" rtlCol="0"/>
+          <a:lstStyle/>
+          <a:p>
+            <a:pPr lvl="0"/>
+            <a:r>
+              <a:rPr lang="en-US"/>
+              <a:t>Edit Master text styles</a:t>
+            </a:r>
+          </a:p>
+          <a:p>
+            <a:pPr lvl="1"/>
+            <a:r>
+              <a:rPr lang="en-US"/>
+              <a:t>Second level</a:t>
+            </a:r>
+          </a:p>
+          <a:p>
+            <a:pPr lvl="2"/>
+            <a:r>
+              <a:rPr lang="en-US"/>
+              <a:t>Third level</a:t>
+            </a:r>
+          </a:p>
+          <a:p>
+            <a:pPr lvl="3"/>
+            <a:r>
+              <a:rPr lang="en-US"/>
+              <a:t>Fourth level</a:t>
+            </a:r>
+          </a:p>
+          <a:p>
+            <a:pPr lvl="4"/>
+            <a:r>
+              <a:rPr lang="en-US"/>
+              <a:t>Fifth level</a:t>
+            </a:r>
+            <a:endParaRPr lang="en-GB"/>
+          </a:p>
+        </p:txBody>
+      </p:sp>
+      <p:sp>
+        <p:nvSpPr>
+          <p:cNvPr id="6" name="Footer Placeholder 5"/>
+          <p:cNvSpPr>
+            <a:spLocks noGrp="1"/>
+          </p:cNvSpPr>
+          <p:nvPr>
+            <p:ph type="ftr" sz="quarter" idx="4"/>
+          </p:nvPr>
+        </p:nvSpPr>
+        <p:spPr>
+          <a:xfrm>
+            <a:off x="0" y="8685213"/>
+            <a:ext cx="2971800" cy="458787"/>
+          </a:xfrm>
+          <a:prstGeom prst="rect">
+            <a:avLst/>
+          </a:prstGeom>
+        </p:spPr>
+        <p:txBody>
+          <a:bodyPr vert="horz" lIns="91440" tIns="45720" rIns="91440" bIns="45720" rtlCol="0" anchor="b"/>
+          <a:lstStyle>
+            <a:lvl1pPr algn="l">
+              <a:defRPr sz="1200"/>
+            </a:lvl1pPr>
+          </a:lstStyle>
+          <a:p>
+            <a:endParaRPr lang="en-GB"/>
+          </a:p>
+        </p:txBody>
+      </p:sp>
+      <p:sp>
+        <p:nvSpPr>
+          <p:cNvPr id="7" name="Slide Number Placeholder 6"/>
+          <p:cNvSpPr>
+            <a:spLocks noGrp="1"/>
+          </p:cNvSpPr>
+          <p:nvPr>
+            <p:ph type="sldNum" sz="quarter" idx="5"/>
+          </p:nvPr>
+        </p:nvSpPr>
+        <p:spPr>
+          <a:xfrm>
+            <a:off x="3884613" y="8685213"/>
+            <a:ext cx="2971800" cy="458787"/>
+          </a:xfrm>
+          <a:prstGeom prst="rect">
+            <a:avLst/>
+          </a:prstGeom>
+        </p:spPr>
+        <p:txBody>
+          <a:bodyPr vert="horz" lIns="91440" tIns="45720" rIns="91440" bIns="45720" rtlCol="0" anchor="b"/>
+          <a:lstStyle>
+            <a:lvl1pPr algn="r">
+              <a:defRPr sz="1200"/>
+            </a:lvl1pPr>
+          </a:lstStyle>
+          <a:p>
+            <a:fld id="{79B42CD7-0F1C-4F4E-ABF5-3961CFEC2D47}" type="slidenum">
+              <a:rPr lang="en-GB" smtClean="0"/>
+              <a:t>‹#›</a:t>
+            </a:fld>
+            <a:endParaRPr lang="en-GB"/>
+          </a:p>
+        </p:txBody>
+      </p:sp>
+    </p:spTree>
+    <p:extLst>
+      <p:ext uri="{BB962C8B-B14F-4D97-AF65-F5344CB8AC3E}">
+        <p14:creationId xmlns:p14="http://schemas.microsoft.com/office/powerpoint/2010/main" val="1850620521"/>
+      </p:ext>
+    </p:extLst>
+  </p:cSld>
+  <p:clrMap bg1="lt1" tx1="dk1" bg2="lt2" tx2="dk2" accent1="accent1" accent2="accent2" accent3="accent3" accent4="accent4" accent5="accent5" accent6="accent6" hlink="hlink" folHlink="folHlink"/>
+  <p:notesStyle>
+    <a:lvl1pPr marL="0" algn="l" defTabSz="914400" rtl="0" eaLnBrk="1" latinLnBrk="0" hangingPunct="1">
+      <a:defRPr sz="1200" kern="1200">
+        <a:solidFill>
+          <a:schemeClr val="tx1"/>
+        </a:solidFill>
+        <a:latin typeface="+mn-lt"/>
+        <a:ea typeface="+mn-ea"/>
+        <a:cs typeface="+mn-cs"/>
+      </a:defRPr>
+    </a:lvl1pPr>
+    <a:lvl2pPr marL="457200" algn="l" defTabSz="914400" rtl="0" eaLnBrk="1" latinLnBrk="0" hangingPunct="1">
+      <a:defRPr sz="1200" kern="1200">
+        <a:solidFill>
+          <a:schemeClr val="tx1"/>
+        </a:solidFill>
+        <a:latin typeface="+mn-lt"/>
+        <a:ea typeface="+mn-ea"/>
+        <a:cs typeface="+mn-cs"/>
+      </a:defRPr>
+    </a:lvl2pPr>
+    <a:lvl3pPr marL="914400" algn="l" defTabSz="914400" rtl="0" eaLnBrk="1" latinLnBrk="0" hangingPunct="1">
+      <a:defRPr sz="1200" kern="1200">
+        <a:solidFill>
+          <a:schemeClr val="tx1"/>
+        </a:solidFill>
+        <a:latin typeface="+mn-lt"/>
+        <a:ea typeface="+mn-ea"/>
+        <a:cs typeface="+mn-cs"/>
+      </a:defRPr>
+    </a:lvl3pPr>
+    <a:lvl4pPr marL="1371600" algn="l" defTabSz="914400" rtl="0" eaLnBrk="1" latinLnBrk="0" hangingPunct="1">
+      <a:defRPr sz="1200" kern="1200">
+        <a:solidFill>
+          <a:schemeClr val="tx1"/>
+        </a:solidFill>
+        <a:latin typeface="+mn-lt"/>
+        <a:ea typeface="+mn-ea"/>
+        <a:cs typeface="+mn-cs"/>
+      </a:defRPr>
+    </a:lvl4pPr>
+    <a:lvl5pPr marL="1828800" algn="l" defTabSz="914400" rtl="0" eaLnBrk="1" latinLnBrk="0" hangingPunct="1">
+      <a:defRPr sz="1200" kern="1200">
+        <a:solidFill>
+          <a:schemeClr val="tx1"/>
+        </a:solidFill>
+        <a:latin typeface="+mn-lt"/>
+        <a:ea typeface="+mn-ea"/>
+        <a:cs typeface="+mn-cs"/>
+      </a:defRPr>
+    </a:lvl5pPr>
+    <a:lvl6pPr marL="2286000" algn="l" defTabSz="914400" rtl="0" eaLnBrk="1" latinLnBrk="0" hangingPunct="1">
+      <a:defRPr sz="1200" kern="1200">
+        <a:solidFill>
+          <a:schemeClr val="tx1"/>
+        </a:solidFill>
+        <a:latin typeface="+mn-lt"/>
+        <a:ea typeface="+mn-ea"/>
+        <a:cs typeface="+mn-cs"/>
+      </a:defRPr>
+    </a:lvl6pPr>
+    <a:lvl7pPr marL="2743200" algn="l" defTabSz="914400" rtl="0" eaLnBrk="1" latinLnBrk="0" hangingPunct="1">
+      <a:defRPr sz="1200" kern="1200">
+        <a:solidFill>
+          <a:schemeClr val="tx1"/>
+        </a:solidFill>
+        <a:latin typeface="+mn-lt"/>
+        <a:ea typeface="+mn-ea"/>
+        <a:cs typeface="+mn-cs"/>
+      </a:defRPr>
+    </a:lvl7pPr>
+    <a:lvl8pPr marL="3200400" algn="l" defTabSz="914400" rtl="0" eaLnBrk="1" latinLnBrk="0" hangingPunct="1">
+      <a:defRPr sz="1200" kern="1200">
+        <a:solidFill>
+          <a:schemeClr val="tx1"/>
+        </a:solidFill>
+        <a:latin typeface="+mn-lt"/>
+        <a:ea typeface="+mn-ea"/>
+        <a:cs typeface="+mn-cs"/>
+      </a:defRPr>
+    </a:lvl8pPr>
+    <a:lvl9pPr marL="3657600" algn="l" defTabSz="914400" rtl="0" eaLnBrk="1" latinLnBrk="0" hangingPunct="1">
+      <a:defRPr sz="1200" kern="1200">
+        <a:solidFill>
+          <a:schemeClr val="tx1"/>
+        </a:solidFill>
+        <a:latin typeface="+mn-lt"/>
+        <a:ea typeface="+mn-ea"/>
+        <a:cs typeface="+mn-cs"/>
+      </a:defRPr>
+    </a:lvl9pPr>
+  </p:notesStyle>
+</p:notesMaster>
+</file>
+
 <file path=ppt/slideLayouts/slideLayout1.xml><?xml version="1.0" encoding="utf-8"?>
 <p:sldLayout xmlns:a="http://schemas.openxmlformats.org/drawingml/2006/main" xmlns:r="http://schemas.openxmlformats.org/officeDocument/2006/relationships" xmlns:p="http://schemas.openxmlformats.org/presentationml/2006/main" type="title" preserve="1">
   <p:cSld name="Title Slide">
@@ -271,9 +625,9 @@
           <a:bodyPr/>
           <a:lstStyle/>
           <a:p>
-            <a:fld id="{30D5FCF1-0C89-4529-B76E-68B59A8C4EEA}" type="datetimeFigureOut">
+            <a:fld id="{7DE8EB90-590D-41AB-9287-50CDBB2E4CCD}" type="datetime1">
               <a:rPr lang="en-GB" smtClean="0"/>
-              <a:t>08/12/2017</a:t>
+              <a:t>09/12/2017</a:t>
             </a:fld>
             <a:endParaRPr lang="en-GB"/>
           </a:p>
@@ -471,9 +825,9 @@
           <a:bodyPr/>
           <a:lstStyle/>
           <a:p>
-            <a:fld id="{30D5FCF1-0C89-4529-B76E-68B59A8C4EEA}" type="datetimeFigureOut">
+            <a:fld id="{DF20ED61-25C9-4BBD-B111-E676A03A2DAB}" type="datetime1">
               <a:rPr lang="en-GB" smtClean="0"/>
-              <a:t>08/12/2017</a:t>
+              <a:t>09/12/2017</a:t>
             </a:fld>
             <a:endParaRPr lang="en-GB"/>
           </a:p>
@@ -681,9 +1035,9 @@
           <a:bodyPr/>
           <a:lstStyle/>
           <a:p>
-            <a:fld id="{30D5FCF1-0C89-4529-B76E-68B59A8C4EEA}" type="datetimeFigureOut">
+            <a:fld id="{B0557E56-BE94-48A0-AA2C-5D02AF1BA372}" type="datetime1">
               <a:rPr lang="en-GB" smtClean="0"/>
-              <a:t>08/12/2017</a:t>
+              <a:t>09/12/2017</a:t>
             </a:fld>
             <a:endParaRPr lang="en-GB"/>
           </a:p>
@@ -881,9 +1235,9 @@
           <a:bodyPr/>
           <a:lstStyle/>
           <a:p>
-            <a:fld id="{30D5FCF1-0C89-4529-B76E-68B59A8C4EEA}" type="datetimeFigureOut">
+            <a:fld id="{FB67925B-3ABD-4C4B-92E0-EC4897DD4947}" type="datetime1">
               <a:rPr lang="en-GB" smtClean="0"/>
-              <a:t>08/12/2017</a:t>
+              <a:t>09/12/2017</a:t>
             </a:fld>
             <a:endParaRPr lang="en-GB"/>
           </a:p>
@@ -1157,9 +1511,9 @@
           <a:bodyPr/>
           <a:lstStyle/>
           <a:p>
-            <a:fld id="{30D5FCF1-0C89-4529-B76E-68B59A8C4EEA}" type="datetimeFigureOut">
+            <a:fld id="{E9D1F3E3-6566-45AA-90EE-403E5989F8F9}" type="datetime1">
               <a:rPr lang="en-GB" smtClean="0"/>
-              <a:t>08/12/2017</a:t>
+              <a:t>09/12/2017</a:t>
             </a:fld>
             <a:endParaRPr lang="en-GB"/>
           </a:p>
@@ -1425,9 +1779,9 @@
           <a:bodyPr/>
           <a:lstStyle/>
           <a:p>
-            <a:fld id="{30D5FCF1-0C89-4529-B76E-68B59A8C4EEA}" type="datetimeFigureOut">
+            <a:fld id="{CC54114A-FA2D-438E-B6BC-899B7F3FB765}" type="datetime1">
               <a:rPr lang="en-GB" smtClean="0"/>
-              <a:t>08/12/2017</a:t>
+              <a:t>09/12/2017</a:t>
             </a:fld>
             <a:endParaRPr lang="en-GB"/>
           </a:p>
@@ -1840,9 +2194,9 @@
           <a:bodyPr/>
           <a:lstStyle/>
           <a:p>
-            <a:fld id="{30D5FCF1-0C89-4529-B76E-68B59A8C4EEA}" type="datetimeFigureOut">
+            <a:fld id="{37060A2F-6137-4D9A-A93E-4110A0BB28F9}" type="datetime1">
               <a:rPr lang="en-GB" smtClean="0"/>
-              <a:t>08/12/2017</a:t>
+              <a:t>09/12/2017</a:t>
             </a:fld>
             <a:endParaRPr lang="en-GB"/>
           </a:p>
@@ -1982,9 +2336,9 @@
           <a:bodyPr/>
           <a:lstStyle/>
           <a:p>
-            <a:fld id="{30D5FCF1-0C89-4529-B76E-68B59A8C4EEA}" type="datetimeFigureOut">
+            <a:fld id="{E61E4096-057D-4A55-8B5D-CF5AEF0692C7}" type="datetime1">
               <a:rPr lang="en-GB" smtClean="0"/>
-              <a:t>08/12/2017</a:t>
+              <a:t>09/12/2017</a:t>
             </a:fld>
             <a:endParaRPr lang="en-GB"/>
           </a:p>
@@ -2095,9 +2449,9 @@
           <a:bodyPr/>
           <a:lstStyle/>
           <a:p>
-            <a:fld id="{30D5FCF1-0C89-4529-B76E-68B59A8C4EEA}" type="datetimeFigureOut">
+            <a:fld id="{B3980A74-6599-4642-A37B-4D0C5935362C}" type="datetime1">
               <a:rPr lang="en-GB" smtClean="0"/>
-              <a:t>08/12/2017</a:t>
+              <a:t>09/12/2017</a:t>
             </a:fld>
             <a:endParaRPr lang="en-GB"/>
           </a:p>
@@ -2408,9 +2762,9 @@
           <a:bodyPr/>
           <a:lstStyle/>
           <a:p>
-            <a:fld id="{30D5FCF1-0C89-4529-B76E-68B59A8C4EEA}" type="datetimeFigureOut">
+            <a:fld id="{E013F3D1-B98F-4827-A8EF-6CB38806E1B7}" type="datetime1">
               <a:rPr lang="en-GB" smtClean="0"/>
-              <a:t>08/12/2017</a:t>
+              <a:t>09/12/2017</a:t>
             </a:fld>
             <a:endParaRPr lang="en-GB"/>
           </a:p>
@@ -2697,9 +3051,9 @@
           <a:bodyPr/>
           <a:lstStyle/>
           <a:p>
-            <a:fld id="{30D5FCF1-0C89-4529-B76E-68B59A8C4EEA}" type="datetimeFigureOut">
+            <a:fld id="{A9E1EAE0-7CDB-4CEB-BD13-9830369D4B6F}" type="datetime1">
               <a:rPr lang="en-GB" smtClean="0"/>
-              <a:t>08/12/2017</a:t>
+              <a:t>09/12/2017</a:t>
             </a:fld>
             <a:endParaRPr lang="en-GB"/>
           </a:p>
@@ -2940,9 +3294,9 @@
             </a:lvl1pPr>
           </a:lstStyle>
           <a:p>
-            <a:fld id="{30D5FCF1-0C89-4529-B76E-68B59A8C4EEA}" type="datetimeFigureOut">
+            <a:fld id="{FD5F8BF0-2DB6-492E-BAA2-E43FD005B33A}" type="datetime1">
               <a:rPr lang="en-GB" smtClean="0"/>
-              <a:t>08/12/2017</a:t>
+              <a:t>09/12/2017</a:t>
             </a:fld>
             <a:endParaRPr lang="en-GB"/>
           </a:p>
@@ -3059,6 +3413,7 @@
     <p:sldLayoutId id="2147483658" r:id="rId10"/>
     <p:sldLayoutId id="2147483659" r:id="rId11"/>
   </p:sldLayoutIdLst>
+  <p:hf hdr="0" ftr="0" dt="0"/>
   <p:txStyles>
     <p:titleStyle>
       <a:lvl1pPr algn="l" defTabSz="914400" rtl="0" eaLnBrk="1" latinLnBrk="0" hangingPunct="1">
@@ -3377,8 +3732,8 @@
         </p:nvSpPr>
         <p:spPr>
           <a:xfrm>
-            <a:off x="1565836" y="1618409"/>
-            <a:ext cx="9144000" cy="3079247"/>
+            <a:off x="1211580" y="92598"/>
+            <a:ext cx="9898380" cy="2753108"/>
           </a:xfrm>
         </p:spPr>
         <p:txBody>
@@ -3387,13 +3742,20 @@
           <a:p>
             <a:r>
               <a:rPr lang="en-GB" dirty="0"/>
-              <a:t>Phase 3: SSL-Stripping und </a:t>
-            </a:r>
-            <a:r>
-              <a:rPr lang="en-GB" b="1" dirty="0" err="1"/>
+              <a:t>Phase 3</a:t>
+            </a:r>
+            <a:br>
+              <a:rPr lang="en-GB" dirty="0"/>
+            </a:br>
+            <a:r>
+              <a:rPr lang="en-GB" dirty="0"/>
+              <a:t>SSL-Stripping und </a:t>
+            </a:r>
+            <a:r>
+              <a:rPr lang="en-GB" dirty="0" err="1"/>
               <a:t>Verwandtes</a:t>
             </a:r>
-            <a:endParaRPr lang="en-GB" b="1" dirty="0"/>
+            <a:endParaRPr lang="en-GB" dirty="0"/>
           </a:p>
         </p:txBody>
       </p:sp>
@@ -3415,16 +3777,26 @@
         </p:nvSpPr>
         <p:spPr>
           <a:xfrm>
-            <a:off x="1565836" y="4631765"/>
-            <a:ext cx="9144000" cy="2226236"/>
+            <a:off x="1112520" y="3147060"/>
+            <a:ext cx="10088880" cy="3710940"/>
           </a:xfrm>
         </p:spPr>
         <p:txBody>
           <a:bodyPr>
-            <a:normAutofit lnSpcReduction="10000"/>
+            <a:normAutofit/>
           </a:bodyPr>
           <a:lstStyle/>
           <a:p>
+            <a:pPr fontAlgn="base"/>
+            <a:r>
+              <a:rPr lang="de-DE" sz="3200" dirty="0"/>
+              <a:t>Seminar: Das Internet der Dinge (IoT) - ein Hackerparadies?</a:t>
+            </a:r>
+          </a:p>
+          <a:p>
+            <a:endParaRPr lang="en-GB" dirty="0"/>
+          </a:p>
+          <a:p>
             <a:r>
               <a:rPr lang="en-GB" dirty="0"/>
               <a:t>9 </a:t>
@@ -3538,40 +3910,432 @@
           </a:p>
         </p:txBody>
       </p:sp>
-      <p:pic>
-        <p:nvPicPr>
-          <p:cNvPr id="4" name="Picture 3">
-            <a:extLst>
-              <a:ext uri="{FF2B5EF4-FFF2-40B4-BE49-F238E27FC236}">
-                <a16:creationId xmlns:a16="http://schemas.microsoft.com/office/drawing/2014/main" id="{7174FC98-8FCE-4A0D-8BAD-FAE1F2764CCC}"/>
-              </a:ext>
-            </a:extLst>
-          </p:cNvPr>
-          <p:cNvPicPr>
-            <a:picLocks noChangeAspect="1"/>
-          </p:cNvPicPr>
-          <p:nvPr/>
-        </p:nvPicPr>
-        <p:blipFill>
-          <a:blip r:embed="rId2"/>
-          <a:stretch>
-            <a:fillRect/>
-          </a:stretch>
-        </p:blipFill>
-        <p:spPr>
-          <a:xfrm>
-            <a:off x="3456972" y="0"/>
-            <a:ext cx="5278056" cy="2968907"/>
-          </a:xfrm>
-          <a:prstGeom prst="rect">
-            <a:avLst/>
-          </a:prstGeom>
-        </p:spPr>
-      </p:pic>
     </p:spTree>
     <p:extLst>
       <p:ext uri="{BB962C8B-B14F-4D97-AF65-F5344CB8AC3E}">
         <p14:creationId xmlns:p14="http://schemas.microsoft.com/office/powerpoint/2010/main" val="1021282985"/>
+      </p:ext>
+    </p:extLst>
+  </p:cSld>
+  <p:clrMapOvr>
+    <a:masterClrMapping/>
+  </p:clrMapOvr>
+</p:sld>
+</file>
+
+<file path=ppt/slides/slide10.xml><?xml version="1.0" encoding="utf-8"?>
+<p:sld xmlns:a="http://schemas.openxmlformats.org/drawingml/2006/main" xmlns:r="http://schemas.openxmlformats.org/officeDocument/2006/relationships" xmlns:p="http://schemas.openxmlformats.org/presentationml/2006/main">
+  <p:cSld>
+    <p:spTree>
+      <p:nvGrpSpPr>
+        <p:cNvPr id="1" name=""/>
+        <p:cNvGrpSpPr/>
+        <p:nvPr/>
+      </p:nvGrpSpPr>
+      <p:grpSpPr>
+        <a:xfrm>
+          <a:off x="0" y="0"/>
+          <a:ext cx="0" cy="0"/>
+          <a:chOff x="0" y="0"/>
+          <a:chExt cx="0" cy="0"/>
+        </a:xfrm>
+      </p:grpSpPr>
+      <p:sp>
+        <p:nvSpPr>
+          <p:cNvPr id="2" name="Title 1">
+            <a:extLst>
+              <a:ext uri="{FF2B5EF4-FFF2-40B4-BE49-F238E27FC236}">
+                <a16:creationId xmlns:a16="http://schemas.microsoft.com/office/drawing/2014/main" id="{CFEF712D-B737-42AB-B983-28B0BCC44D75}"/>
+              </a:ext>
+            </a:extLst>
+          </p:cNvPr>
+          <p:cNvSpPr>
+            <a:spLocks noGrp="1"/>
+          </p:cNvSpPr>
+          <p:nvPr>
+            <p:ph type="title"/>
+          </p:nvPr>
+        </p:nvSpPr>
+        <p:spPr/>
+        <p:txBody>
+          <a:bodyPr/>
+          <a:lstStyle/>
+          <a:p>
+            <a:r>
+              <a:rPr lang="en-GB" dirty="0"/>
+              <a:t>VI.	</a:t>
+            </a:r>
+            <a:r>
+              <a:rPr lang="en-GB" dirty="0" err="1"/>
+              <a:t>Schlussfolgerungen</a:t>
+            </a:r>
+            <a:endParaRPr lang="en-GB" dirty="0"/>
+          </a:p>
+        </p:txBody>
+      </p:sp>
+      <mc:AlternateContent xmlns:mc="http://schemas.openxmlformats.org/markup-compatibility/2006">
+        <mc:Choice xmlns:a14="http://schemas.microsoft.com/office/drawing/2010/main" Requires="a14">
+          <p:sp>
+            <p:nvSpPr>
+              <p:cNvPr id="3" name="Content Placeholder 2">
+                <a:extLst>
+                  <a:ext uri="{FF2B5EF4-FFF2-40B4-BE49-F238E27FC236}">
+                    <a16:creationId xmlns:a16="http://schemas.microsoft.com/office/drawing/2014/main" id="{A19F2C76-DA68-4365-B768-8EB2C1AE0883}"/>
+                  </a:ext>
+                </a:extLst>
+              </p:cNvPr>
+              <p:cNvSpPr>
+                <a:spLocks noGrp="1"/>
+              </p:cNvSpPr>
+              <p:nvPr>
+                <p:ph idx="1"/>
+              </p:nvPr>
+            </p:nvSpPr>
+            <p:spPr>
+              <a:xfrm>
+                <a:off x="838200" y="1825624"/>
+                <a:ext cx="10515600" cy="4590415"/>
+              </a:xfrm>
+            </p:spPr>
+            <p:txBody>
+              <a:bodyPr>
+                <a:normAutofit lnSpcReduction="10000"/>
+              </a:bodyPr>
+              <a:lstStyle/>
+              <a:p>
+                <a:pPr marL="0" indent="0">
+                  <a:buNone/>
+                </a:pPr>
+                <a:r>
+                  <a:rPr lang="en-GB" b="1" dirty="0">
+                    <a:solidFill>
+                      <a:srgbClr val="FF0000"/>
+                    </a:solidFill>
+                    <a:ea typeface="Cambria Math" panose="02040503050406030204" pitchFamily="18" charset="0"/>
+                  </a:rPr>
+                  <a:t> </a:t>
+                </a:r>
+                <a14:m>
+                  <m:oMath xmlns:m="http://schemas.openxmlformats.org/officeDocument/2006/math">
+                    <m:r>
+                      <a:rPr lang="en-GB" b="1" i="1">
+                        <a:solidFill>
+                          <a:srgbClr val="FF0000"/>
+                        </a:solidFill>
+                        <a:latin typeface="Cambria Math" panose="02040503050406030204" pitchFamily="18" charset="0"/>
+                        <a:ea typeface="Cambria Math" panose="02040503050406030204" pitchFamily="18" charset="0"/>
+                      </a:rPr>
+                      <m:t>×</m:t>
+                    </m:r>
+                  </m:oMath>
+                </a14:m>
+                <a:r>
+                  <a:rPr lang="en-GB" dirty="0"/>
+                  <a:t> Philips Hue 						</a:t>
+                </a:r>
+              </a:p>
+              <a:p>
+                <a:pPr lvl="1"/>
+                <a:r>
+                  <a:rPr lang="en-GB" dirty="0" err="1"/>
+                  <a:t>Kommunikation</a:t>
+                </a:r>
+                <a:r>
+                  <a:rPr lang="en-GB" dirty="0"/>
+                  <a:t> </a:t>
+                </a:r>
+                <a:r>
+                  <a:rPr lang="en-GB" dirty="0" err="1"/>
+                  <a:t>mit</a:t>
+                </a:r>
+                <a:r>
+                  <a:rPr lang="en-GB" dirty="0"/>
+                  <a:t> den </a:t>
+                </a:r>
+                <a:r>
+                  <a:rPr lang="en-GB" dirty="0" err="1"/>
+                  <a:t>Servern</a:t>
+                </a:r>
+                <a:r>
+                  <a:rPr lang="en-GB" dirty="0"/>
+                  <a:t> </a:t>
+                </a:r>
+                <a:r>
+                  <a:rPr lang="en-GB" dirty="0" err="1"/>
+                  <a:t>ist</a:t>
+                </a:r>
+                <a:r>
+                  <a:rPr lang="en-GB" dirty="0"/>
+                  <a:t> </a:t>
+                </a:r>
+                <a:r>
+                  <a:rPr lang="en-GB" dirty="0" err="1"/>
+                  <a:t>verscchlüsselt</a:t>
+                </a:r>
+                <a:endParaRPr lang="en-GB" dirty="0"/>
+              </a:p>
+              <a:p>
+                <a:pPr marL="457200" lvl="1" indent="0">
+                  <a:buNone/>
+                </a:pPr>
+                <a:r>
+                  <a:rPr lang="en-GB" dirty="0"/>
+                  <a:t>	ABER</a:t>
+                </a:r>
+              </a:p>
+              <a:p>
+                <a:pPr lvl="1"/>
+                <a:r>
+                  <a:rPr lang="en-GB" dirty="0" err="1"/>
+                  <a:t>Im</a:t>
+                </a:r>
+                <a:r>
+                  <a:rPr lang="en-GB" dirty="0"/>
+                  <a:t> </a:t>
+                </a:r>
+                <a:r>
+                  <a:rPr lang="en-GB" dirty="0" err="1"/>
+                  <a:t>Netzwerk</a:t>
+                </a:r>
+                <a:r>
+                  <a:rPr lang="en-GB" dirty="0"/>
+                  <a:t> </a:t>
+                </a:r>
+                <a:r>
+                  <a:rPr lang="en-GB" dirty="0" err="1"/>
+                  <a:t>kann</a:t>
+                </a:r>
+                <a:r>
+                  <a:rPr lang="en-GB" dirty="0"/>
+                  <a:t> man </a:t>
+                </a:r>
+                <a:r>
+                  <a:rPr lang="en-GB" sz="2300" dirty="0">
+                    <a:cs typeface="Courier New" panose="02070309020205020404" pitchFamily="49" charset="0"/>
+                  </a:rPr>
+                  <a:t>HTTP</a:t>
+                </a:r>
+                <a:r>
+                  <a:rPr lang="en-GB" dirty="0"/>
+                  <a:t> </a:t>
+                </a:r>
+                <a:r>
+                  <a:rPr lang="en-GB" dirty="0" err="1"/>
+                  <a:t>Pakete</a:t>
+                </a:r>
+                <a:r>
+                  <a:rPr lang="en-GB" dirty="0"/>
+                  <a:t> </a:t>
+                </a:r>
+                <a:r>
+                  <a:rPr lang="en-GB" dirty="0" err="1"/>
+                  <a:t>verschicken</a:t>
+                </a:r>
+                <a:endParaRPr lang="en-GB" dirty="0"/>
+              </a:p>
+              <a:p>
+                <a:pPr marL="457200" lvl="1" indent="0">
+                  <a:buNone/>
+                </a:pPr>
+                <a:endParaRPr lang="en-GB" dirty="0"/>
+              </a:p>
+              <a:p>
+                <a:pPr marL="457200" lvl="1" indent="0">
+                  <a:buNone/>
+                </a:pPr>
+                <a:r>
+                  <a:rPr lang="en-GB" dirty="0"/>
+                  <a:t>“Reducing security for the sake of interoperability”</a:t>
+                </a:r>
+              </a:p>
+              <a:p>
+                <a:endParaRPr lang="en-GB" dirty="0"/>
+              </a:p>
+              <a:p>
+                <a:pPr marL="0" indent="0">
+                  <a:buNone/>
+                </a:pPr>
+                <a:r>
+                  <a:rPr lang="en-GB" dirty="0">
+                    <a:solidFill>
+                      <a:schemeClr val="accent6"/>
+                    </a:solidFill>
+                  </a:rPr>
+                  <a:t> ✔ </a:t>
+                </a:r>
+                <a:r>
+                  <a:rPr lang="en-GB" dirty="0"/>
+                  <a:t>LED-Matrix</a:t>
+                </a:r>
+                <a:endParaRPr lang="en-GB" dirty="0">
+                  <a:solidFill>
+                    <a:schemeClr val="accent6"/>
+                  </a:solidFill>
+                </a:endParaRPr>
+              </a:p>
+              <a:p>
+                <a:pPr lvl="1"/>
+                <a:r>
+                  <a:rPr lang="en-GB" dirty="0" err="1"/>
+                  <a:t>Nicht</a:t>
+                </a:r>
+                <a:r>
+                  <a:rPr lang="en-GB" dirty="0"/>
+                  <a:t> </a:t>
+                </a:r>
+                <a:r>
+                  <a:rPr lang="en-GB" dirty="0" err="1"/>
+                  <a:t>manipulierbar</a:t>
+                </a:r>
+                <a:r>
+                  <a:rPr lang="en-GB" dirty="0"/>
+                  <a:t> (</a:t>
+                </a:r>
+                <a:r>
+                  <a:rPr lang="en-GB" dirty="0" err="1"/>
+                  <a:t>mit</a:t>
+                </a:r>
+                <a:r>
+                  <a:rPr lang="en-GB" dirty="0"/>
+                  <a:t> </a:t>
+                </a:r>
+                <a:r>
+                  <a:rPr lang="en-GB" dirty="0" err="1"/>
+                  <a:t>versuchten</a:t>
+                </a:r>
+                <a:r>
+                  <a:rPr lang="en-GB" dirty="0"/>
+                  <a:t> </a:t>
+                </a:r>
+                <a:r>
+                  <a:rPr lang="en-GB" dirty="0" err="1"/>
+                  <a:t>Mitteln</a:t>
+                </a:r>
+                <a:r>
+                  <a:rPr lang="en-GB" dirty="0"/>
+                  <a:t>)</a:t>
+                </a:r>
+              </a:p>
+              <a:p>
+                <a:pPr marL="457200" lvl="1" indent="0">
+                  <a:buNone/>
+                </a:pPr>
+                <a:endParaRPr lang="en-GB" dirty="0"/>
+              </a:p>
+              <a:p>
+                <a:pPr marL="457200" lvl="1" indent="0">
+                  <a:buNone/>
+                </a:pPr>
+                <a14:m>
+                  <m:oMath xmlns:m="http://schemas.openxmlformats.org/officeDocument/2006/math">
+                    <m:r>
+                      <a:rPr lang="en-GB" sz="2800" b="0" i="1" smtClean="0">
+                        <a:latin typeface="Cambria Math" panose="02040503050406030204" pitchFamily="18" charset="0"/>
+                        <a:ea typeface="Cambria Math" panose="02040503050406030204" pitchFamily="18" charset="0"/>
+                      </a:rPr>
+                      <m:t>⇒</m:t>
+                    </m:r>
+                  </m:oMath>
+                </a14:m>
+                <a:r>
+                  <a:rPr lang="en-GB" sz="2800" b="0" dirty="0"/>
+                  <a:t> SSL-Strip das </a:t>
+                </a:r>
+                <a:r>
+                  <a:rPr lang="en-GB" sz="2800" b="0" dirty="0" err="1"/>
+                  <a:t>falsche</a:t>
+                </a:r>
+                <a:r>
+                  <a:rPr lang="en-GB" sz="2800" b="0" dirty="0"/>
+                  <a:t> Tool</a:t>
+                </a:r>
+              </a:p>
+              <a:p>
+                <a:pPr marL="457200" lvl="1" indent="0">
+                  <a:buNone/>
+                </a:pPr>
+                <a:endParaRPr lang="en-GB" sz="2800" dirty="0"/>
+              </a:p>
+            </p:txBody>
+          </p:sp>
+        </mc:Choice>
+        <mc:Fallback>
+          <p:sp>
+            <p:nvSpPr>
+              <p:cNvPr id="3" name="Content Placeholder 2">
+                <a:extLst>
+                  <a:ext uri="{FF2B5EF4-FFF2-40B4-BE49-F238E27FC236}">
+                    <a16:creationId xmlns:a16="http://schemas.microsoft.com/office/drawing/2014/main" id="{A19F2C76-DA68-4365-B768-8EB2C1AE0883}"/>
+                  </a:ext>
+                </a:extLst>
+              </p:cNvPr>
+              <p:cNvSpPr>
+                <a:spLocks noGrp="1" noRot="1" noChangeAspect="1" noMove="1" noResize="1" noEditPoints="1" noAdjustHandles="1" noChangeArrowheads="1" noChangeShapeType="1" noTextEdit="1"/>
+              </p:cNvSpPr>
+              <p:nvPr>
+                <p:ph idx="1"/>
+              </p:nvPr>
+            </p:nvSpPr>
+            <p:spPr>
+              <a:xfrm>
+                <a:off x="838200" y="1825624"/>
+                <a:ext cx="10515600" cy="4590415"/>
+              </a:xfrm>
+              <a:blipFill>
+                <a:blip r:embed="rId2"/>
+                <a:stretch>
+                  <a:fillRect l="-464" t="-2922"/>
+                </a:stretch>
+              </a:blipFill>
+            </p:spPr>
+            <p:txBody>
+              <a:bodyPr/>
+              <a:lstStyle/>
+              <a:p>
+                <a:r>
+                  <a:rPr lang="en-GB">
+                    <a:noFill/>
+                  </a:rPr>
+                  <a:t> </a:t>
+                </a:r>
+              </a:p>
+            </p:txBody>
+          </p:sp>
+        </mc:Fallback>
+      </mc:AlternateContent>
+      <p:sp>
+        <p:nvSpPr>
+          <p:cNvPr id="4" name="Slide Number Placeholder 3">
+            <a:extLst>
+              <a:ext uri="{FF2B5EF4-FFF2-40B4-BE49-F238E27FC236}">
+                <a16:creationId xmlns:a16="http://schemas.microsoft.com/office/drawing/2014/main" id="{364B541D-30B0-4527-A481-D536822398B2}"/>
+              </a:ext>
+            </a:extLst>
+          </p:cNvPr>
+          <p:cNvSpPr>
+            <a:spLocks noGrp="1"/>
+          </p:cNvSpPr>
+          <p:nvPr>
+            <p:ph type="sldNum" sz="quarter" idx="12"/>
+          </p:nvPr>
+        </p:nvSpPr>
+        <p:spPr/>
+        <p:txBody>
+          <a:bodyPr/>
+          <a:lstStyle/>
+          <a:p>
+            <a:fld id="{90688A79-C3E9-46B5-89C9-85A34B18BF9C}" type="slidenum">
+              <a:rPr lang="en-GB" smtClean="0"/>
+              <a:t>10</a:t>
+            </a:fld>
+            <a:endParaRPr lang="en-GB"/>
+          </a:p>
+        </p:txBody>
+      </p:sp>
+    </p:spTree>
+    <p:extLst>
+      <p:ext uri="{BB962C8B-B14F-4D97-AF65-F5344CB8AC3E}">
+        <p14:creationId xmlns:p14="http://schemas.microsoft.com/office/powerpoint/2010/main" val="2753927759"/>
       </p:ext>
     </p:extLst>
   </p:cSld>
@@ -3645,62 +4409,127 @@
         </p:nvSpPr>
         <p:spPr/>
         <p:txBody>
+          <a:bodyPr>
+            <a:normAutofit/>
+          </a:bodyPr>
+          <a:lstStyle/>
+          <a:p>
+            <a:pPr marL="571500" indent="-571500">
+              <a:buFont typeface="+mj-lt"/>
+              <a:buAutoNum type="romanUcPeriod"/>
+            </a:pPr>
+            <a:r>
+              <a:rPr lang="en-GB" dirty="0" err="1"/>
+              <a:t>Wiederholung</a:t>
+            </a:r>
+            <a:endParaRPr lang="en-GB" dirty="0"/>
+          </a:p>
+          <a:p>
+            <a:pPr marL="571500" indent="-571500">
+              <a:buFont typeface="+mj-lt"/>
+              <a:buAutoNum type="romanUcPeriod"/>
+            </a:pPr>
+            <a:r>
+              <a:rPr lang="en-GB" dirty="0"/>
+              <a:t>Setup</a:t>
+            </a:r>
+          </a:p>
+          <a:p>
+            <a:pPr marL="571500" indent="-571500">
+              <a:buFont typeface="+mj-lt"/>
+              <a:buAutoNum type="romanUcPeriod"/>
+            </a:pPr>
+            <a:r>
+              <a:rPr lang="en-GB" dirty="0"/>
+              <a:t>Philips Hue</a:t>
+            </a:r>
+          </a:p>
+          <a:p>
+            <a:pPr marL="1028700" lvl="1" indent="-571500">
+              <a:buFont typeface="+mj-lt"/>
+              <a:buAutoNum type="romanLcPeriod"/>
+            </a:pPr>
+            <a:r>
+              <a:rPr lang="en-GB" dirty="0"/>
+              <a:t>ARP-Spoof | SSL Strip</a:t>
+            </a:r>
+          </a:p>
+          <a:p>
+            <a:pPr marL="1028700" lvl="1" indent="-571500">
+              <a:buFont typeface="+mj-lt"/>
+              <a:buAutoNum type="romanLcPeriod"/>
+            </a:pPr>
+            <a:r>
+              <a:rPr lang="en-GB" dirty="0"/>
+              <a:t>Playback</a:t>
+            </a:r>
+          </a:p>
+          <a:p>
+            <a:pPr marL="571500" indent="-571500">
+              <a:buFont typeface="+mj-lt"/>
+              <a:buAutoNum type="romanUcPeriod"/>
+            </a:pPr>
+            <a:r>
+              <a:rPr lang="en-GB" dirty="0"/>
+              <a:t>LED-Matrix</a:t>
+            </a:r>
+          </a:p>
+          <a:p>
+            <a:pPr marL="571500" indent="-571500">
+              <a:buFont typeface="+mj-lt"/>
+              <a:buAutoNum type="romanUcPeriod"/>
+            </a:pPr>
+            <a:r>
+              <a:rPr lang="en-GB" dirty="0"/>
+              <a:t>Was nun?</a:t>
+            </a:r>
+          </a:p>
+          <a:p>
+            <a:pPr marL="571500" indent="-571500">
+              <a:buFont typeface="+mj-lt"/>
+              <a:buAutoNum type="romanUcPeriod"/>
+            </a:pPr>
+            <a:r>
+              <a:rPr lang="en-GB" dirty="0" err="1"/>
+              <a:t>Schlussfolgerungen</a:t>
+            </a:r>
+            <a:endParaRPr lang="en-GB" dirty="0"/>
+          </a:p>
+          <a:p>
+            <a:pPr lvl="1"/>
+            <a:endParaRPr lang="en-GB" dirty="0"/>
+          </a:p>
+          <a:p>
+            <a:endParaRPr lang="en-GB" dirty="0"/>
+          </a:p>
+        </p:txBody>
+      </p:sp>
+      <p:sp>
+        <p:nvSpPr>
+          <p:cNvPr id="4" name="Slide Number Placeholder 3">
+            <a:extLst>
+              <a:ext uri="{FF2B5EF4-FFF2-40B4-BE49-F238E27FC236}">
+                <a16:creationId xmlns:a16="http://schemas.microsoft.com/office/drawing/2014/main" id="{A263A85F-5ECB-4ACA-AE09-503D3C54A6B3}"/>
+              </a:ext>
+            </a:extLst>
+          </p:cNvPr>
+          <p:cNvSpPr>
+            <a:spLocks noGrp="1"/>
+          </p:cNvSpPr>
+          <p:nvPr>
+            <p:ph type="sldNum" sz="quarter" idx="12"/>
+          </p:nvPr>
+        </p:nvSpPr>
+        <p:spPr/>
+        <p:txBody>
           <a:bodyPr/>
           <a:lstStyle/>
           <a:p>
-            <a:r>
-              <a:rPr lang="en-GB" dirty="0" err="1"/>
-              <a:t>Wiederholung</a:t>
-            </a:r>
-            <a:endParaRPr lang="en-GB" dirty="0"/>
-          </a:p>
-          <a:p>
-            <a:endParaRPr lang="en-GB" dirty="0"/>
-          </a:p>
-          <a:p>
-            <a:r>
-              <a:rPr lang="en-GB" dirty="0"/>
-              <a:t>Setup</a:t>
-            </a:r>
-          </a:p>
-          <a:p>
-            <a:endParaRPr lang="en-GB" dirty="0"/>
-          </a:p>
-          <a:p>
-            <a:r>
-              <a:rPr lang="en-GB" dirty="0"/>
-              <a:t>Philips Hue</a:t>
-            </a:r>
-          </a:p>
-          <a:p>
-            <a:pPr lvl="1"/>
-            <a:r>
-              <a:rPr lang="en-GB" dirty="0"/>
-              <a:t>SSL Strip</a:t>
-            </a:r>
-          </a:p>
-          <a:p>
-            <a:pPr lvl="1"/>
-            <a:r>
-              <a:rPr lang="en-GB" dirty="0"/>
-              <a:t>Playback</a:t>
-            </a:r>
-          </a:p>
-          <a:p>
-            <a:endParaRPr lang="en-GB" dirty="0"/>
-          </a:p>
-          <a:p>
-            <a:r>
-              <a:rPr lang="en-GB" dirty="0"/>
-              <a:t>LED-Matrix</a:t>
-            </a:r>
-          </a:p>
-          <a:p>
-            <a:pPr lvl="1"/>
-            <a:endParaRPr lang="en-GB" dirty="0"/>
-          </a:p>
-          <a:p>
-            <a:endParaRPr lang="en-GB" dirty="0"/>
+            <a:fld id="{90688A79-C3E9-46B5-89C9-85A34B18BF9C}" type="slidenum">
+              <a:rPr lang="en-GB" smtClean="0"/>
+              <a:t>2</a:t>
+            </a:fld>
+            <a:endParaRPr lang="en-GB"/>
           </a:p>
         </p:txBody>
       </p:sp>
@@ -3756,6 +4585,10 @@
           <a:lstStyle/>
           <a:p>
             <a:r>
+              <a:rPr lang="en-GB" dirty="0"/>
+              <a:t>I.	</a:t>
+            </a:r>
+            <a:r>
               <a:rPr lang="en-GB" dirty="0" err="1"/>
               <a:t>Wiederholung</a:t>
             </a:r>
@@ -3812,6 +4645,35 @@
           </a:extLst>
         </p:spPr>
       </p:pic>
+      <p:sp>
+        <p:nvSpPr>
+          <p:cNvPr id="3" name="Slide Number Placeholder 2">
+            <a:extLst>
+              <a:ext uri="{FF2B5EF4-FFF2-40B4-BE49-F238E27FC236}">
+                <a16:creationId xmlns:a16="http://schemas.microsoft.com/office/drawing/2014/main" id="{9F6D5E72-DD27-4DE5-BC1D-05DC8B9CCD95}"/>
+              </a:ext>
+            </a:extLst>
+          </p:cNvPr>
+          <p:cNvSpPr>
+            <a:spLocks noGrp="1"/>
+          </p:cNvSpPr>
+          <p:nvPr>
+            <p:ph type="sldNum" sz="quarter" idx="12"/>
+          </p:nvPr>
+        </p:nvSpPr>
+        <p:spPr/>
+        <p:txBody>
+          <a:bodyPr/>
+          <a:lstStyle/>
+          <a:p>
+            <a:fld id="{90688A79-C3E9-46B5-89C9-85A34B18BF9C}" type="slidenum">
+              <a:rPr lang="en-GB" smtClean="0"/>
+              <a:t>3</a:t>
+            </a:fld>
+            <a:endParaRPr lang="en-GB"/>
+          </a:p>
+        </p:txBody>
+      </p:sp>
     </p:spTree>
     <p:extLst>
       <p:ext uri="{BB962C8B-B14F-4D97-AF65-F5344CB8AC3E}">
@@ -3856,8 +4718,8 @@
         </p:nvSpPr>
         <p:spPr>
           <a:xfrm>
-            <a:off x="280967" y="4242"/>
-            <a:ext cx="1513110" cy="769441"/>
+            <a:off x="242866" y="2443036"/>
+            <a:ext cx="2395958" cy="769441"/>
           </a:xfrm>
           <a:prstGeom prst="rect">
             <a:avLst/>
@@ -3874,17 +4736,46 @@
               <a:rPr lang="en-GB" sz="4400" dirty="0">
                 <a:latin typeface="+mj-lt"/>
               </a:rPr>
-              <a:t>Setup</a:t>
-            </a:r>
+              <a:t>II. Setup</a:t>
+            </a:r>
+          </a:p>
+        </p:txBody>
+      </p:sp>
+      <p:sp>
+        <p:nvSpPr>
+          <p:cNvPr id="2" name="Slide Number Placeholder 1">
+            <a:extLst>
+              <a:ext uri="{FF2B5EF4-FFF2-40B4-BE49-F238E27FC236}">
+                <a16:creationId xmlns:a16="http://schemas.microsoft.com/office/drawing/2014/main" id="{CD5CBA68-81AD-41BC-AD90-36619168458C}"/>
+              </a:ext>
+            </a:extLst>
+          </p:cNvPr>
+          <p:cNvSpPr>
+            <a:spLocks noGrp="1"/>
+          </p:cNvSpPr>
+          <p:nvPr>
+            <p:ph type="sldNum" sz="quarter" idx="12"/>
+          </p:nvPr>
+        </p:nvSpPr>
+        <p:spPr/>
+        <p:txBody>
+          <a:bodyPr/>
+          <a:lstStyle/>
+          <a:p>
+            <a:fld id="{90688A79-C3E9-46B5-89C9-85A34B18BF9C}" type="slidenum">
+              <a:rPr lang="en-GB" smtClean="0"/>
+              <a:t>4</a:t>
+            </a:fld>
+            <a:endParaRPr lang="en-GB"/>
           </a:p>
         </p:txBody>
       </p:sp>
       <p:grpSp>
         <p:nvGrpSpPr>
-          <p:cNvPr id="152" name="Group 151">
-            <a:extLst>
-              <a:ext uri="{FF2B5EF4-FFF2-40B4-BE49-F238E27FC236}">
-                <a16:creationId xmlns:a16="http://schemas.microsoft.com/office/drawing/2014/main" id="{F59433E9-787A-4030-A74F-413929BF0189}"/>
+          <p:cNvPr id="8" name="Group 7">
+            <a:extLst>
+              <a:ext uri="{FF2B5EF4-FFF2-40B4-BE49-F238E27FC236}">
+                <a16:creationId xmlns:a16="http://schemas.microsoft.com/office/drawing/2014/main" id="{CCEA1CD6-0DDD-4378-BF8E-FC934084985B}"/>
               </a:ext>
             </a:extLst>
           </p:cNvPr>
@@ -3901,10 +4792,10 @@
         </p:grpSpPr>
         <p:grpSp>
           <p:nvGrpSpPr>
-            <p:cNvPr id="150" name="Group 149">
+            <p:cNvPr id="152" name="Group 151">
               <a:extLst>
                 <a:ext uri="{FF2B5EF4-FFF2-40B4-BE49-F238E27FC236}">
-                  <a16:creationId xmlns:a16="http://schemas.microsoft.com/office/drawing/2014/main" id="{6FFB1E21-5209-4EB8-93E7-ED2ED3904815}"/>
+                  <a16:creationId xmlns:a16="http://schemas.microsoft.com/office/drawing/2014/main" id="{F59433E9-787A-4030-A74F-413929BF0189}"/>
                 </a:ext>
               </a:extLst>
             </p:cNvPr>
@@ -3921,10 +4812,10 @@
           </p:grpSpPr>
           <p:grpSp>
             <p:nvGrpSpPr>
-              <p:cNvPr id="146" name="Group 145">
+              <p:cNvPr id="150" name="Group 149">
                 <a:extLst>
                   <a:ext uri="{FF2B5EF4-FFF2-40B4-BE49-F238E27FC236}">
-                    <a16:creationId xmlns:a16="http://schemas.microsoft.com/office/drawing/2014/main" id="{F032D7A0-B2E3-4268-AEC8-1B091687B1C2}"/>
+                    <a16:creationId xmlns:a16="http://schemas.microsoft.com/office/drawing/2014/main" id="{6FFB1E21-5209-4EB8-93E7-ED2ED3904815}"/>
                   </a:ext>
                 </a:extLst>
               </p:cNvPr>
@@ -3939,12 +4830,1076 @@
                 <a:chExt cx="9885257" cy="6422370"/>
               </a:xfrm>
             </p:grpSpPr>
+            <p:grpSp>
+              <p:nvGrpSpPr>
+                <p:cNvPr id="146" name="Group 145">
+                  <a:extLst>
+                    <a:ext uri="{FF2B5EF4-FFF2-40B4-BE49-F238E27FC236}">
+                      <a16:creationId xmlns:a16="http://schemas.microsoft.com/office/drawing/2014/main" id="{F032D7A0-B2E3-4268-AEC8-1B091687B1C2}"/>
+                    </a:ext>
+                  </a:extLst>
+                </p:cNvPr>
+                <p:cNvGrpSpPr/>
+                <p:nvPr/>
+              </p:nvGrpSpPr>
+              <p:grpSpPr>
+                <a:xfrm>
+                  <a:off x="1149743" y="137462"/>
+                  <a:ext cx="9885257" cy="6422370"/>
+                  <a:chOff x="1149743" y="137462"/>
+                  <a:chExt cx="9885257" cy="6422370"/>
+                </a:xfrm>
+              </p:grpSpPr>
+              <p:sp>
+                <p:nvSpPr>
+                  <p:cNvPr id="4" name="Cloud 3">
+                    <a:extLst>
+                      <a:ext uri="{FF2B5EF4-FFF2-40B4-BE49-F238E27FC236}">
+                        <a16:creationId xmlns:a16="http://schemas.microsoft.com/office/drawing/2014/main" id="{8D238736-2B58-4BA5-9519-03CA0F8DF0AA}"/>
+                      </a:ext>
+                    </a:extLst>
+                  </p:cNvPr>
+                  <p:cNvSpPr/>
+                  <p:nvPr/>
+                </p:nvSpPr>
+                <p:spPr>
+                  <a:xfrm>
+                    <a:off x="4759123" y="1585370"/>
+                    <a:ext cx="2546430" cy="839164"/>
+                  </a:xfrm>
+                  <a:prstGeom prst="cloud">
+                    <a:avLst/>
+                  </a:prstGeom>
+                </p:spPr>
+                <p:style>
+                  <a:lnRef idx="2">
+                    <a:schemeClr val="accent6"/>
+                  </a:lnRef>
+                  <a:fillRef idx="1">
+                    <a:schemeClr val="lt1"/>
+                  </a:fillRef>
+                  <a:effectRef idx="0">
+                    <a:schemeClr val="accent6"/>
+                  </a:effectRef>
+                  <a:fontRef idx="minor">
+                    <a:schemeClr val="dk1"/>
+                  </a:fontRef>
+                </p:style>
+                <p:txBody>
+                  <a:bodyPr rtlCol="0" anchor="ctr"/>
+                  <a:lstStyle/>
+                  <a:p>
+                    <a:pPr algn="ctr"/>
+                    <a:r>
+                      <a:rPr lang="en-GB" dirty="0"/>
+                      <a:t>Internet</a:t>
+                    </a:r>
+                  </a:p>
+                </p:txBody>
+              </p:sp>
+              <p:sp>
+                <p:nvSpPr>
+                  <p:cNvPr id="11" name="Oval 10">
+                    <a:extLst>
+                      <a:ext uri="{FF2B5EF4-FFF2-40B4-BE49-F238E27FC236}">
+                        <a16:creationId xmlns:a16="http://schemas.microsoft.com/office/drawing/2014/main" id="{3AF510E9-77C9-472B-B661-620D85DAF973}"/>
+                      </a:ext>
+                    </a:extLst>
+                  </p:cNvPr>
+                  <p:cNvSpPr/>
+                  <p:nvPr/>
+                </p:nvSpPr>
+                <p:spPr>
+                  <a:xfrm>
+                    <a:off x="7874641" y="765858"/>
+                    <a:ext cx="2395959" cy="816015"/>
+                  </a:xfrm>
+                  <a:prstGeom prst="ellipse">
+                    <a:avLst/>
+                  </a:prstGeom>
+                </p:spPr>
+                <p:style>
+                  <a:lnRef idx="2">
+                    <a:schemeClr val="accent6"/>
+                  </a:lnRef>
+                  <a:fillRef idx="1">
+                    <a:schemeClr val="lt1"/>
+                  </a:fillRef>
+                  <a:effectRef idx="0">
+                    <a:schemeClr val="accent6"/>
+                  </a:effectRef>
+                  <a:fontRef idx="minor">
+                    <a:schemeClr val="dk1"/>
+                  </a:fontRef>
+                </p:style>
+                <p:txBody>
+                  <a:bodyPr rtlCol="0" anchor="ctr"/>
+                  <a:lstStyle/>
+                  <a:p>
+                    <a:pPr algn="ctr"/>
+                    <a:r>
+                      <a:rPr lang="en-GB" dirty="0"/>
+                      <a:t>Philips Server</a:t>
+                    </a:r>
+                  </a:p>
+                </p:txBody>
+              </p:sp>
+              <p:sp>
+                <p:nvSpPr>
+                  <p:cNvPr id="12" name="Oval 11">
+                    <a:extLst>
+                      <a:ext uri="{FF2B5EF4-FFF2-40B4-BE49-F238E27FC236}">
+                        <a16:creationId xmlns:a16="http://schemas.microsoft.com/office/drawing/2014/main" id="{8636D07F-7482-484C-AFD0-624FE1B670AA}"/>
+                      </a:ext>
+                    </a:extLst>
+                  </p:cNvPr>
+                  <p:cNvSpPr/>
+                  <p:nvPr/>
+                </p:nvSpPr>
+                <p:spPr>
+                  <a:xfrm>
+                    <a:off x="4834359" y="181338"/>
+                    <a:ext cx="2395959" cy="816015"/>
+                  </a:xfrm>
+                  <a:prstGeom prst="ellipse">
+                    <a:avLst/>
+                  </a:prstGeom>
+                </p:spPr>
+                <p:style>
+                  <a:lnRef idx="2">
+                    <a:schemeClr val="accent6"/>
+                  </a:lnRef>
+                  <a:fillRef idx="1">
+                    <a:schemeClr val="lt1"/>
+                  </a:fillRef>
+                  <a:effectRef idx="0">
+                    <a:schemeClr val="accent6"/>
+                  </a:effectRef>
+                  <a:fontRef idx="minor">
+                    <a:schemeClr val="dk1"/>
+                  </a:fontRef>
+                </p:style>
+                <p:txBody>
+                  <a:bodyPr rtlCol="0" anchor="ctr"/>
+                  <a:lstStyle/>
+                  <a:p>
+                    <a:pPr algn="ctr"/>
+                    <a:r>
+                      <a:rPr lang="en-GB" dirty="0"/>
+                      <a:t>Amazon Server</a:t>
+                    </a:r>
+                  </a:p>
+                </p:txBody>
+              </p:sp>
+              <p:sp>
+                <p:nvSpPr>
+                  <p:cNvPr id="13" name="Oval 12">
+                    <a:extLst>
+                      <a:ext uri="{FF2B5EF4-FFF2-40B4-BE49-F238E27FC236}">
+                        <a16:creationId xmlns:a16="http://schemas.microsoft.com/office/drawing/2014/main" id="{4B0FC3E4-9AD6-48F9-A7A2-0C2DA83A6EB0}"/>
+                      </a:ext>
+                    </a:extLst>
+                  </p:cNvPr>
+                  <p:cNvSpPr/>
+                  <p:nvPr/>
+                </p:nvSpPr>
+                <p:spPr>
+                  <a:xfrm>
+                    <a:off x="1794077" y="765858"/>
+                    <a:ext cx="2395959" cy="816015"/>
+                  </a:xfrm>
+                  <a:prstGeom prst="ellipse">
+                    <a:avLst/>
+                  </a:prstGeom>
+                </p:spPr>
+                <p:style>
+                  <a:lnRef idx="2">
+                    <a:schemeClr val="accent6"/>
+                  </a:lnRef>
+                  <a:fillRef idx="1">
+                    <a:schemeClr val="lt1"/>
+                  </a:fillRef>
+                  <a:effectRef idx="0">
+                    <a:schemeClr val="accent6"/>
+                  </a:effectRef>
+                  <a:fontRef idx="minor">
+                    <a:schemeClr val="dk1"/>
+                  </a:fontRef>
+                </p:style>
+                <p:txBody>
+                  <a:bodyPr rtlCol="0" anchor="ctr"/>
+                  <a:lstStyle/>
+                  <a:p>
+                    <a:pPr algn="ctr"/>
+                    <a:r>
+                      <a:rPr lang="en-GB" dirty="0"/>
+                      <a:t>Matrix Server</a:t>
+                    </a:r>
+                  </a:p>
+                </p:txBody>
+              </p:sp>
+              <p:sp>
+                <p:nvSpPr>
+                  <p:cNvPr id="19" name="Cube 18">
+                    <a:extLst>
+                      <a:ext uri="{FF2B5EF4-FFF2-40B4-BE49-F238E27FC236}">
+                        <a16:creationId xmlns:a16="http://schemas.microsoft.com/office/drawing/2014/main" id="{2373B1D0-7779-44B0-BD02-B88CABA3CD93}"/>
+                      </a:ext>
+                    </a:extLst>
+                  </p:cNvPr>
+                  <p:cNvSpPr/>
+                  <p:nvPr/>
+                </p:nvSpPr>
+                <p:spPr>
+                  <a:xfrm>
+                    <a:off x="5404411" y="3985428"/>
+                    <a:ext cx="1689903" cy="2574404"/>
+                  </a:xfrm>
+                  <a:prstGeom prst="cube">
+                    <a:avLst/>
+                  </a:prstGeom>
+                </p:spPr>
+                <p:style>
+                  <a:lnRef idx="2">
+                    <a:schemeClr val="accent6"/>
+                  </a:lnRef>
+                  <a:fillRef idx="1">
+                    <a:schemeClr val="lt1"/>
+                  </a:fillRef>
+                  <a:effectRef idx="0">
+                    <a:schemeClr val="accent6"/>
+                  </a:effectRef>
+                  <a:fontRef idx="minor">
+                    <a:schemeClr val="dk1"/>
+                  </a:fontRef>
+                </p:style>
+                <p:txBody>
+                  <a:bodyPr rtlCol="0" anchor="ctr"/>
+                  <a:lstStyle/>
+                  <a:p>
+                    <a:pPr algn="ctr"/>
+                    <a:r>
+                      <a:rPr lang="en-GB" dirty="0" err="1"/>
+                      <a:t>Fritzbox</a:t>
+                    </a:r>
+                    <a:endParaRPr lang="en-GB" dirty="0"/>
+                  </a:p>
+                </p:txBody>
+              </p:sp>
+              <p:sp>
+                <p:nvSpPr>
+                  <p:cNvPr id="21" name="Flowchart: Summing Junction 20">
+                    <a:extLst>
+                      <a:ext uri="{FF2B5EF4-FFF2-40B4-BE49-F238E27FC236}">
+                        <a16:creationId xmlns:a16="http://schemas.microsoft.com/office/drawing/2014/main" id="{58FCF32B-D492-4963-AFA5-D69842CABFA0}"/>
+                      </a:ext>
+                    </a:extLst>
+                  </p:cNvPr>
+                  <p:cNvSpPr/>
+                  <p:nvPr/>
+                </p:nvSpPr>
+                <p:spPr>
+                  <a:xfrm>
+                    <a:off x="5774800" y="4560590"/>
+                    <a:ext cx="474562" cy="408008"/>
+                  </a:xfrm>
+                  <a:prstGeom prst="flowChartSummingJunction">
+                    <a:avLst/>
+                  </a:prstGeom>
+                </p:spPr>
+                <p:style>
+                  <a:lnRef idx="2">
+                    <a:schemeClr val="accent6"/>
+                  </a:lnRef>
+                  <a:fillRef idx="1">
+                    <a:schemeClr val="lt1"/>
+                  </a:fillRef>
+                  <a:effectRef idx="0">
+                    <a:schemeClr val="accent6"/>
+                  </a:effectRef>
+                  <a:fontRef idx="minor">
+                    <a:schemeClr val="dk1"/>
+                  </a:fontRef>
+                </p:style>
+                <p:txBody>
+                  <a:bodyPr rtlCol="0" anchor="ctr"/>
+                  <a:lstStyle/>
+                  <a:p>
+                    <a:pPr algn="ctr"/>
+                    <a:endParaRPr lang="en-GB"/>
+                  </a:p>
+                </p:txBody>
+              </p:sp>
+              <p:sp>
+                <p:nvSpPr>
+                  <p:cNvPr id="22" name="Flowchart: Terminator 21">
+                    <a:extLst>
+                      <a:ext uri="{FF2B5EF4-FFF2-40B4-BE49-F238E27FC236}">
+                        <a16:creationId xmlns:a16="http://schemas.microsoft.com/office/drawing/2014/main" id="{763B7A8C-5F38-467A-8EE0-1563F9802723}"/>
+                      </a:ext>
+                    </a:extLst>
+                  </p:cNvPr>
+                  <p:cNvSpPr/>
+                  <p:nvPr/>
+                </p:nvSpPr>
+                <p:spPr>
+                  <a:xfrm>
+                    <a:off x="1149743" y="4346055"/>
+                    <a:ext cx="2118167" cy="301752"/>
+                  </a:xfrm>
+                  <a:prstGeom prst="flowChartTerminator">
+                    <a:avLst/>
+                  </a:prstGeom>
+                </p:spPr>
+                <p:style>
+                  <a:lnRef idx="2">
+                    <a:schemeClr val="accent6"/>
+                  </a:lnRef>
+                  <a:fillRef idx="1">
+                    <a:schemeClr val="lt1"/>
+                  </a:fillRef>
+                  <a:effectRef idx="0">
+                    <a:schemeClr val="accent6"/>
+                  </a:effectRef>
+                  <a:fontRef idx="minor">
+                    <a:schemeClr val="dk1"/>
+                  </a:fontRef>
+                </p:style>
+                <p:txBody>
+                  <a:bodyPr rtlCol="0" anchor="ctr"/>
+                  <a:lstStyle/>
+                  <a:p>
+                    <a:pPr algn="ctr"/>
+                    <a:r>
+                      <a:rPr lang="en-GB" dirty="0"/>
+                      <a:t>Alexa</a:t>
+                    </a:r>
+                  </a:p>
+                </p:txBody>
+              </p:sp>
+              <p:sp>
+                <p:nvSpPr>
+                  <p:cNvPr id="23" name="Rectangle: Rounded Corners 22">
+                    <a:extLst>
+                      <a:ext uri="{FF2B5EF4-FFF2-40B4-BE49-F238E27FC236}">
+                        <a16:creationId xmlns:a16="http://schemas.microsoft.com/office/drawing/2014/main" id="{653FB557-7DE7-442A-B3FD-3567CAC1EFC0}"/>
+                      </a:ext>
+                    </a:extLst>
+                  </p:cNvPr>
+                  <p:cNvSpPr/>
+                  <p:nvPr/>
+                </p:nvSpPr>
+                <p:spPr>
+                  <a:xfrm>
+                    <a:off x="1149745" y="4825725"/>
+                    <a:ext cx="1956121" cy="277792"/>
+                  </a:xfrm>
+                  <a:prstGeom prst="roundRect">
+                    <a:avLst/>
+                  </a:prstGeom>
+                </p:spPr>
+                <p:style>
+                  <a:lnRef idx="2">
+                    <a:schemeClr val="accent6"/>
+                  </a:lnRef>
+                  <a:fillRef idx="1">
+                    <a:schemeClr val="lt1"/>
+                  </a:fillRef>
+                  <a:effectRef idx="0">
+                    <a:schemeClr val="accent6"/>
+                  </a:effectRef>
+                  <a:fontRef idx="minor">
+                    <a:schemeClr val="dk1"/>
+                  </a:fontRef>
+                </p:style>
+                <p:txBody>
+                  <a:bodyPr rtlCol="0" anchor="ctr"/>
+                  <a:lstStyle/>
+                  <a:p>
+                    <a:pPr algn="ctr"/>
+                    <a:r>
+                      <a:rPr lang="en-GB" dirty="0"/>
+                      <a:t>Hue Bridge</a:t>
+                    </a:r>
+                  </a:p>
+                </p:txBody>
+              </p:sp>
+              <p:sp>
+                <p:nvSpPr>
+                  <p:cNvPr id="25" name="Rectangle: Rounded Corners 24">
+                    <a:extLst>
+                      <a:ext uri="{FF2B5EF4-FFF2-40B4-BE49-F238E27FC236}">
+                        <a16:creationId xmlns:a16="http://schemas.microsoft.com/office/drawing/2014/main" id="{342CBEE1-F589-4BD5-ACA7-7C8C2DE5DEF7}"/>
+                      </a:ext>
+                    </a:extLst>
+                  </p:cNvPr>
+                  <p:cNvSpPr/>
+                  <p:nvPr/>
+                </p:nvSpPr>
+                <p:spPr>
+                  <a:xfrm>
+                    <a:off x="1149743" y="6092142"/>
+                    <a:ext cx="1956121" cy="277792"/>
+                  </a:xfrm>
+                  <a:prstGeom prst="roundRect">
+                    <a:avLst/>
+                  </a:prstGeom>
+                </p:spPr>
+                <p:style>
+                  <a:lnRef idx="2">
+                    <a:schemeClr val="accent6"/>
+                  </a:lnRef>
+                  <a:fillRef idx="1">
+                    <a:schemeClr val="lt1"/>
+                  </a:fillRef>
+                  <a:effectRef idx="0">
+                    <a:schemeClr val="accent6"/>
+                  </a:effectRef>
+                  <a:fontRef idx="minor">
+                    <a:schemeClr val="dk1"/>
+                  </a:fontRef>
+                </p:style>
+                <p:txBody>
+                  <a:bodyPr rtlCol="0" anchor="ctr"/>
+                  <a:lstStyle/>
+                  <a:p>
+                    <a:pPr algn="ctr"/>
+                    <a:r>
+                      <a:rPr lang="en-GB" dirty="0"/>
+                      <a:t>Attacker (kali)</a:t>
+                    </a:r>
+                  </a:p>
+                </p:txBody>
+              </p:sp>
+              <p:sp>
+                <p:nvSpPr>
+                  <p:cNvPr id="26" name="Rectangle: Rounded Corners 25">
+                    <a:extLst>
+                      <a:ext uri="{FF2B5EF4-FFF2-40B4-BE49-F238E27FC236}">
+                        <a16:creationId xmlns:a16="http://schemas.microsoft.com/office/drawing/2014/main" id="{96D77390-C3D3-4EBB-9AC8-D1C63ED2B897}"/>
+                      </a:ext>
+                    </a:extLst>
+                  </p:cNvPr>
+                  <p:cNvSpPr/>
+                  <p:nvPr/>
+                </p:nvSpPr>
+                <p:spPr>
+                  <a:xfrm>
+                    <a:off x="1149744" y="5437455"/>
+                    <a:ext cx="1956121" cy="277792"/>
+                  </a:xfrm>
+                  <a:prstGeom prst="roundRect">
+                    <a:avLst/>
+                  </a:prstGeom>
+                </p:spPr>
+                <p:style>
+                  <a:lnRef idx="2">
+                    <a:schemeClr val="accent6"/>
+                  </a:lnRef>
+                  <a:fillRef idx="1">
+                    <a:schemeClr val="lt1"/>
+                  </a:fillRef>
+                  <a:effectRef idx="0">
+                    <a:schemeClr val="accent6"/>
+                  </a:effectRef>
+                  <a:fontRef idx="minor">
+                    <a:schemeClr val="dk1"/>
+                  </a:fontRef>
+                </p:style>
+                <p:txBody>
+                  <a:bodyPr rtlCol="0" anchor="ctr"/>
+                  <a:lstStyle/>
+                  <a:p>
+                    <a:pPr algn="ctr"/>
+                    <a:r>
+                      <a:rPr lang="en-GB" dirty="0"/>
+                      <a:t>Matrix</a:t>
+                    </a:r>
+                  </a:p>
+                </p:txBody>
+              </p:sp>
+              <p:cxnSp>
+                <p:nvCxnSpPr>
+                  <p:cNvPr id="53" name="Straight Arrow Connector 52">
+                    <a:extLst>
+                      <a:ext uri="{FF2B5EF4-FFF2-40B4-BE49-F238E27FC236}">
+                        <a16:creationId xmlns:a16="http://schemas.microsoft.com/office/drawing/2014/main" id="{EF95FFB5-64B1-4873-A549-FC028A2F6069}"/>
+                      </a:ext>
+                    </a:extLst>
+                  </p:cNvPr>
+                  <p:cNvCxnSpPr>
+                    <a:cxnSpLocks/>
+                    <a:stCxn id="13" idx="5"/>
+                    <a:endCxn id="4" idx="2"/>
+                  </p:cNvCxnSpPr>
+                  <p:nvPr/>
+                </p:nvCxnSpPr>
+                <p:spPr>
+                  <a:xfrm>
+                    <a:off x="3839156" y="1462370"/>
+                    <a:ext cx="927866" cy="542582"/>
+                  </a:xfrm>
+                  <a:prstGeom prst="straightConnector1">
+                    <a:avLst/>
+                  </a:prstGeom>
+                  <a:ln>
+                    <a:headEnd type="triangle"/>
+                    <a:tailEnd type="triangle"/>
+                  </a:ln>
+                </p:spPr>
+                <p:style>
+                  <a:lnRef idx="1">
+                    <a:schemeClr val="accent1"/>
+                  </a:lnRef>
+                  <a:fillRef idx="0">
+                    <a:schemeClr val="accent1"/>
+                  </a:fillRef>
+                  <a:effectRef idx="0">
+                    <a:schemeClr val="accent1"/>
+                  </a:effectRef>
+                  <a:fontRef idx="minor">
+                    <a:schemeClr val="tx1"/>
+                  </a:fontRef>
+                </p:style>
+              </p:cxnSp>
+              <p:cxnSp>
+                <p:nvCxnSpPr>
+                  <p:cNvPr id="55" name="Straight Arrow Connector 54">
+                    <a:extLst>
+                      <a:ext uri="{FF2B5EF4-FFF2-40B4-BE49-F238E27FC236}">
+                        <a16:creationId xmlns:a16="http://schemas.microsoft.com/office/drawing/2014/main" id="{75C876ED-30AF-48D2-8772-A7DD5C07DEF3}"/>
+                      </a:ext>
+                    </a:extLst>
+                  </p:cNvPr>
+                  <p:cNvCxnSpPr>
+                    <a:cxnSpLocks/>
+                    <a:stCxn id="12" idx="4"/>
+                    <a:endCxn id="4" idx="3"/>
+                  </p:cNvCxnSpPr>
+                  <p:nvPr/>
+                </p:nvCxnSpPr>
+                <p:spPr>
+                  <a:xfrm flipH="1">
+                    <a:off x="6032338" y="997353"/>
+                    <a:ext cx="1" cy="635997"/>
+                  </a:xfrm>
+                  <a:prstGeom prst="straightConnector1">
+                    <a:avLst/>
+                  </a:prstGeom>
+                  <a:ln>
+                    <a:headEnd type="triangle"/>
+                    <a:tailEnd type="triangle"/>
+                  </a:ln>
+                </p:spPr>
+                <p:style>
+                  <a:lnRef idx="1">
+                    <a:schemeClr val="accent1"/>
+                  </a:lnRef>
+                  <a:fillRef idx="0">
+                    <a:schemeClr val="accent1"/>
+                  </a:fillRef>
+                  <a:effectRef idx="0">
+                    <a:schemeClr val="accent1"/>
+                  </a:effectRef>
+                  <a:fontRef idx="minor">
+                    <a:schemeClr val="tx1"/>
+                  </a:fontRef>
+                </p:style>
+              </p:cxnSp>
+              <p:cxnSp>
+                <p:nvCxnSpPr>
+                  <p:cNvPr id="56" name="Straight Arrow Connector 55">
+                    <a:extLst>
+                      <a:ext uri="{FF2B5EF4-FFF2-40B4-BE49-F238E27FC236}">
+                        <a16:creationId xmlns:a16="http://schemas.microsoft.com/office/drawing/2014/main" id="{65F9DE36-3B57-4CEF-B9FE-FC4BCD1B88A8}"/>
+                      </a:ext>
+                    </a:extLst>
+                  </p:cNvPr>
+                  <p:cNvCxnSpPr>
+                    <a:cxnSpLocks/>
+                    <a:stCxn id="11" idx="3"/>
+                    <a:endCxn id="4" idx="0"/>
+                  </p:cNvCxnSpPr>
+                  <p:nvPr/>
+                </p:nvCxnSpPr>
+                <p:spPr>
+                  <a:xfrm flipH="1">
+                    <a:off x="7303431" y="1462370"/>
+                    <a:ext cx="922090" cy="542582"/>
+                  </a:xfrm>
+                  <a:prstGeom prst="straightConnector1">
+                    <a:avLst/>
+                  </a:prstGeom>
+                  <a:ln>
+                    <a:headEnd type="triangle"/>
+                    <a:tailEnd type="triangle"/>
+                  </a:ln>
+                </p:spPr>
+                <p:style>
+                  <a:lnRef idx="1">
+                    <a:schemeClr val="accent1"/>
+                  </a:lnRef>
+                  <a:fillRef idx="0">
+                    <a:schemeClr val="accent1"/>
+                  </a:fillRef>
+                  <a:effectRef idx="0">
+                    <a:schemeClr val="accent1"/>
+                  </a:effectRef>
+                  <a:fontRef idx="minor">
+                    <a:schemeClr val="tx1"/>
+                  </a:fontRef>
+                </p:style>
+              </p:cxnSp>
+              <p:cxnSp>
+                <p:nvCxnSpPr>
+                  <p:cNvPr id="67" name="Straight Arrow Connector 66">
+                    <a:extLst>
+                      <a:ext uri="{FF2B5EF4-FFF2-40B4-BE49-F238E27FC236}">
+                        <a16:creationId xmlns:a16="http://schemas.microsoft.com/office/drawing/2014/main" id="{5C166635-1072-4CD5-B7DF-80E2235F1ACF}"/>
+                      </a:ext>
+                    </a:extLst>
+                  </p:cNvPr>
+                  <p:cNvCxnSpPr>
+                    <a:cxnSpLocks/>
+                    <a:stCxn id="4" idx="1"/>
+                  </p:cNvCxnSpPr>
+                  <p:nvPr/>
+                </p:nvCxnSpPr>
+                <p:spPr>
+                  <a:xfrm>
+                    <a:off x="6032338" y="2423640"/>
+                    <a:ext cx="0" cy="660045"/>
+                  </a:xfrm>
+                  <a:prstGeom prst="straightConnector1">
+                    <a:avLst/>
+                  </a:prstGeom>
+                  <a:ln>
+                    <a:headEnd type="triangle"/>
+                    <a:tailEnd type="triangle"/>
+                  </a:ln>
+                </p:spPr>
+                <p:style>
+                  <a:lnRef idx="1">
+                    <a:schemeClr val="accent1"/>
+                  </a:lnRef>
+                  <a:fillRef idx="0">
+                    <a:schemeClr val="accent1"/>
+                  </a:fillRef>
+                  <a:effectRef idx="0">
+                    <a:schemeClr val="accent1"/>
+                  </a:effectRef>
+                  <a:fontRef idx="minor">
+                    <a:schemeClr val="tx1"/>
+                  </a:fontRef>
+                </p:style>
+              </p:cxnSp>
+              <p:cxnSp>
+                <p:nvCxnSpPr>
+                  <p:cNvPr id="70" name="Straight Arrow Connector 69">
+                    <a:extLst>
+                      <a:ext uri="{FF2B5EF4-FFF2-40B4-BE49-F238E27FC236}">
+                        <a16:creationId xmlns:a16="http://schemas.microsoft.com/office/drawing/2014/main" id="{13C1FE5B-D685-49B2-A0C4-455A0A98F942}"/>
+                      </a:ext>
+                    </a:extLst>
+                  </p:cNvPr>
+                  <p:cNvCxnSpPr>
+                    <a:cxnSpLocks/>
+                    <a:endCxn id="21" idx="0"/>
+                  </p:cNvCxnSpPr>
+                  <p:nvPr/>
+                </p:nvCxnSpPr>
+                <p:spPr>
+                  <a:xfrm flipH="1">
+                    <a:off x="6012081" y="3491693"/>
+                    <a:ext cx="20257" cy="1068897"/>
+                  </a:xfrm>
+                  <a:prstGeom prst="straightConnector1">
+                    <a:avLst/>
+                  </a:prstGeom>
+                  <a:ln>
+                    <a:headEnd type="triangle"/>
+                    <a:tailEnd type="triangle"/>
+                  </a:ln>
+                </p:spPr>
+                <p:style>
+                  <a:lnRef idx="1">
+                    <a:schemeClr val="accent1"/>
+                  </a:lnRef>
+                  <a:fillRef idx="0">
+                    <a:schemeClr val="accent1"/>
+                  </a:fillRef>
+                  <a:effectRef idx="0">
+                    <a:schemeClr val="accent1"/>
+                  </a:effectRef>
+                  <a:fontRef idx="minor">
+                    <a:schemeClr val="tx1"/>
+                  </a:fontRef>
+                </p:style>
+              </p:cxnSp>
+              <p:cxnSp>
+                <p:nvCxnSpPr>
+                  <p:cNvPr id="101" name="Straight Arrow Connector 100">
+                    <a:extLst>
+                      <a:ext uri="{FF2B5EF4-FFF2-40B4-BE49-F238E27FC236}">
+                        <a16:creationId xmlns:a16="http://schemas.microsoft.com/office/drawing/2014/main" id="{EB46E354-2AF9-4964-A07E-D81BDF1019FA}"/>
+                      </a:ext>
+                    </a:extLst>
+                  </p:cNvPr>
+                  <p:cNvCxnSpPr>
+                    <a:cxnSpLocks/>
+                    <a:endCxn id="26" idx="3"/>
+                  </p:cNvCxnSpPr>
+                  <p:nvPr/>
+                </p:nvCxnSpPr>
+                <p:spPr>
+                  <a:xfrm flipH="1">
+                    <a:off x="3105865" y="5561635"/>
+                    <a:ext cx="2351116" cy="14716"/>
+                  </a:xfrm>
+                  <a:prstGeom prst="straightConnector1">
+                    <a:avLst/>
+                  </a:prstGeom>
+                  <a:ln>
+                    <a:tailEnd type="triangle"/>
+                  </a:ln>
+                </p:spPr>
+                <p:style>
+                  <a:lnRef idx="1">
+                    <a:schemeClr val="accent1"/>
+                  </a:lnRef>
+                  <a:fillRef idx="0">
+                    <a:schemeClr val="accent1"/>
+                  </a:fillRef>
+                  <a:effectRef idx="0">
+                    <a:schemeClr val="accent1"/>
+                  </a:effectRef>
+                  <a:fontRef idx="minor">
+                    <a:schemeClr val="tx1"/>
+                  </a:fontRef>
+                </p:style>
+              </p:cxnSp>
+              <p:cxnSp>
+                <p:nvCxnSpPr>
+                  <p:cNvPr id="122" name="Straight Arrow Connector 121">
+                    <a:extLst>
+                      <a:ext uri="{FF2B5EF4-FFF2-40B4-BE49-F238E27FC236}">
+                        <a16:creationId xmlns:a16="http://schemas.microsoft.com/office/drawing/2014/main" id="{25057D90-86A8-463C-95B3-77631B41493B}"/>
+                      </a:ext>
+                    </a:extLst>
+                  </p:cNvPr>
+                  <p:cNvCxnSpPr>
+                    <a:cxnSpLocks/>
+                  </p:cNvCxnSpPr>
+                  <p:nvPr/>
+                </p:nvCxnSpPr>
+                <p:spPr>
+                  <a:xfrm flipH="1">
+                    <a:off x="3127531" y="6216322"/>
+                    <a:ext cx="2351116" cy="14716"/>
+                  </a:xfrm>
+                  <a:prstGeom prst="straightConnector1">
+                    <a:avLst/>
+                  </a:prstGeom>
+                  <a:ln>
+                    <a:tailEnd type="triangle"/>
+                  </a:ln>
+                </p:spPr>
+                <p:style>
+                  <a:lnRef idx="1">
+                    <a:schemeClr val="accent1"/>
+                  </a:lnRef>
+                  <a:fillRef idx="0">
+                    <a:schemeClr val="accent1"/>
+                  </a:fillRef>
+                  <a:effectRef idx="0">
+                    <a:schemeClr val="accent1"/>
+                  </a:effectRef>
+                  <a:fontRef idx="minor">
+                    <a:schemeClr val="tx1"/>
+                  </a:fontRef>
+                </p:style>
+              </p:cxnSp>
+              <p:cxnSp>
+                <p:nvCxnSpPr>
+                  <p:cNvPr id="123" name="Straight Arrow Connector 122">
+                    <a:extLst>
+                      <a:ext uri="{FF2B5EF4-FFF2-40B4-BE49-F238E27FC236}">
+                        <a16:creationId xmlns:a16="http://schemas.microsoft.com/office/drawing/2014/main" id="{5BC68754-D831-4834-8659-DDF025CC19CF}"/>
+                      </a:ext>
+                    </a:extLst>
+                  </p:cNvPr>
+                  <p:cNvCxnSpPr>
+                    <a:cxnSpLocks/>
+                  </p:cNvCxnSpPr>
+                  <p:nvPr/>
+                </p:nvCxnSpPr>
+                <p:spPr>
+                  <a:xfrm flipH="1">
+                    <a:off x="3127531" y="4949905"/>
+                    <a:ext cx="2351116" cy="14716"/>
+                  </a:xfrm>
+                  <a:prstGeom prst="straightConnector1">
+                    <a:avLst/>
+                  </a:prstGeom>
+                  <a:ln>
+                    <a:tailEnd type="triangle"/>
+                  </a:ln>
+                </p:spPr>
+                <p:style>
+                  <a:lnRef idx="1">
+                    <a:schemeClr val="accent1"/>
+                  </a:lnRef>
+                  <a:fillRef idx="0">
+                    <a:schemeClr val="accent1"/>
+                  </a:fillRef>
+                  <a:effectRef idx="0">
+                    <a:schemeClr val="accent1"/>
+                  </a:effectRef>
+                  <a:fontRef idx="minor">
+                    <a:schemeClr val="tx1"/>
+                  </a:fontRef>
+                </p:style>
+              </p:cxnSp>
+              <p:cxnSp>
+                <p:nvCxnSpPr>
+                  <p:cNvPr id="125" name="Straight Connector 124">
+                    <a:extLst>
+                      <a:ext uri="{FF2B5EF4-FFF2-40B4-BE49-F238E27FC236}">
+                        <a16:creationId xmlns:a16="http://schemas.microsoft.com/office/drawing/2014/main" id="{23022FD2-D11C-44BE-88D5-B678DAA7DD05}"/>
+                      </a:ext>
+                    </a:extLst>
+                  </p:cNvPr>
+                  <p:cNvCxnSpPr>
+                    <a:cxnSpLocks/>
+                  </p:cNvCxnSpPr>
+                  <p:nvPr/>
+                </p:nvCxnSpPr>
+                <p:spPr>
+                  <a:xfrm>
+                    <a:off x="5456981" y="4470520"/>
+                    <a:ext cx="21666" cy="1745802"/>
+                  </a:xfrm>
+                  <a:prstGeom prst="line">
+                    <a:avLst/>
+                  </a:prstGeom>
+                </p:spPr>
+                <p:style>
+                  <a:lnRef idx="1">
+                    <a:schemeClr val="accent1"/>
+                  </a:lnRef>
+                  <a:fillRef idx="0">
+                    <a:schemeClr val="accent1"/>
+                  </a:fillRef>
+                  <a:effectRef idx="0">
+                    <a:schemeClr val="accent1"/>
+                  </a:effectRef>
+                  <a:fontRef idx="minor">
+                    <a:schemeClr val="tx1"/>
+                  </a:fontRef>
+                </p:style>
+              </p:cxnSp>
+              <p:pic>
+                <p:nvPicPr>
+                  <p:cNvPr id="127" name="Graphic 126" descr="Wireless router">
+                    <a:extLst>
+                      <a:ext uri="{FF2B5EF4-FFF2-40B4-BE49-F238E27FC236}">
+                        <a16:creationId xmlns:a16="http://schemas.microsoft.com/office/drawing/2014/main" id="{FB394D5C-4FE4-44F6-A121-C3A259E17941}"/>
+                      </a:ext>
+                    </a:extLst>
+                  </p:cNvPr>
+                  <p:cNvPicPr>
+                    <a:picLocks noChangeAspect="1"/>
+                  </p:cNvPicPr>
+                  <p:nvPr/>
+                </p:nvPicPr>
+                <p:blipFill>
+                  <a:blip r:embed="rId2">
+                    <a:extLst>
+                      <a:ext uri="{28A0092B-C50C-407E-A947-70E740481C1C}">
+                        <a14:useLocalDpi xmlns:a14="http://schemas.microsoft.com/office/drawing/2010/main" val="0"/>
+                      </a:ext>
+                      <a:ext uri="{96DAC541-7B7A-43D3-8B79-37D633B846F1}">
+                        <asvg:svgBlip xmlns:asvg="http://schemas.microsoft.com/office/drawing/2016/SVG/main" r:embed="rId3"/>
+                      </a:ext>
+                    </a:extLst>
+                  </a:blip>
+                  <a:stretch>
+                    <a:fillRect/>
+                  </a:stretch>
+                </p:blipFill>
+                <p:spPr>
+                  <a:xfrm>
+                    <a:off x="5575137" y="5634942"/>
+                    <a:ext cx="914400" cy="914400"/>
+                  </a:xfrm>
+                  <a:prstGeom prst="rect">
+                    <a:avLst/>
+                  </a:prstGeom>
+                </p:spPr>
+              </p:pic>
+              <p:pic>
+                <p:nvPicPr>
+                  <p:cNvPr id="129" name="Graphic 128" descr="Laptop">
+                    <a:extLst>
+                      <a:ext uri="{FF2B5EF4-FFF2-40B4-BE49-F238E27FC236}">
+                        <a16:creationId xmlns:a16="http://schemas.microsoft.com/office/drawing/2014/main" id="{9246BC7C-EE10-4CBF-8CBC-862CCFB0864A}"/>
+                      </a:ext>
+                    </a:extLst>
+                  </p:cNvPr>
+                  <p:cNvPicPr>
+                    <a:picLocks noChangeAspect="1"/>
+                  </p:cNvPicPr>
+                  <p:nvPr/>
+                </p:nvPicPr>
+                <p:blipFill>
+                  <a:blip r:embed="rId4">
+                    <a:extLst>
+                      <a:ext uri="{28A0092B-C50C-407E-A947-70E740481C1C}">
+                        <a14:useLocalDpi xmlns:a14="http://schemas.microsoft.com/office/drawing/2010/main" val="0"/>
+                      </a:ext>
+                      <a:ext uri="{96DAC541-7B7A-43D3-8B79-37D633B846F1}">
+                        <asvg:svgBlip xmlns:asvg="http://schemas.microsoft.com/office/drawing/2016/SVG/main" r:embed="rId5"/>
+                      </a:ext>
+                    </a:extLst>
+                  </a:blip>
+                  <a:stretch>
+                    <a:fillRect/>
+                  </a:stretch>
+                </p:blipFill>
+                <p:spPr>
+                  <a:xfrm>
+                    <a:off x="6315918" y="2827757"/>
+                    <a:ext cx="914400" cy="914400"/>
+                  </a:xfrm>
+                  <a:prstGeom prst="rect">
+                    <a:avLst/>
+                  </a:prstGeom>
+                </p:spPr>
+              </p:pic>
+              <p:pic>
+                <p:nvPicPr>
+                  <p:cNvPr id="131" name="Graphic 130" descr="Database">
+                    <a:extLst>
+                      <a:ext uri="{FF2B5EF4-FFF2-40B4-BE49-F238E27FC236}">
+                        <a16:creationId xmlns:a16="http://schemas.microsoft.com/office/drawing/2014/main" id="{360E79A8-EB00-4F3C-A01C-8CEDB89BB82F}"/>
+                      </a:ext>
+                    </a:extLst>
+                  </p:cNvPr>
+                  <p:cNvPicPr>
+                    <a:picLocks noChangeAspect="1"/>
+                  </p:cNvPicPr>
+                  <p:nvPr/>
+                </p:nvPicPr>
+                <p:blipFill>
+                  <a:blip r:embed="rId6">
+                    <a:extLst>
+                      <a:ext uri="{28A0092B-C50C-407E-A947-70E740481C1C}">
+                        <a14:useLocalDpi xmlns:a14="http://schemas.microsoft.com/office/drawing/2010/main" val="0"/>
+                      </a:ext>
+                      <a:ext uri="{96DAC541-7B7A-43D3-8B79-37D633B846F1}">
+                        <asvg:svgBlip xmlns:asvg="http://schemas.microsoft.com/office/drawing/2016/SVG/main" r:embed="rId7"/>
+                      </a:ext>
+                    </a:extLst>
+                  </a:blip>
+                  <a:stretch>
+                    <a:fillRect/>
+                  </a:stretch>
+                </p:blipFill>
+                <p:spPr>
+                  <a:xfrm>
+                    <a:off x="10120600" y="718950"/>
+                    <a:ext cx="914400" cy="914400"/>
+                  </a:xfrm>
+                  <a:prstGeom prst="rect">
+                    <a:avLst/>
+                  </a:prstGeom>
+                </p:spPr>
+              </p:pic>
+              <p:pic>
+                <p:nvPicPr>
+                  <p:cNvPr id="132" name="Graphic 131" descr="Database">
+                    <a:extLst>
+                      <a:ext uri="{FF2B5EF4-FFF2-40B4-BE49-F238E27FC236}">
+                        <a16:creationId xmlns:a16="http://schemas.microsoft.com/office/drawing/2014/main" id="{D4E1A11C-AB7B-4DA3-9B94-CCF1A17C8E3F}"/>
+                      </a:ext>
+                    </a:extLst>
+                  </p:cNvPr>
+                  <p:cNvPicPr>
+                    <a:picLocks noChangeAspect="1"/>
+                  </p:cNvPicPr>
+                  <p:nvPr/>
+                </p:nvPicPr>
+                <p:blipFill>
+                  <a:blip r:embed="rId6">
+                    <a:extLst>
+                      <a:ext uri="{28A0092B-C50C-407E-A947-70E740481C1C}">
+                        <a14:useLocalDpi xmlns:a14="http://schemas.microsoft.com/office/drawing/2010/main" val="0"/>
+                      </a:ext>
+                      <a:ext uri="{96DAC541-7B7A-43D3-8B79-37D633B846F1}">
+                        <asvg:svgBlip xmlns:asvg="http://schemas.microsoft.com/office/drawing/2016/SVG/main" r:embed="rId7"/>
+                      </a:ext>
+                    </a:extLst>
+                  </a:blip>
+                  <a:stretch>
+                    <a:fillRect/>
+                  </a:stretch>
+                </p:blipFill>
+                <p:spPr>
+                  <a:xfrm>
+                    <a:off x="7080318" y="137462"/>
+                    <a:ext cx="914400" cy="914400"/>
+                  </a:xfrm>
+                  <a:prstGeom prst="rect">
+                    <a:avLst/>
+                  </a:prstGeom>
+                </p:spPr>
+              </p:pic>
+              <p:pic>
+                <p:nvPicPr>
+                  <p:cNvPr id="133" name="Graphic 132" descr="Database">
+                    <a:extLst>
+                      <a:ext uri="{FF2B5EF4-FFF2-40B4-BE49-F238E27FC236}">
+                        <a16:creationId xmlns:a16="http://schemas.microsoft.com/office/drawing/2014/main" id="{10062861-0CF8-4DF8-9C89-C32493F1404A}"/>
+                      </a:ext>
+                    </a:extLst>
+                  </p:cNvPr>
+                  <p:cNvPicPr>
+                    <a:picLocks noChangeAspect="1"/>
+                  </p:cNvPicPr>
+                  <p:nvPr/>
+                </p:nvPicPr>
+                <p:blipFill>
+                  <a:blip r:embed="rId6">
+                    <a:extLst>
+                      <a:ext uri="{28A0092B-C50C-407E-A947-70E740481C1C}">
+                        <a14:useLocalDpi xmlns:a14="http://schemas.microsoft.com/office/drawing/2010/main" val="0"/>
+                      </a:ext>
+                      <a:ext uri="{96DAC541-7B7A-43D3-8B79-37D633B846F1}">
+                        <asvg:svgBlip xmlns:asvg="http://schemas.microsoft.com/office/drawing/2016/SVG/main" r:embed="rId7"/>
+                      </a:ext>
+                    </a:extLst>
+                  </a:blip>
+                  <a:stretch>
+                    <a:fillRect/>
+                  </a:stretch>
+                </p:blipFill>
+                <p:spPr>
+                  <a:xfrm>
+                    <a:off x="4025192" y="716665"/>
+                    <a:ext cx="914400" cy="914400"/>
+                  </a:xfrm>
+                  <a:prstGeom prst="rect">
+                    <a:avLst/>
+                  </a:prstGeom>
+                </p:spPr>
+              </p:pic>
+            </p:grpSp>
             <p:sp>
               <p:nvSpPr>
-                <p:cNvPr id="4" name="Cloud 3">
+                <p:cNvPr id="149" name="Flowchart: Summing Junction 148">
                   <a:extLst>
                     <a:ext uri="{FF2B5EF4-FFF2-40B4-BE49-F238E27FC236}">
-                      <a16:creationId xmlns:a16="http://schemas.microsoft.com/office/drawing/2014/main" id="{8D238736-2B58-4BA5-9519-03CA0F8DF0AA}"/>
+                      <a16:creationId xmlns:a16="http://schemas.microsoft.com/office/drawing/2014/main" id="{1EBE6096-29D4-49F6-B674-7B7C283C2C35}"/>
                     </a:ext>
                   </a:extLst>
                 </p:cNvPr>
@@ -3953,243 +5908,7 @@
               </p:nvSpPr>
               <p:spPr>
                 <a:xfrm>
-                  <a:off x="4759123" y="1585370"/>
-                  <a:ext cx="2546430" cy="839164"/>
-                </a:xfrm>
-                <a:prstGeom prst="cloud">
-                  <a:avLst/>
-                </a:prstGeom>
-              </p:spPr>
-              <p:style>
-                <a:lnRef idx="2">
-                  <a:schemeClr val="accent6"/>
-                </a:lnRef>
-                <a:fillRef idx="1">
-                  <a:schemeClr val="lt1"/>
-                </a:fillRef>
-                <a:effectRef idx="0">
-                  <a:schemeClr val="accent6"/>
-                </a:effectRef>
-                <a:fontRef idx="minor">
-                  <a:schemeClr val="dk1"/>
-                </a:fontRef>
-              </p:style>
-              <p:txBody>
-                <a:bodyPr rtlCol="0" anchor="ctr"/>
-                <a:lstStyle/>
-                <a:p>
-                  <a:pPr algn="ctr"/>
-                  <a:r>
-                    <a:rPr lang="en-GB" dirty="0"/>
-                    <a:t>Internet</a:t>
-                  </a:r>
-                </a:p>
-              </p:txBody>
-            </p:sp>
-            <p:sp>
-              <p:nvSpPr>
-                <p:cNvPr id="11" name="Oval 10">
-                  <a:extLst>
-                    <a:ext uri="{FF2B5EF4-FFF2-40B4-BE49-F238E27FC236}">
-                      <a16:creationId xmlns:a16="http://schemas.microsoft.com/office/drawing/2014/main" id="{3AF510E9-77C9-472B-B661-620D85DAF973}"/>
-                    </a:ext>
-                  </a:extLst>
-                </p:cNvPr>
-                <p:cNvSpPr/>
-                <p:nvPr/>
-              </p:nvSpPr>
-              <p:spPr>
-                <a:xfrm>
-                  <a:off x="7874641" y="765858"/>
-                  <a:ext cx="2395959" cy="816015"/>
-                </a:xfrm>
-                <a:prstGeom prst="ellipse">
-                  <a:avLst/>
-                </a:prstGeom>
-              </p:spPr>
-              <p:style>
-                <a:lnRef idx="2">
-                  <a:schemeClr val="accent6"/>
-                </a:lnRef>
-                <a:fillRef idx="1">
-                  <a:schemeClr val="lt1"/>
-                </a:fillRef>
-                <a:effectRef idx="0">
-                  <a:schemeClr val="accent6"/>
-                </a:effectRef>
-                <a:fontRef idx="minor">
-                  <a:schemeClr val="dk1"/>
-                </a:fontRef>
-              </p:style>
-              <p:txBody>
-                <a:bodyPr rtlCol="0" anchor="ctr"/>
-                <a:lstStyle/>
-                <a:p>
-                  <a:pPr algn="ctr"/>
-                  <a:r>
-                    <a:rPr lang="en-GB" dirty="0"/>
-                    <a:t>Philips Server</a:t>
-                  </a:r>
-                </a:p>
-              </p:txBody>
-            </p:sp>
-            <p:sp>
-              <p:nvSpPr>
-                <p:cNvPr id="12" name="Oval 11">
-                  <a:extLst>
-                    <a:ext uri="{FF2B5EF4-FFF2-40B4-BE49-F238E27FC236}">
-                      <a16:creationId xmlns:a16="http://schemas.microsoft.com/office/drawing/2014/main" id="{8636D07F-7482-484C-AFD0-624FE1B670AA}"/>
-                    </a:ext>
-                  </a:extLst>
-                </p:cNvPr>
-                <p:cNvSpPr/>
-                <p:nvPr/>
-              </p:nvSpPr>
-              <p:spPr>
-                <a:xfrm>
-                  <a:off x="4834359" y="181338"/>
-                  <a:ext cx="2395959" cy="816015"/>
-                </a:xfrm>
-                <a:prstGeom prst="ellipse">
-                  <a:avLst/>
-                </a:prstGeom>
-              </p:spPr>
-              <p:style>
-                <a:lnRef idx="2">
-                  <a:schemeClr val="accent6"/>
-                </a:lnRef>
-                <a:fillRef idx="1">
-                  <a:schemeClr val="lt1"/>
-                </a:fillRef>
-                <a:effectRef idx="0">
-                  <a:schemeClr val="accent6"/>
-                </a:effectRef>
-                <a:fontRef idx="minor">
-                  <a:schemeClr val="dk1"/>
-                </a:fontRef>
-              </p:style>
-              <p:txBody>
-                <a:bodyPr rtlCol="0" anchor="ctr"/>
-                <a:lstStyle/>
-                <a:p>
-                  <a:pPr algn="ctr"/>
-                  <a:r>
-                    <a:rPr lang="en-GB" dirty="0"/>
-                    <a:t>Amazon Server</a:t>
-                  </a:r>
-                </a:p>
-              </p:txBody>
-            </p:sp>
-            <p:sp>
-              <p:nvSpPr>
-                <p:cNvPr id="13" name="Oval 12">
-                  <a:extLst>
-                    <a:ext uri="{FF2B5EF4-FFF2-40B4-BE49-F238E27FC236}">
-                      <a16:creationId xmlns:a16="http://schemas.microsoft.com/office/drawing/2014/main" id="{4B0FC3E4-9AD6-48F9-A7A2-0C2DA83A6EB0}"/>
-                    </a:ext>
-                  </a:extLst>
-                </p:cNvPr>
-                <p:cNvSpPr/>
-                <p:nvPr/>
-              </p:nvSpPr>
-              <p:spPr>
-                <a:xfrm>
-                  <a:off x="1794077" y="765858"/>
-                  <a:ext cx="2395959" cy="816015"/>
-                </a:xfrm>
-                <a:prstGeom prst="ellipse">
-                  <a:avLst/>
-                </a:prstGeom>
-              </p:spPr>
-              <p:style>
-                <a:lnRef idx="2">
-                  <a:schemeClr val="accent6"/>
-                </a:lnRef>
-                <a:fillRef idx="1">
-                  <a:schemeClr val="lt1"/>
-                </a:fillRef>
-                <a:effectRef idx="0">
-                  <a:schemeClr val="accent6"/>
-                </a:effectRef>
-                <a:fontRef idx="minor">
-                  <a:schemeClr val="dk1"/>
-                </a:fontRef>
-              </p:style>
-              <p:txBody>
-                <a:bodyPr rtlCol="0" anchor="ctr"/>
-                <a:lstStyle/>
-                <a:p>
-                  <a:pPr algn="ctr"/>
-                  <a:r>
-                    <a:rPr lang="en-GB" dirty="0"/>
-                    <a:t>Matrix Server</a:t>
-                  </a:r>
-                </a:p>
-              </p:txBody>
-            </p:sp>
-            <p:sp>
-              <p:nvSpPr>
-                <p:cNvPr id="19" name="Cube 18">
-                  <a:extLst>
-                    <a:ext uri="{FF2B5EF4-FFF2-40B4-BE49-F238E27FC236}">
-                      <a16:creationId xmlns:a16="http://schemas.microsoft.com/office/drawing/2014/main" id="{2373B1D0-7779-44B0-BD02-B88CABA3CD93}"/>
-                    </a:ext>
-                  </a:extLst>
-                </p:cNvPr>
-                <p:cNvSpPr/>
-                <p:nvPr/>
-              </p:nvSpPr>
-              <p:spPr>
-                <a:xfrm>
-                  <a:off x="5404411" y="3985428"/>
-                  <a:ext cx="1689903" cy="2574404"/>
-                </a:xfrm>
-                <a:prstGeom prst="cube">
-                  <a:avLst/>
-                </a:prstGeom>
-              </p:spPr>
-              <p:style>
-                <a:lnRef idx="2">
-                  <a:schemeClr val="accent6"/>
-                </a:lnRef>
-                <a:fillRef idx="1">
-                  <a:schemeClr val="lt1"/>
-                </a:fillRef>
-                <a:effectRef idx="0">
-                  <a:schemeClr val="accent6"/>
-                </a:effectRef>
-                <a:fontRef idx="minor">
-                  <a:schemeClr val="dk1"/>
-                </a:fontRef>
-              </p:style>
-              <p:txBody>
-                <a:bodyPr rtlCol="0" anchor="ctr"/>
-                <a:lstStyle/>
-                <a:p>
-                  <a:pPr algn="ctr"/>
-                  <a:r>
-                    <a:rPr lang="en-GB" dirty="0" err="1"/>
-                    <a:t>Fritzbox</a:t>
-                  </a:r>
-                  <a:endParaRPr lang="en-GB" dirty="0"/>
-                </a:p>
-              </p:txBody>
-            </p:sp>
-            <p:sp>
-              <p:nvSpPr>
-                <p:cNvPr id="21" name="Flowchart: Summing Junction 20">
-                  <a:extLst>
-                    <a:ext uri="{FF2B5EF4-FFF2-40B4-BE49-F238E27FC236}">
-                      <a16:creationId xmlns:a16="http://schemas.microsoft.com/office/drawing/2014/main" id="{58FCF32B-D492-4963-AFA5-D69842CABFA0}"/>
-                    </a:ext>
-                  </a:extLst>
-                </p:cNvPr>
-                <p:cNvSpPr/>
-                <p:nvPr/>
-              </p:nvSpPr>
-              <p:spPr>
-                <a:xfrm>
-                  <a:off x="5774800" y="4560590"/>
+                  <a:off x="5795056" y="3090878"/>
                   <a:ext cx="474562" cy="408008"/>
                 </a:xfrm>
                 <a:prstGeom prst="flowChartSummingJunction">
@@ -4219,894 +5938,84 @@
                 </a:p>
               </p:txBody>
             </p:sp>
-            <p:sp>
-              <p:nvSpPr>
-                <p:cNvPr id="22" name="Flowchart: Terminator 21">
-                  <a:extLst>
-                    <a:ext uri="{FF2B5EF4-FFF2-40B4-BE49-F238E27FC236}">
-                      <a16:creationId xmlns:a16="http://schemas.microsoft.com/office/drawing/2014/main" id="{763B7A8C-5F38-467A-8EE0-1563F9802723}"/>
-                    </a:ext>
-                  </a:extLst>
-                </p:cNvPr>
-                <p:cNvSpPr/>
-                <p:nvPr/>
-              </p:nvSpPr>
-              <p:spPr>
-                <a:xfrm>
-                  <a:off x="1149751" y="4190035"/>
-                  <a:ext cx="2118167" cy="301752"/>
-                </a:xfrm>
-                <a:prstGeom prst="flowChartTerminator">
-                  <a:avLst/>
-                </a:prstGeom>
-              </p:spPr>
-              <p:style>
-                <a:lnRef idx="2">
-                  <a:schemeClr val="accent6"/>
-                </a:lnRef>
-                <a:fillRef idx="1">
-                  <a:schemeClr val="lt1"/>
-                </a:fillRef>
-                <a:effectRef idx="0">
-                  <a:schemeClr val="accent6"/>
-                </a:effectRef>
-                <a:fontRef idx="minor">
-                  <a:schemeClr val="dk1"/>
-                </a:fontRef>
-              </p:style>
-              <p:txBody>
-                <a:bodyPr rtlCol="0" anchor="ctr"/>
-                <a:lstStyle/>
-                <a:p>
-                  <a:pPr algn="ctr"/>
-                  <a:r>
-                    <a:rPr lang="en-GB" dirty="0"/>
-                    <a:t>Alexa</a:t>
-                  </a:r>
-                </a:p>
-              </p:txBody>
-            </p:sp>
-            <p:sp>
-              <p:nvSpPr>
-                <p:cNvPr id="23" name="Rectangle: Rounded Corners 22">
-                  <a:extLst>
-                    <a:ext uri="{FF2B5EF4-FFF2-40B4-BE49-F238E27FC236}">
-                      <a16:creationId xmlns:a16="http://schemas.microsoft.com/office/drawing/2014/main" id="{653FB557-7DE7-442A-B3FD-3567CAC1EFC0}"/>
-                    </a:ext>
-                  </a:extLst>
-                </p:cNvPr>
-                <p:cNvSpPr/>
-                <p:nvPr/>
-              </p:nvSpPr>
-              <p:spPr>
-                <a:xfrm>
-                  <a:off x="1149745" y="4825725"/>
-                  <a:ext cx="1956121" cy="277792"/>
-                </a:xfrm>
-                <a:prstGeom prst="roundRect">
-                  <a:avLst/>
-                </a:prstGeom>
-              </p:spPr>
-              <p:style>
-                <a:lnRef idx="2">
-                  <a:schemeClr val="accent6"/>
-                </a:lnRef>
-                <a:fillRef idx="1">
-                  <a:schemeClr val="lt1"/>
-                </a:fillRef>
-                <a:effectRef idx="0">
-                  <a:schemeClr val="accent6"/>
-                </a:effectRef>
-                <a:fontRef idx="minor">
-                  <a:schemeClr val="dk1"/>
-                </a:fontRef>
-              </p:style>
-              <p:txBody>
-                <a:bodyPr rtlCol="0" anchor="ctr"/>
-                <a:lstStyle/>
-                <a:p>
-                  <a:pPr algn="ctr"/>
-                  <a:r>
-                    <a:rPr lang="en-GB" dirty="0"/>
-                    <a:t>Hue Bridge</a:t>
-                  </a:r>
-                </a:p>
-              </p:txBody>
-            </p:sp>
-            <p:sp>
-              <p:nvSpPr>
-                <p:cNvPr id="25" name="Rectangle: Rounded Corners 24">
-                  <a:extLst>
-                    <a:ext uri="{FF2B5EF4-FFF2-40B4-BE49-F238E27FC236}">
-                      <a16:creationId xmlns:a16="http://schemas.microsoft.com/office/drawing/2014/main" id="{342CBEE1-F589-4BD5-ACA7-7C8C2DE5DEF7}"/>
-                    </a:ext>
-                  </a:extLst>
-                </p:cNvPr>
-                <p:cNvSpPr/>
-                <p:nvPr/>
-              </p:nvSpPr>
-              <p:spPr>
-                <a:xfrm>
-                  <a:off x="1149743" y="6092142"/>
-                  <a:ext cx="1956121" cy="277792"/>
-                </a:xfrm>
-                <a:prstGeom prst="roundRect">
-                  <a:avLst/>
-                </a:prstGeom>
-              </p:spPr>
-              <p:style>
-                <a:lnRef idx="2">
-                  <a:schemeClr val="accent6"/>
-                </a:lnRef>
-                <a:fillRef idx="1">
-                  <a:schemeClr val="lt1"/>
-                </a:fillRef>
-                <a:effectRef idx="0">
-                  <a:schemeClr val="accent6"/>
-                </a:effectRef>
-                <a:fontRef idx="minor">
-                  <a:schemeClr val="dk1"/>
-                </a:fontRef>
-              </p:style>
-              <p:txBody>
-                <a:bodyPr rtlCol="0" anchor="ctr"/>
-                <a:lstStyle/>
-                <a:p>
-                  <a:pPr algn="ctr"/>
-                  <a:r>
-                    <a:rPr lang="en-GB" dirty="0"/>
-                    <a:t>Attacker (kali)</a:t>
-                  </a:r>
-                </a:p>
-              </p:txBody>
-            </p:sp>
-            <p:sp>
-              <p:nvSpPr>
-                <p:cNvPr id="26" name="Rectangle: Rounded Corners 25">
-                  <a:extLst>
-                    <a:ext uri="{FF2B5EF4-FFF2-40B4-BE49-F238E27FC236}">
-                      <a16:creationId xmlns:a16="http://schemas.microsoft.com/office/drawing/2014/main" id="{96D77390-C3D3-4EBB-9AC8-D1C63ED2B897}"/>
-                    </a:ext>
-                  </a:extLst>
-                </p:cNvPr>
-                <p:cNvSpPr/>
-                <p:nvPr/>
-              </p:nvSpPr>
-              <p:spPr>
-                <a:xfrm>
-                  <a:off x="1149744" y="5437455"/>
-                  <a:ext cx="1956121" cy="277792"/>
-                </a:xfrm>
-                <a:prstGeom prst="roundRect">
-                  <a:avLst/>
-                </a:prstGeom>
-              </p:spPr>
-              <p:style>
-                <a:lnRef idx="2">
-                  <a:schemeClr val="accent6"/>
-                </a:lnRef>
-                <a:fillRef idx="1">
-                  <a:schemeClr val="lt1"/>
-                </a:fillRef>
-                <a:effectRef idx="0">
-                  <a:schemeClr val="accent6"/>
-                </a:effectRef>
-                <a:fontRef idx="minor">
-                  <a:schemeClr val="dk1"/>
-                </a:fontRef>
-              </p:style>
-              <p:txBody>
-                <a:bodyPr rtlCol="0" anchor="ctr"/>
-                <a:lstStyle/>
-                <a:p>
-                  <a:pPr algn="ctr"/>
-                  <a:r>
-                    <a:rPr lang="en-GB" dirty="0"/>
-                    <a:t>Matrix</a:t>
-                  </a:r>
-                </a:p>
-              </p:txBody>
-            </p:sp>
-            <p:cxnSp>
-              <p:nvCxnSpPr>
-                <p:cNvPr id="53" name="Straight Arrow Connector 52">
-                  <a:extLst>
-                    <a:ext uri="{FF2B5EF4-FFF2-40B4-BE49-F238E27FC236}">
-                      <a16:creationId xmlns:a16="http://schemas.microsoft.com/office/drawing/2014/main" id="{EF95FFB5-64B1-4873-A549-FC028A2F6069}"/>
-                    </a:ext>
-                  </a:extLst>
-                </p:cNvPr>
-                <p:cNvCxnSpPr>
-                  <a:cxnSpLocks/>
-                  <a:stCxn id="13" idx="5"/>
-                  <a:endCxn id="4" idx="2"/>
-                </p:cNvCxnSpPr>
-                <p:nvPr/>
-              </p:nvCxnSpPr>
-              <p:spPr>
-                <a:xfrm>
-                  <a:off x="3839156" y="1462370"/>
-                  <a:ext cx="927866" cy="542582"/>
-                </a:xfrm>
-                <a:prstGeom prst="straightConnector1">
-                  <a:avLst/>
-                </a:prstGeom>
-                <a:ln>
-                  <a:headEnd type="triangle"/>
-                  <a:tailEnd type="triangle"/>
-                </a:ln>
-              </p:spPr>
-              <p:style>
-                <a:lnRef idx="1">
-                  <a:schemeClr val="accent1"/>
-                </a:lnRef>
-                <a:fillRef idx="0">
-                  <a:schemeClr val="accent1"/>
-                </a:fillRef>
-                <a:effectRef idx="0">
-                  <a:schemeClr val="accent1"/>
-                </a:effectRef>
-                <a:fontRef idx="minor">
-                  <a:schemeClr val="tx1"/>
-                </a:fontRef>
-              </p:style>
-            </p:cxnSp>
-            <p:cxnSp>
-              <p:nvCxnSpPr>
-                <p:cNvPr id="55" name="Straight Arrow Connector 54">
-                  <a:extLst>
-                    <a:ext uri="{FF2B5EF4-FFF2-40B4-BE49-F238E27FC236}">
-                      <a16:creationId xmlns:a16="http://schemas.microsoft.com/office/drawing/2014/main" id="{75C876ED-30AF-48D2-8772-A7DD5C07DEF3}"/>
-                    </a:ext>
-                  </a:extLst>
-                </p:cNvPr>
-                <p:cNvCxnSpPr>
-                  <a:cxnSpLocks/>
-                  <a:stCxn id="12" idx="4"/>
-                  <a:endCxn id="4" idx="3"/>
-                </p:cNvCxnSpPr>
-                <p:nvPr/>
-              </p:nvCxnSpPr>
-              <p:spPr>
-                <a:xfrm flipH="1">
-                  <a:off x="6032338" y="997353"/>
-                  <a:ext cx="1" cy="635997"/>
-                </a:xfrm>
-                <a:prstGeom prst="straightConnector1">
-                  <a:avLst/>
-                </a:prstGeom>
-                <a:ln>
-                  <a:headEnd type="triangle"/>
-                  <a:tailEnd type="triangle"/>
-                </a:ln>
-              </p:spPr>
-              <p:style>
-                <a:lnRef idx="1">
-                  <a:schemeClr val="accent1"/>
-                </a:lnRef>
-                <a:fillRef idx="0">
-                  <a:schemeClr val="accent1"/>
-                </a:fillRef>
-                <a:effectRef idx="0">
-                  <a:schemeClr val="accent1"/>
-                </a:effectRef>
-                <a:fontRef idx="minor">
-                  <a:schemeClr val="tx1"/>
-                </a:fontRef>
-              </p:style>
-            </p:cxnSp>
-            <p:cxnSp>
-              <p:nvCxnSpPr>
-                <p:cNvPr id="56" name="Straight Arrow Connector 55">
-                  <a:extLst>
-                    <a:ext uri="{FF2B5EF4-FFF2-40B4-BE49-F238E27FC236}">
-                      <a16:creationId xmlns:a16="http://schemas.microsoft.com/office/drawing/2014/main" id="{65F9DE36-3B57-4CEF-B9FE-FC4BCD1B88A8}"/>
-                    </a:ext>
-                  </a:extLst>
-                </p:cNvPr>
-                <p:cNvCxnSpPr>
-                  <a:cxnSpLocks/>
-                  <a:stCxn id="11" idx="3"/>
-                  <a:endCxn id="4" idx="0"/>
-                </p:cNvCxnSpPr>
-                <p:nvPr/>
-              </p:nvCxnSpPr>
-              <p:spPr>
-                <a:xfrm flipH="1">
-                  <a:off x="7303431" y="1462370"/>
-                  <a:ext cx="922090" cy="542582"/>
-                </a:xfrm>
-                <a:prstGeom prst="straightConnector1">
-                  <a:avLst/>
-                </a:prstGeom>
-                <a:ln>
-                  <a:headEnd type="triangle"/>
-                  <a:tailEnd type="triangle"/>
-                </a:ln>
-              </p:spPr>
-              <p:style>
-                <a:lnRef idx="1">
-                  <a:schemeClr val="accent1"/>
-                </a:lnRef>
-                <a:fillRef idx="0">
-                  <a:schemeClr val="accent1"/>
-                </a:fillRef>
-                <a:effectRef idx="0">
-                  <a:schemeClr val="accent1"/>
-                </a:effectRef>
-                <a:fontRef idx="minor">
-                  <a:schemeClr val="tx1"/>
-                </a:fontRef>
-              </p:style>
-            </p:cxnSp>
-            <p:cxnSp>
-              <p:nvCxnSpPr>
-                <p:cNvPr id="67" name="Straight Arrow Connector 66">
-                  <a:extLst>
-                    <a:ext uri="{FF2B5EF4-FFF2-40B4-BE49-F238E27FC236}">
-                      <a16:creationId xmlns:a16="http://schemas.microsoft.com/office/drawing/2014/main" id="{5C166635-1072-4CD5-B7DF-80E2235F1ACF}"/>
-                    </a:ext>
-                  </a:extLst>
-                </p:cNvPr>
-                <p:cNvCxnSpPr>
-                  <a:cxnSpLocks/>
-                  <a:stCxn id="4" idx="1"/>
-                </p:cNvCxnSpPr>
-                <p:nvPr/>
-              </p:nvCxnSpPr>
-              <p:spPr>
-                <a:xfrm>
-                  <a:off x="6032338" y="2423640"/>
-                  <a:ext cx="0" cy="660045"/>
-                </a:xfrm>
-                <a:prstGeom prst="straightConnector1">
-                  <a:avLst/>
-                </a:prstGeom>
-                <a:ln>
-                  <a:headEnd type="triangle"/>
-                  <a:tailEnd type="triangle"/>
-                </a:ln>
-              </p:spPr>
-              <p:style>
-                <a:lnRef idx="1">
-                  <a:schemeClr val="accent1"/>
-                </a:lnRef>
-                <a:fillRef idx="0">
-                  <a:schemeClr val="accent1"/>
-                </a:fillRef>
-                <a:effectRef idx="0">
-                  <a:schemeClr val="accent1"/>
-                </a:effectRef>
-                <a:fontRef idx="minor">
-                  <a:schemeClr val="tx1"/>
-                </a:fontRef>
-              </p:style>
-            </p:cxnSp>
-            <p:cxnSp>
-              <p:nvCxnSpPr>
-                <p:cNvPr id="70" name="Straight Arrow Connector 69">
-                  <a:extLst>
-                    <a:ext uri="{FF2B5EF4-FFF2-40B4-BE49-F238E27FC236}">
-                      <a16:creationId xmlns:a16="http://schemas.microsoft.com/office/drawing/2014/main" id="{13C1FE5B-D685-49B2-A0C4-455A0A98F942}"/>
-                    </a:ext>
-                  </a:extLst>
-                </p:cNvPr>
-                <p:cNvCxnSpPr>
-                  <a:cxnSpLocks/>
-                  <a:endCxn id="21" idx="0"/>
-                </p:cNvCxnSpPr>
-                <p:nvPr/>
-              </p:nvCxnSpPr>
-              <p:spPr>
-                <a:xfrm flipH="1">
-                  <a:off x="6012081" y="3491693"/>
-                  <a:ext cx="20257" cy="1068897"/>
-                </a:xfrm>
-                <a:prstGeom prst="straightConnector1">
-                  <a:avLst/>
-                </a:prstGeom>
-                <a:ln>
-                  <a:headEnd type="triangle"/>
-                  <a:tailEnd type="triangle"/>
-                </a:ln>
-              </p:spPr>
-              <p:style>
-                <a:lnRef idx="1">
-                  <a:schemeClr val="accent1"/>
-                </a:lnRef>
-                <a:fillRef idx="0">
-                  <a:schemeClr val="accent1"/>
-                </a:fillRef>
-                <a:effectRef idx="0">
-                  <a:schemeClr val="accent1"/>
-                </a:effectRef>
-                <a:fontRef idx="minor">
-                  <a:schemeClr val="tx1"/>
-                </a:fontRef>
-              </p:style>
-            </p:cxnSp>
-            <p:cxnSp>
-              <p:nvCxnSpPr>
-                <p:cNvPr id="75" name="Straight Arrow Connector 74">
-                  <a:extLst>
-                    <a:ext uri="{FF2B5EF4-FFF2-40B4-BE49-F238E27FC236}">
-                      <a16:creationId xmlns:a16="http://schemas.microsoft.com/office/drawing/2014/main" id="{AC9E8DF6-D592-425D-9839-B7546135F32D}"/>
-                    </a:ext>
-                  </a:extLst>
-                </p:cNvPr>
-                <p:cNvCxnSpPr>
-                  <a:cxnSpLocks/>
-                  <a:stCxn id="22" idx="3"/>
-                  <a:endCxn id="21" idx="2"/>
-                </p:cNvCxnSpPr>
-                <p:nvPr/>
-              </p:nvCxnSpPr>
-              <p:spPr>
-                <a:xfrm>
-                  <a:off x="3267918" y="4340911"/>
-                  <a:ext cx="2506882" cy="423683"/>
-                </a:xfrm>
-                <a:prstGeom prst="straightConnector1">
-                  <a:avLst/>
-                </a:prstGeom>
-                <a:ln>
-                  <a:headEnd type="triangle"/>
-                  <a:tailEnd type="triangle"/>
-                </a:ln>
-              </p:spPr>
-              <p:style>
-                <a:lnRef idx="1">
-                  <a:schemeClr val="accent1"/>
-                </a:lnRef>
-                <a:fillRef idx="0">
-                  <a:schemeClr val="accent1"/>
-                </a:fillRef>
-                <a:effectRef idx="0">
-                  <a:schemeClr val="accent1"/>
-                </a:effectRef>
-                <a:fontRef idx="minor">
-                  <a:schemeClr val="tx1"/>
-                </a:fontRef>
-              </p:style>
-            </p:cxnSp>
-            <p:cxnSp>
-              <p:nvCxnSpPr>
-                <p:cNvPr id="101" name="Straight Arrow Connector 100">
-                  <a:extLst>
-                    <a:ext uri="{FF2B5EF4-FFF2-40B4-BE49-F238E27FC236}">
-                      <a16:creationId xmlns:a16="http://schemas.microsoft.com/office/drawing/2014/main" id="{EB46E354-2AF9-4964-A07E-D81BDF1019FA}"/>
-                    </a:ext>
-                  </a:extLst>
-                </p:cNvPr>
-                <p:cNvCxnSpPr>
-                  <a:cxnSpLocks/>
-                  <a:endCxn id="26" idx="3"/>
-                </p:cNvCxnSpPr>
-                <p:nvPr/>
-              </p:nvCxnSpPr>
-              <p:spPr>
-                <a:xfrm flipH="1">
-                  <a:off x="3105865" y="5561635"/>
-                  <a:ext cx="2351116" cy="14716"/>
-                </a:xfrm>
-                <a:prstGeom prst="straightConnector1">
-                  <a:avLst/>
-                </a:prstGeom>
-                <a:ln>
-                  <a:tailEnd type="triangle"/>
-                </a:ln>
-              </p:spPr>
-              <p:style>
-                <a:lnRef idx="1">
-                  <a:schemeClr val="accent1"/>
-                </a:lnRef>
-                <a:fillRef idx="0">
-                  <a:schemeClr val="accent1"/>
-                </a:fillRef>
-                <a:effectRef idx="0">
-                  <a:schemeClr val="accent1"/>
-                </a:effectRef>
-                <a:fontRef idx="minor">
-                  <a:schemeClr val="tx1"/>
-                </a:fontRef>
-              </p:style>
-            </p:cxnSp>
-            <p:cxnSp>
-              <p:nvCxnSpPr>
-                <p:cNvPr id="122" name="Straight Arrow Connector 121">
-                  <a:extLst>
-                    <a:ext uri="{FF2B5EF4-FFF2-40B4-BE49-F238E27FC236}">
-                      <a16:creationId xmlns:a16="http://schemas.microsoft.com/office/drawing/2014/main" id="{25057D90-86A8-463C-95B3-77631B41493B}"/>
-                    </a:ext>
-                  </a:extLst>
-                </p:cNvPr>
-                <p:cNvCxnSpPr>
-                  <a:cxnSpLocks/>
-                </p:cNvCxnSpPr>
-                <p:nvPr/>
-              </p:nvCxnSpPr>
-              <p:spPr>
-                <a:xfrm flipH="1">
-                  <a:off x="3127531" y="6216322"/>
-                  <a:ext cx="2351116" cy="14716"/>
-                </a:xfrm>
-                <a:prstGeom prst="straightConnector1">
-                  <a:avLst/>
-                </a:prstGeom>
-                <a:ln>
-                  <a:tailEnd type="triangle"/>
-                </a:ln>
-              </p:spPr>
-              <p:style>
-                <a:lnRef idx="1">
-                  <a:schemeClr val="accent1"/>
-                </a:lnRef>
-                <a:fillRef idx="0">
-                  <a:schemeClr val="accent1"/>
-                </a:fillRef>
-                <a:effectRef idx="0">
-                  <a:schemeClr val="accent1"/>
-                </a:effectRef>
-                <a:fontRef idx="minor">
-                  <a:schemeClr val="tx1"/>
-                </a:fontRef>
-              </p:style>
-            </p:cxnSp>
-            <p:cxnSp>
-              <p:nvCxnSpPr>
-                <p:cNvPr id="123" name="Straight Arrow Connector 122">
-                  <a:extLst>
-                    <a:ext uri="{FF2B5EF4-FFF2-40B4-BE49-F238E27FC236}">
-                      <a16:creationId xmlns:a16="http://schemas.microsoft.com/office/drawing/2014/main" id="{5BC68754-D831-4834-8659-DDF025CC19CF}"/>
-                    </a:ext>
-                  </a:extLst>
-                </p:cNvPr>
-                <p:cNvCxnSpPr>
-                  <a:cxnSpLocks/>
-                </p:cNvCxnSpPr>
-                <p:nvPr/>
-              </p:nvCxnSpPr>
-              <p:spPr>
-                <a:xfrm flipH="1">
-                  <a:off x="3127531" y="4949905"/>
-                  <a:ext cx="2351116" cy="14716"/>
-                </a:xfrm>
-                <a:prstGeom prst="straightConnector1">
-                  <a:avLst/>
-                </a:prstGeom>
-                <a:ln>
-                  <a:tailEnd type="triangle"/>
-                </a:ln>
-              </p:spPr>
-              <p:style>
-                <a:lnRef idx="1">
-                  <a:schemeClr val="accent1"/>
-                </a:lnRef>
-                <a:fillRef idx="0">
-                  <a:schemeClr val="accent1"/>
-                </a:fillRef>
-                <a:effectRef idx="0">
-                  <a:schemeClr val="accent1"/>
-                </a:effectRef>
-                <a:fontRef idx="minor">
-                  <a:schemeClr val="tx1"/>
-                </a:fontRef>
-              </p:style>
-            </p:cxnSp>
-            <p:cxnSp>
-              <p:nvCxnSpPr>
-                <p:cNvPr id="125" name="Straight Connector 124">
-                  <a:extLst>
-                    <a:ext uri="{FF2B5EF4-FFF2-40B4-BE49-F238E27FC236}">
-                      <a16:creationId xmlns:a16="http://schemas.microsoft.com/office/drawing/2014/main" id="{23022FD2-D11C-44BE-88D5-B678DAA7DD05}"/>
-                    </a:ext>
-                  </a:extLst>
-                </p:cNvPr>
-                <p:cNvCxnSpPr>
-                  <a:cxnSpLocks/>
-                </p:cNvCxnSpPr>
-                <p:nvPr/>
-              </p:nvCxnSpPr>
-              <p:spPr>
-                <a:xfrm>
-                  <a:off x="5478647" y="4934792"/>
-                  <a:ext cx="0" cy="1281530"/>
-                </a:xfrm>
-                <a:prstGeom prst="line">
-                  <a:avLst/>
-                </a:prstGeom>
-              </p:spPr>
-              <p:style>
-                <a:lnRef idx="1">
-                  <a:schemeClr val="accent1"/>
-                </a:lnRef>
-                <a:fillRef idx="0">
-                  <a:schemeClr val="accent1"/>
-                </a:fillRef>
-                <a:effectRef idx="0">
-                  <a:schemeClr val="accent1"/>
-                </a:effectRef>
-                <a:fontRef idx="minor">
-                  <a:schemeClr val="tx1"/>
-                </a:fontRef>
-              </p:style>
-            </p:cxnSp>
-            <p:pic>
-              <p:nvPicPr>
-                <p:cNvPr id="127" name="Graphic 126" descr="Wireless router">
-                  <a:extLst>
-                    <a:ext uri="{FF2B5EF4-FFF2-40B4-BE49-F238E27FC236}">
-                      <a16:creationId xmlns:a16="http://schemas.microsoft.com/office/drawing/2014/main" id="{FB394D5C-4FE4-44F6-A121-C3A259E17941}"/>
-                    </a:ext>
-                  </a:extLst>
-                </p:cNvPr>
-                <p:cNvPicPr>
-                  <a:picLocks noChangeAspect="1"/>
-                </p:cNvPicPr>
-                <p:nvPr/>
-              </p:nvPicPr>
-              <p:blipFill>
-                <a:blip r:embed="rId2">
-                  <a:extLst>
-                    <a:ext uri="{28A0092B-C50C-407E-A947-70E740481C1C}">
-                      <a14:useLocalDpi xmlns:a14="http://schemas.microsoft.com/office/drawing/2010/main" val="0"/>
-                    </a:ext>
-                    <a:ext uri="{96DAC541-7B7A-43D3-8B79-37D633B846F1}">
-                      <asvg:svgBlip xmlns:asvg="http://schemas.microsoft.com/office/drawing/2016/SVG/main" r:embed="rId3"/>
-                    </a:ext>
-                  </a:extLst>
-                </a:blip>
-                <a:stretch>
-                  <a:fillRect/>
-                </a:stretch>
-              </p:blipFill>
-              <p:spPr>
-                <a:xfrm>
-                  <a:off x="5575137" y="5634942"/>
-                  <a:ext cx="914400" cy="914400"/>
-                </a:xfrm>
-                <a:prstGeom prst="rect">
-                  <a:avLst/>
-                </a:prstGeom>
-              </p:spPr>
-            </p:pic>
-            <p:pic>
-              <p:nvPicPr>
-                <p:cNvPr id="129" name="Graphic 128" descr="Laptop">
-                  <a:extLst>
-                    <a:ext uri="{FF2B5EF4-FFF2-40B4-BE49-F238E27FC236}">
-                      <a16:creationId xmlns:a16="http://schemas.microsoft.com/office/drawing/2014/main" id="{9246BC7C-EE10-4CBF-8CBC-862CCFB0864A}"/>
-                    </a:ext>
-                  </a:extLst>
-                </p:cNvPr>
-                <p:cNvPicPr>
-                  <a:picLocks noChangeAspect="1"/>
-                </p:cNvPicPr>
-                <p:nvPr/>
-              </p:nvPicPr>
-              <p:blipFill>
-                <a:blip r:embed="rId4">
-                  <a:extLst>
-                    <a:ext uri="{28A0092B-C50C-407E-A947-70E740481C1C}">
-                      <a14:useLocalDpi xmlns:a14="http://schemas.microsoft.com/office/drawing/2010/main" val="0"/>
-                    </a:ext>
-                    <a:ext uri="{96DAC541-7B7A-43D3-8B79-37D633B846F1}">
-                      <asvg:svgBlip xmlns:asvg="http://schemas.microsoft.com/office/drawing/2016/SVG/main" r:embed="rId5"/>
-                    </a:ext>
-                  </a:extLst>
-                </a:blip>
-                <a:stretch>
-                  <a:fillRect/>
-                </a:stretch>
-              </p:blipFill>
-              <p:spPr>
-                <a:xfrm>
-                  <a:off x="6315918" y="2827757"/>
-                  <a:ext cx="914400" cy="914400"/>
-                </a:xfrm>
-                <a:prstGeom prst="rect">
-                  <a:avLst/>
-                </a:prstGeom>
-              </p:spPr>
-            </p:pic>
-            <p:pic>
-              <p:nvPicPr>
-                <p:cNvPr id="131" name="Graphic 130" descr="Database">
-                  <a:extLst>
-                    <a:ext uri="{FF2B5EF4-FFF2-40B4-BE49-F238E27FC236}">
-                      <a16:creationId xmlns:a16="http://schemas.microsoft.com/office/drawing/2014/main" id="{360E79A8-EB00-4F3C-A01C-8CEDB89BB82F}"/>
-                    </a:ext>
-                  </a:extLst>
-                </p:cNvPr>
-                <p:cNvPicPr>
-                  <a:picLocks noChangeAspect="1"/>
-                </p:cNvPicPr>
-                <p:nvPr/>
-              </p:nvPicPr>
-              <p:blipFill>
-                <a:blip r:embed="rId6">
-                  <a:extLst>
-                    <a:ext uri="{28A0092B-C50C-407E-A947-70E740481C1C}">
-                      <a14:useLocalDpi xmlns:a14="http://schemas.microsoft.com/office/drawing/2010/main" val="0"/>
-                    </a:ext>
-                    <a:ext uri="{96DAC541-7B7A-43D3-8B79-37D633B846F1}">
-                      <asvg:svgBlip xmlns:asvg="http://schemas.microsoft.com/office/drawing/2016/SVG/main" r:embed="rId7"/>
-                    </a:ext>
-                  </a:extLst>
-                </a:blip>
-                <a:stretch>
-                  <a:fillRect/>
-                </a:stretch>
-              </p:blipFill>
-              <p:spPr>
-                <a:xfrm>
-                  <a:off x="10120600" y="718950"/>
-                  <a:ext cx="914400" cy="914400"/>
-                </a:xfrm>
-                <a:prstGeom prst="rect">
-                  <a:avLst/>
-                </a:prstGeom>
-              </p:spPr>
-            </p:pic>
-            <p:pic>
-              <p:nvPicPr>
-                <p:cNvPr id="132" name="Graphic 131" descr="Database">
-                  <a:extLst>
-                    <a:ext uri="{FF2B5EF4-FFF2-40B4-BE49-F238E27FC236}">
-                      <a16:creationId xmlns:a16="http://schemas.microsoft.com/office/drawing/2014/main" id="{D4E1A11C-AB7B-4DA3-9B94-CCF1A17C8E3F}"/>
-                    </a:ext>
-                  </a:extLst>
-                </p:cNvPr>
-                <p:cNvPicPr>
-                  <a:picLocks noChangeAspect="1"/>
-                </p:cNvPicPr>
-                <p:nvPr/>
-              </p:nvPicPr>
-              <p:blipFill>
-                <a:blip r:embed="rId6">
-                  <a:extLst>
-                    <a:ext uri="{28A0092B-C50C-407E-A947-70E740481C1C}">
-                      <a14:useLocalDpi xmlns:a14="http://schemas.microsoft.com/office/drawing/2010/main" val="0"/>
-                    </a:ext>
-                    <a:ext uri="{96DAC541-7B7A-43D3-8B79-37D633B846F1}">
-                      <asvg:svgBlip xmlns:asvg="http://schemas.microsoft.com/office/drawing/2016/SVG/main" r:embed="rId7"/>
-                    </a:ext>
-                  </a:extLst>
-                </a:blip>
-                <a:stretch>
-                  <a:fillRect/>
-                </a:stretch>
-              </p:blipFill>
-              <p:spPr>
-                <a:xfrm>
-                  <a:off x="7080318" y="137462"/>
-                  <a:ext cx="914400" cy="914400"/>
-                </a:xfrm>
-                <a:prstGeom prst="rect">
-                  <a:avLst/>
-                </a:prstGeom>
-              </p:spPr>
-            </p:pic>
-            <p:pic>
-              <p:nvPicPr>
-                <p:cNvPr id="133" name="Graphic 132" descr="Database">
-                  <a:extLst>
-                    <a:ext uri="{FF2B5EF4-FFF2-40B4-BE49-F238E27FC236}">
-                      <a16:creationId xmlns:a16="http://schemas.microsoft.com/office/drawing/2014/main" id="{10062861-0CF8-4DF8-9C89-C32493F1404A}"/>
-                    </a:ext>
-                  </a:extLst>
-                </p:cNvPr>
-                <p:cNvPicPr>
-                  <a:picLocks noChangeAspect="1"/>
-                </p:cNvPicPr>
-                <p:nvPr/>
-              </p:nvPicPr>
-              <p:blipFill>
-                <a:blip r:embed="rId6">
-                  <a:extLst>
-                    <a:ext uri="{28A0092B-C50C-407E-A947-70E740481C1C}">
-                      <a14:useLocalDpi xmlns:a14="http://schemas.microsoft.com/office/drawing/2010/main" val="0"/>
-                    </a:ext>
-                    <a:ext uri="{96DAC541-7B7A-43D3-8B79-37D633B846F1}">
-                      <asvg:svgBlip xmlns:asvg="http://schemas.microsoft.com/office/drawing/2016/SVG/main" r:embed="rId7"/>
-                    </a:ext>
-                  </a:extLst>
-                </a:blip>
-                <a:stretch>
-                  <a:fillRect/>
-                </a:stretch>
-              </p:blipFill>
-              <p:spPr>
-                <a:xfrm>
-                  <a:off x="4025192" y="716665"/>
-                  <a:ext cx="914400" cy="914400"/>
-                </a:xfrm>
-                <a:prstGeom prst="rect">
-                  <a:avLst/>
-                </a:prstGeom>
-              </p:spPr>
-            </p:pic>
           </p:grpSp>
           <p:sp>
             <p:nvSpPr>
-              <p:cNvPr id="149" name="Flowchart: Summing Junction 148">
+              <p:cNvPr id="151" name="TextBox 150">
                 <a:extLst>
                   <a:ext uri="{FF2B5EF4-FFF2-40B4-BE49-F238E27FC236}">
-                    <a16:creationId xmlns:a16="http://schemas.microsoft.com/office/drawing/2014/main" id="{1EBE6096-29D4-49F6-B674-7B7C283C2C35}"/>
+                    <a16:creationId xmlns:a16="http://schemas.microsoft.com/office/drawing/2014/main" id="{0BF1F3DB-5DE5-4CD3-8DA2-95BF760B498E}"/>
                   </a:ext>
                 </a:extLst>
               </p:cNvPr>
-              <p:cNvSpPr/>
+              <p:cNvSpPr txBox="1"/>
               <p:nvPr/>
             </p:nvSpPr>
             <p:spPr>
               <a:xfrm>
-                <a:off x="5795056" y="3090878"/>
-                <a:ext cx="474562" cy="408008"/>
+                <a:off x="4925020" y="3090878"/>
+                <a:ext cx="870036" cy="369332"/>
               </a:xfrm>
-              <a:prstGeom prst="flowChartSummingJunction">
+              <a:prstGeom prst="rect">
                 <a:avLst/>
               </a:prstGeom>
+              <a:noFill/>
             </p:spPr>
-            <p:style>
-              <a:lnRef idx="2">
-                <a:schemeClr val="accent6"/>
-              </a:lnRef>
-              <a:fillRef idx="1">
-                <a:schemeClr val="lt1"/>
-              </a:fillRef>
-              <a:effectRef idx="0">
-                <a:schemeClr val="accent6"/>
-              </a:effectRef>
-              <a:fontRef idx="minor">
-                <a:schemeClr val="dk1"/>
-              </a:fontRef>
-            </p:style>
             <p:txBody>
-              <a:bodyPr rtlCol="0" anchor="ctr"/>
+              <a:bodyPr wrap="square" rtlCol="0">
+                <a:spAutoFit/>
+              </a:bodyPr>
               <a:lstStyle/>
               <a:p>
-                <a:pPr algn="ctr"/>
-                <a:endParaRPr lang="en-GB"/>
+                <a:r>
+                  <a:rPr lang="en-GB" dirty="0"/>
+                  <a:t>Laptop</a:t>
+                </a:r>
               </a:p>
             </p:txBody>
           </p:sp>
         </p:grpSp>
-        <p:sp>
-          <p:nvSpPr>
-            <p:cNvPr id="151" name="TextBox 150">
+        <p:cxnSp>
+          <p:nvCxnSpPr>
+            <p:cNvPr id="34" name="Straight Arrow Connector 33">
               <a:extLst>
                 <a:ext uri="{FF2B5EF4-FFF2-40B4-BE49-F238E27FC236}">
-                  <a16:creationId xmlns:a16="http://schemas.microsoft.com/office/drawing/2014/main" id="{0BF1F3DB-5DE5-4CD3-8DA2-95BF760B498E}"/>
+                  <a16:creationId xmlns:a16="http://schemas.microsoft.com/office/drawing/2014/main" id="{D86D4608-B39B-4CCB-BCA9-FABE4155D602}"/>
                 </a:ext>
               </a:extLst>
             </p:cNvPr>
-            <p:cNvSpPr txBox="1"/>
+            <p:cNvCxnSpPr>
+              <a:cxnSpLocks/>
+            </p:cNvCxnSpPr>
             <p:nvPr/>
-          </p:nvSpPr>
+          </p:nvCxnSpPr>
           <p:spPr>
-            <a:xfrm>
-              <a:off x="4925020" y="3090878"/>
-              <a:ext cx="870036" cy="369332"/>
+            <a:xfrm flipH="1">
+              <a:off x="3267910" y="4470520"/>
+              <a:ext cx="2189071" cy="33769"/>
             </a:xfrm>
-            <a:prstGeom prst="rect">
+            <a:prstGeom prst="straightConnector1">
               <a:avLst/>
             </a:prstGeom>
-            <a:noFill/>
+            <a:ln>
+              <a:tailEnd type="triangle"/>
+            </a:ln>
           </p:spPr>
-          <p:txBody>
-            <a:bodyPr wrap="square" rtlCol="0">
-              <a:spAutoFit/>
-            </a:bodyPr>
-            <a:lstStyle/>
-            <a:p>
-              <a:r>
-                <a:rPr lang="en-GB" dirty="0"/>
-                <a:t>Laptop</a:t>
-              </a:r>
-            </a:p>
-          </p:txBody>
-        </p:sp>
+          <p:style>
+            <a:lnRef idx="1">
+              <a:schemeClr val="accent1"/>
+            </a:lnRef>
+            <a:fillRef idx="0">
+              <a:schemeClr val="accent1"/>
+            </a:fillRef>
+            <a:effectRef idx="0">
+              <a:schemeClr val="accent1"/>
+            </a:effectRef>
+            <a:fontRef idx="minor">
+              <a:schemeClr val="tx1"/>
+            </a:fontRef>
+          </p:style>
+        </p:cxnSp>
       </p:grpSp>
     </p:spTree>
     <p:extLst>
@@ -5161,13 +6070,13 @@
           <a:p>
             <a:r>
               <a:rPr lang="en-GB" dirty="0"/>
-              <a:t>Philips Hue</a:t>
-            </a:r>
-          </a:p>
-        </p:txBody>
-      </p:sp>
-      <mc:AlternateContent xmlns:mc="http://schemas.openxmlformats.org/markup-compatibility/2006" xmlns:a14="http://schemas.microsoft.com/office/drawing/2010/main">
-        <mc:Choice Requires="a14">
+              <a:t>III.	Philips Hue</a:t>
+            </a:r>
+          </a:p>
+        </p:txBody>
+      </p:sp>
+      <mc:AlternateContent xmlns:mc="http://schemas.openxmlformats.org/markup-compatibility/2006">
+        <mc:Choice xmlns:a14="http://schemas.microsoft.com/office/drawing/2010/main" Requires="a14">
           <p:sp>
             <p:nvSpPr>
               <p:cNvPr id="3" name="Content Placeholder 2">
@@ -5260,6 +6169,9 @@
                 </a:r>
               </a:p>
               <a:p>
+                <a:endParaRPr lang="en-GB" dirty="0"/>
+              </a:p>
+              <a:p>
                 <a:r>
                   <a:rPr lang="en-GB" dirty="0"/>
                   <a:t>SSL Strip</a:t>
@@ -5291,7 +6203,7 @@
             </p:txBody>
           </p:sp>
         </mc:Choice>
-        <mc:Fallback xmlns="">
+        <mc:Fallback>
           <p:sp>
             <p:nvSpPr>
               <p:cNvPr id="3" name="Content Placeholder 2">
@@ -5335,6 +6247,35 @@
           </p:sp>
         </mc:Fallback>
       </mc:AlternateContent>
+      <p:sp>
+        <p:nvSpPr>
+          <p:cNvPr id="4" name="Slide Number Placeholder 3">
+            <a:extLst>
+              <a:ext uri="{FF2B5EF4-FFF2-40B4-BE49-F238E27FC236}">
+                <a16:creationId xmlns:a16="http://schemas.microsoft.com/office/drawing/2014/main" id="{AF7985A5-505C-446A-B08C-7AEABB5204E5}"/>
+              </a:ext>
+            </a:extLst>
+          </p:cNvPr>
+          <p:cNvSpPr>
+            <a:spLocks noGrp="1"/>
+          </p:cNvSpPr>
+          <p:nvPr>
+            <p:ph type="sldNum" sz="quarter" idx="12"/>
+          </p:nvPr>
+        </p:nvSpPr>
+        <p:spPr/>
+        <p:txBody>
+          <a:bodyPr/>
+          <a:lstStyle/>
+          <a:p>
+            <a:fld id="{90688A79-C3E9-46B5-89C9-85A34B18BF9C}" type="slidenum">
+              <a:rPr lang="en-GB" smtClean="0"/>
+              <a:t>5</a:t>
+            </a:fld>
+            <a:endParaRPr lang="en-GB"/>
+          </a:p>
+        </p:txBody>
+      </p:sp>
     </p:spTree>
     <p:extLst>
       <p:ext uri="{BB962C8B-B14F-4D97-AF65-F5344CB8AC3E}">
@@ -5393,8 +6334,8 @@
           </a:p>
         </p:txBody>
       </p:sp>
-      <mc:AlternateContent xmlns:mc="http://schemas.openxmlformats.org/markup-compatibility/2006">
-        <mc:Choice xmlns:a14="http://schemas.microsoft.com/office/drawing/2010/main" Requires="a14">
+      <mc:AlternateContent xmlns:mc="http://schemas.openxmlformats.org/markup-compatibility/2006" xmlns:a14="http://schemas.microsoft.com/office/drawing/2010/main">
+        <mc:Choice Requires="a14">
           <p:sp>
             <p:nvSpPr>
               <p:cNvPr id="3" name="Content Placeholder 2">
@@ -5579,7 +6520,7 @@
             </p:txBody>
           </p:sp>
         </mc:Choice>
-        <mc:Fallback>
+        <mc:Fallback xmlns="">
           <p:sp>
             <p:nvSpPr>
               <p:cNvPr id="3" name="Content Placeholder 2">
@@ -5619,6 +6560,35 @@
           </p:sp>
         </mc:Fallback>
       </mc:AlternateContent>
+      <p:sp>
+        <p:nvSpPr>
+          <p:cNvPr id="4" name="Slide Number Placeholder 3">
+            <a:extLst>
+              <a:ext uri="{FF2B5EF4-FFF2-40B4-BE49-F238E27FC236}">
+                <a16:creationId xmlns:a16="http://schemas.microsoft.com/office/drawing/2014/main" id="{BEFBD2A9-40ED-460C-A857-DB5B848E9CA7}"/>
+              </a:ext>
+            </a:extLst>
+          </p:cNvPr>
+          <p:cNvSpPr>
+            <a:spLocks noGrp="1"/>
+          </p:cNvSpPr>
+          <p:nvPr>
+            <p:ph type="sldNum" sz="quarter" idx="12"/>
+          </p:nvPr>
+        </p:nvSpPr>
+        <p:spPr/>
+        <p:txBody>
+          <a:bodyPr/>
+          <a:lstStyle/>
+          <a:p>
+            <a:fld id="{90688A79-C3E9-46B5-89C9-85A34B18BF9C}" type="slidenum">
+              <a:rPr lang="en-GB" smtClean="0"/>
+              <a:t>6</a:t>
+            </a:fld>
+            <a:endParaRPr lang="en-GB"/>
+          </a:p>
+        </p:txBody>
+      </p:sp>
     </p:spTree>
     <p:extLst>
       <p:ext uri="{BB962C8B-B14F-4D97-AF65-F5344CB8AC3E}">
@@ -5716,7 +6686,7 @@
           <a:p>
             <a:r>
               <a:rPr lang="en-GB" dirty="0"/>
-              <a:t>LED-Matrix</a:t>
+              <a:t>IV.	LED-Matrix</a:t>
             </a:r>
           </a:p>
         </p:txBody>
@@ -6665,6 +7635,139 @@
           </p:spPr>
         </p:pic>
       </p:grpSp>
+      <p:sp>
+        <p:nvSpPr>
+          <p:cNvPr id="2" name="Slide Number Placeholder 1">
+            <a:extLst>
+              <a:ext uri="{FF2B5EF4-FFF2-40B4-BE49-F238E27FC236}">
+                <a16:creationId xmlns:a16="http://schemas.microsoft.com/office/drawing/2014/main" id="{EBEFB407-6506-42ED-AEE8-7C739103D197}"/>
+              </a:ext>
+            </a:extLst>
+          </p:cNvPr>
+          <p:cNvSpPr>
+            <a:spLocks noGrp="1"/>
+          </p:cNvSpPr>
+          <p:nvPr>
+            <p:ph type="sldNum" sz="quarter" idx="12"/>
+          </p:nvPr>
+        </p:nvSpPr>
+        <p:spPr/>
+        <p:txBody>
+          <a:bodyPr/>
+          <a:lstStyle/>
+          <a:p>
+            <a:fld id="{90688A79-C3E9-46B5-89C9-85A34B18BF9C}" type="slidenum">
+              <a:rPr lang="en-GB" smtClean="0"/>
+              <a:t>7</a:t>
+            </a:fld>
+            <a:endParaRPr lang="en-GB"/>
+          </a:p>
+        </p:txBody>
+      </p:sp>
+      <p:pic>
+        <p:nvPicPr>
+          <p:cNvPr id="3" name="Picture 2">
+            <a:extLst>
+              <a:ext uri="{FF2B5EF4-FFF2-40B4-BE49-F238E27FC236}">
+                <a16:creationId xmlns:a16="http://schemas.microsoft.com/office/drawing/2014/main" id="{B2D0B40A-0687-4BF4-A3AA-0E8CF91FE0F5}"/>
+              </a:ext>
+            </a:extLst>
+          </p:cNvPr>
+          <p:cNvPicPr>
+            <a:picLocks noChangeAspect="1"/>
+          </p:cNvPicPr>
+          <p:nvPr/>
+        </p:nvPicPr>
+        <p:blipFill rotWithShape="1">
+          <a:blip r:embed="rId6"/>
+          <a:srcRect t="30663" r="11922" b="28632"/>
+          <a:stretch/>
+        </p:blipFill>
+        <p:spPr>
+          <a:xfrm>
+            <a:off x="9395460" y="-10867"/>
+            <a:ext cx="2776863" cy="2281457"/>
+          </a:xfrm>
+          <a:prstGeom prst="rect">
+            <a:avLst/>
+          </a:prstGeom>
+        </p:spPr>
+      </p:pic>
+      <p:pic>
+        <p:nvPicPr>
+          <p:cNvPr id="6" name="Picture 5">
+            <a:extLst>
+              <a:ext uri="{FF2B5EF4-FFF2-40B4-BE49-F238E27FC236}">
+                <a16:creationId xmlns:a16="http://schemas.microsoft.com/office/drawing/2014/main" id="{C5438935-5FB0-4BBB-A8FE-961E8A41B8EE}"/>
+              </a:ext>
+            </a:extLst>
+          </p:cNvPr>
+          <p:cNvPicPr>
+            <a:picLocks noChangeAspect="1"/>
+          </p:cNvPicPr>
+          <p:nvPr/>
+        </p:nvPicPr>
+        <p:blipFill rotWithShape="1">
+          <a:blip r:embed="rId7"/>
+          <a:srcRect l="15832" t="19999" r="31381" b="26028"/>
+          <a:stretch/>
+        </p:blipFill>
+        <p:spPr>
+          <a:xfrm rot="16200000">
+            <a:off x="5637096" y="-288137"/>
+            <a:ext cx="1448022" cy="2632086"/>
+          </a:xfrm>
+          <a:prstGeom prst="rect">
+            <a:avLst/>
+          </a:prstGeom>
+        </p:spPr>
+      </p:pic>
+      <p:sp>
+        <p:nvSpPr>
+          <p:cNvPr id="8" name="Arrow: Right 7">
+            <a:extLst>
+              <a:ext uri="{FF2B5EF4-FFF2-40B4-BE49-F238E27FC236}">
+                <a16:creationId xmlns:a16="http://schemas.microsoft.com/office/drawing/2014/main" id="{A079D13C-D55A-4508-9A88-7B10A42D9E40}"/>
+              </a:ext>
+            </a:extLst>
+          </p:cNvPr>
+          <p:cNvSpPr/>
+          <p:nvPr/>
+        </p:nvSpPr>
+        <p:spPr>
+          <a:xfrm>
+            <a:off x="7840980" y="792480"/>
+            <a:ext cx="1226820" cy="342900"/>
+          </a:xfrm>
+          <a:prstGeom prst="rightArrow">
+            <a:avLst/>
+          </a:prstGeom>
+        </p:spPr>
+        <p:style>
+          <a:lnRef idx="2">
+            <a:schemeClr val="accent1">
+              <a:shade val="50000"/>
+            </a:schemeClr>
+          </a:lnRef>
+          <a:fillRef idx="1">
+            <a:schemeClr val="accent1"/>
+          </a:fillRef>
+          <a:effectRef idx="0">
+            <a:schemeClr val="accent1"/>
+          </a:effectRef>
+          <a:fontRef idx="minor">
+            <a:schemeClr val="lt1"/>
+          </a:fontRef>
+        </p:style>
+        <p:txBody>
+          <a:bodyPr rtlCol="0" anchor="ctr"/>
+          <a:lstStyle/>
+          <a:p>
+            <a:pPr algn="ctr"/>
+            <a:endParaRPr lang="en-GB"/>
+          </a:p>
+        </p:txBody>
+      </p:sp>
     </p:spTree>
     <p:extLst>
       <p:ext uri="{BB962C8B-B14F-4D97-AF65-F5344CB8AC3E}">
@@ -6718,7 +7821,7 @@
           <a:p>
             <a:r>
               <a:rPr lang="en-GB" dirty="0"/>
-              <a:t>LED-Matrix</a:t>
+              <a:t>LED-Matrix cont.</a:t>
             </a:r>
           </a:p>
         </p:txBody>
@@ -6778,6 +7881,9 @@
             <a:endParaRPr lang="en-GB" dirty="0"/>
           </a:p>
           <a:p>
+            <a:endParaRPr lang="en-GB" dirty="0"/>
+          </a:p>
+          <a:p>
             <a:r>
               <a:rPr lang="en-GB" dirty="0"/>
               <a:t>ARP-Spoof &amp; SSL-Strip</a:t>
@@ -6792,6 +7898,9 @@
             <a:endParaRPr lang="en-GB" dirty="0"/>
           </a:p>
           <a:p>
+            <a:endParaRPr lang="en-GB" dirty="0"/>
+          </a:p>
+          <a:p>
             <a:r>
               <a:rPr lang="en-GB" dirty="0"/>
               <a:t>SSL-Sniff</a:t>
@@ -6815,6 +7924,35 @@
           </a:p>
           <a:p>
             <a:endParaRPr lang="en-GB" dirty="0"/>
+          </a:p>
+        </p:txBody>
+      </p:sp>
+      <p:sp>
+        <p:nvSpPr>
+          <p:cNvPr id="4" name="Slide Number Placeholder 3">
+            <a:extLst>
+              <a:ext uri="{FF2B5EF4-FFF2-40B4-BE49-F238E27FC236}">
+                <a16:creationId xmlns:a16="http://schemas.microsoft.com/office/drawing/2014/main" id="{28612149-090E-4293-986B-5EB273642D6D}"/>
+              </a:ext>
+            </a:extLst>
+          </p:cNvPr>
+          <p:cNvSpPr>
+            <a:spLocks noGrp="1"/>
+          </p:cNvSpPr>
+          <p:nvPr>
+            <p:ph type="sldNum" sz="quarter" idx="12"/>
+          </p:nvPr>
+        </p:nvSpPr>
+        <p:spPr/>
+        <p:txBody>
+          <a:bodyPr/>
+          <a:lstStyle/>
+          <a:p>
+            <a:fld id="{90688A79-C3E9-46B5-89C9-85A34B18BF9C}" type="slidenum">
+              <a:rPr lang="en-GB" smtClean="0"/>
+              <a:t>8</a:t>
+            </a:fld>
+            <a:endParaRPr lang="en-GB"/>
           </a:p>
         </p:txBody>
       </p:sp>
@@ -6853,7 +7991,7 @@
           <p:cNvPr id="2" name="Title 1">
             <a:extLst>
               <a:ext uri="{FF2B5EF4-FFF2-40B4-BE49-F238E27FC236}">
-                <a16:creationId xmlns:a16="http://schemas.microsoft.com/office/drawing/2014/main" id="{CFEF712D-B737-42AB-B983-28B0BCC44D75}"/>
+                <a16:creationId xmlns:a16="http://schemas.microsoft.com/office/drawing/2014/main" id="{50555132-E7A5-4AF7-93D8-39B6ED3DBC78}"/>
               </a:ext>
             </a:extLst>
           </p:cNvPr>
@@ -6870,297 +8008,134 @@
           <a:lstStyle/>
           <a:p>
             <a:r>
+              <a:rPr lang="en-GB" dirty="0"/>
+              <a:t>V.	Was nun?</a:t>
+            </a:r>
+          </a:p>
+        </p:txBody>
+      </p:sp>
+      <p:sp>
+        <p:nvSpPr>
+          <p:cNvPr id="3" name="Content Placeholder 2">
+            <a:extLst>
+              <a:ext uri="{FF2B5EF4-FFF2-40B4-BE49-F238E27FC236}">
+                <a16:creationId xmlns:a16="http://schemas.microsoft.com/office/drawing/2014/main" id="{E148372F-2A5B-4550-93F3-C83577A6E214}"/>
+              </a:ext>
+            </a:extLst>
+          </p:cNvPr>
+          <p:cNvSpPr>
+            <a:spLocks noGrp="1"/>
+          </p:cNvSpPr>
+          <p:nvPr>
+            <p:ph idx="1"/>
+          </p:nvPr>
+        </p:nvSpPr>
+        <p:spPr/>
+        <p:txBody>
+          <a:bodyPr/>
+          <a:lstStyle/>
+          <a:p>
+            <a:r>
+              <a:rPr lang="en-GB" dirty="0"/>
+              <a:t>Philips Hue: HTTP </a:t>
+            </a:r>
+            <a:r>
               <a:rPr lang="en-GB" dirty="0" err="1"/>
-              <a:t>Schlussfolgerungen</a:t>
+              <a:t>Protokoll</a:t>
             </a:r>
             <a:endParaRPr lang="en-GB" dirty="0"/>
           </a:p>
-        </p:txBody>
-      </p:sp>
-      <mc:AlternateContent xmlns:mc="http://schemas.openxmlformats.org/markup-compatibility/2006">
-        <mc:Choice xmlns:a14="http://schemas.microsoft.com/office/drawing/2010/main" Requires="a14">
-          <p:sp>
-            <p:nvSpPr>
-              <p:cNvPr id="3" name="Content Placeholder 2">
-                <a:extLst>
-                  <a:ext uri="{FF2B5EF4-FFF2-40B4-BE49-F238E27FC236}">
-                    <a16:creationId xmlns:a16="http://schemas.microsoft.com/office/drawing/2014/main" id="{A19F2C76-DA68-4365-B768-8EB2C1AE0883}"/>
-                  </a:ext>
-                </a:extLst>
-              </p:cNvPr>
-              <p:cNvSpPr>
-                <a:spLocks noGrp="1"/>
-              </p:cNvSpPr>
-              <p:nvPr>
-                <p:ph idx="1"/>
-              </p:nvPr>
-            </p:nvSpPr>
-            <p:spPr/>
-            <p:txBody>
-              <a:bodyPr/>
-              <a:lstStyle/>
-              <a:p>
-                <a:pPr marL="0" indent="0">
-                  <a:buNone/>
-                </a:pPr>
-                <a:r>
-                  <a:rPr lang="en-GB" b="1" dirty="0">
-                    <a:solidFill>
-                      <a:srgbClr val="FF0000"/>
-                    </a:solidFill>
-                    <a:ea typeface="Cambria Math" panose="02040503050406030204" pitchFamily="18" charset="0"/>
-                  </a:rPr>
-                  <a:t> </a:t>
-                </a:r>
-                <a14:m>
-                  <m:oMath xmlns:m="http://schemas.openxmlformats.org/officeDocument/2006/math">
-                    <m:r>
-                      <a:rPr lang="en-GB" b="1" i="1">
-                        <a:solidFill>
-                          <a:srgbClr val="FF0000"/>
-                        </a:solidFill>
-                        <a:latin typeface="Cambria Math" panose="02040503050406030204" pitchFamily="18" charset="0"/>
-                        <a:ea typeface="Cambria Math" panose="02040503050406030204" pitchFamily="18" charset="0"/>
-                      </a:rPr>
-                      <m:t>×</m:t>
-                    </m:r>
-                  </m:oMath>
-                </a14:m>
-                <a:r>
-                  <a:rPr lang="en-GB" dirty="0"/>
-                  <a:t> Philips Hue 						</a:t>
-                </a:r>
-              </a:p>
-              <a:p>
-                <a:pPr lvl="1"/>
-                <a:r>
-                  <a:rPr lang="en-GB" dirty="0"/>
-                  <a:t>SSL Strip das </a:t>
-                </a:r>
-                <a:r>
-                  <a:rPr lang="en-GB" dirty="0" err="1"/>
-                  <a:t>falsche</a:t>
-                </a:r>
-                <a:r>
-                  <a:rPr lang="en-GB" dirty="0"/>
-                  <a:t> Tool</a:t>
-                </a:r>
-              </a:p>
-              <a:p>
-                <a:pPr lvl="1"/>
-                <a:r>
-                  <a:rPr lang="en-GB" dirty="0" err="1"/>
-                  <a:t>Kommunikation</a:t>
-                </a:r>
-                <a:r>
-                  <a:rPr lang="en-GB" dirty="0"/>
-                  <a:t> </a:t>
-                </a:r>
-                <a:r>
-                  <a:rPr lang="en-GB" dirty="0" err="1"/>
-                  <a:t>mit</a:t>
-                </a:r>
-                <a:r>
-                  <a:rPr lang="en-GB" dirty="0"/>
-                  <a:t> den </a:t>
-                </a:r>
-                <a:r>
-                  <a:rPr lang="en-GB" dirty="0" err="1"/>
-                  <a:t>Servern</a:t>
-                </a:r>
-                <a:r>
-                  <a:rPr lang="en-GB" dirty="0"/>
-                  <a:t> </a:t>
-                </a:r>
-                <a:r>
-                  <a:rPr lang="en-GB" dirty="0" err="1"/>
-                  <a:t>ist</a:t>
-                </a:r>
-                <a:r>
-                  <a:rPr lang="en-GB" dirty="0"/>
-                  <a:t> </a:t>
-                </a:r>
-                <a:r>
-                  <a:rPr lang="en-GB" dirty="0" err="1"/>
-                  <a:t>verscchlüsselt</a:t>
-                </a:r>
-                <a:endParaRPr lang="en-GB" dirty="0"/>
-              </a:p>
-              <a:p>
-                <a:pPr marL="457200" lvl="1" indent="0">
-                  <a:buNone/>
-                </a:pPr>
-                <a:r>
-                  <a:rPr lang="en-GB" dirty="0"/>
-                  <a:t>	ABER</a:t>
-                </a:r>
-              </a:p>
-              <a:p>
-                <a:pPr lvl="1"/>
-                <a:r>
-                  <a:rPr lang="en-GB" dirty="0" err="1"/>
-                  <a:t>Im</a:t>
-                </a:r>
-                <a:r>
-                  <a:rPr lang="en-GB" dirty="0"/>
-                  <a:t> </a:t>
-                </a:r>
-                <a:r>
-                  <a:rPr lang="en-GB" dirty="0" err="1"/>
-                  <a:t>Netzwerk</a:t>
-                </a:r>
-                <a:r>
-                  <a:rPr lang="en-GB" dirty="0"/>
-                  <a:t> </a:t>
-                </a:r>
-                <a:r>
-                  <a:rPr lang="en-GB" dirty="0" err="1"/>
-                  <a:t>kann</a:t>
-                </a:r>
-                <a:r>
-                  <a:rPr lang="en-GB" dirty="0"/>
-                  <a:t> man </a:t>
-                </a:r>
-                <a:r>
-                  <a:rPr lang="en-GB" sz="2300" dirty="0">
-                    <a:cs typeface="Courier New" panose="02070309020205020404" pitchFamily="49" charset="0"/>
-                  </a:rPr>
-                  <a:t>HTTP</a:t>
-                </a:r>
-                <a:r>
-                  <a:rPr lang="en-GB" dirty="0"/>
-                  <a:t> </a:t>
-                </a:r>
-                <a:r>
-                  <a:rPr lang="en-GB" dirty="0" err="1"/>
-                  <a:t>Pakete</a:t>
-                </a:r>
-                <a:r>
-                  <a:rPr lang="en-GB" dirty="0"/>
-                  <a:t> </a:t>
-                </a:r>
-                <a:r>
-                  <a:rPr lang="en-GB" dirty="0" err="1"/>
-                  <a:t>verschicken</a:t>
-                </a:r>
-                <a:endParaRPr lang="en-GB" dirty="0"/>
-              </a:p>
-              <a:p>
-                <a:endParaRPr lang="en-GB" dirty="0"/>
-              </a:p>
-              <a:p>
-                <a:pPr marL="0" indent="0">
-                  <a:buNone/>
-                </a:pPr>
-                <a:r>
-                  <a:rPr lang="en-GB" dirty="0">
-                    <a:solidFill>
-                      <a:schemeClr val="accent6"/>
-                    </a:solidFill>
-                  </a:rPr>
-                  <a:t> ✔ </a:t>
-                </a:r>
-                <a:r>
-                  <a:rPr lang="en-GB" dirty="0"/>
-                  <a:t>LED-Matrix</a:t>
-                </a:r>
-                <a:endParaRPr lang="en-GB" dirty="0">
-                  <a:solidFill>
-                    <a:schemeClr val="accent6"/>
-                  </a:solidFill>
-                </a:endParaRPr>
-              </a:p>
-              <a:p>
-                <a:pPr lvl="1"/>
-                <a:r>
-                  <a:rPr lang="en-GB" dirty="0" err="1"/>
-                  <a:t>Nicht</a:t>
-                </a:r>
-                <a:r>
-                  <a:rPr lang="en-GB" dirty="0"/>
-                  <a:t> </a:t>
-                </a:r>
-                <a:r>
-                  <a:rPr lang="en-GB" dirty="0" err="1"/>
-                  <a:t>manipulierbar</a:t>
-                </a:r>
-                <a:r>
-                  <a:rPr lang="en-GB" dirty="0"/>
-                  <a:t> (</a:t>
-                </a:r>
-                <a:r>
-                  <a:rPr lang="en-GB" dirty="0" err="1"/>
-                  <a:t>mit</a:t>
-                </a:r>
-                <a:r>
-                  <a:rPr lang="en-GB" dirty="0"/>
-                  <a:t> </a:t>
-                </a:r>
-                <a:r>
-                  <a:rPr lang="en-GB" dirty="0" err="1"/>
-                  <a:t>versuchten</a:t>
-                </a:r>
-                <a:r>
-                  <a:rPr lang="en-GB" dirty="0"/>
-                  <a:t> </a:t>
-                </a:r>
-                <a:r>
-                  <a:rPr lang="en-GB" dirty="0" err="1"/>
-                  <a:t>Mitteln</a:t>
-                </a:r>
-                <a:r>
-                  <a:rPr lang="en-GB"/>
-                  <a:t>)</a:t>
-                </a:r>
-                <a:endParaRPr lang="en-GB" dirty="0"/>
-              </a:p>
-            </p:txBody>
-          </p:sp>
-        </mc:Choice>
-        <mc:Fallback>
-          <p:sp>
-            <p:nvSpPr>
-              <p:cNvPr id="3" name="Content Placeholder 2">
-                <a:extLst>
-                  <a:ext uri="{FF2B5EF4-FFF2-40B4-BE49-F238E27FC236}">
-                    <a16:creationId xmlns:a16="http://schemas.microsoft.com/office/drawing/2014/main" id="{A19F2C76-DA68-4365-B768-8EB2C1AE0883}"/>
-                  </a:ext>
-                </a:extLst>
-              </p:cNvPr>
-              <p:cNvSpPr>
-                <a:spLocks noGrp="1" noRot="1" noChangeAspect="1" noMove="1" noResize="1" noEditPoints="1" noAdjustHandles="1" noChangeArrowheads="1" noChangeShapeType="1" noTextEdit="1"/>
-              </p:cNvSpPr>
-              <p:nvPr>
-                <p:ph idx="1"/>
-              </p:nvPr>
-            </p:nvSpPr>
-            <p:spPr>
-              <a:blipFill>
-                <a:blip r:embed="rId2"/>
-                <a:stretch>
-                  <a:fillRect l="-464" t="-2241"/>
-                </a:stretch>
-              </a:blipFill>
-            </p:spPr>
-            <p:txBody>
-              <a:bodyPr/>
-              <a:lstStyle/>
-              <a:p>
-                <a:r>
-                  <a:rPr lang="en-GB">
-                    <a:noFill/>
-                  </a:rPr>
-                  <a:t> </a:t>
-                </a:r>
-              </a:p>
-            </p:txBody>
-          </p:sp>
-        </mc:Fallback>
-      </mc:AlternateContent>
+          <a:p>
+            <a:endParaRPr lang="en-GB" dirty="0"/>
+          </a:p>
+          <a:p>
+            <a:r>
+              <a:rPr lang="en-GB" dirty="0" err="1"/>
+              <a:t>Angriffe</a:t>
+            </a:r>
+            <a:r>
+              <a:rPr lang="en-GB" dirty="0"/>
+              <a:t> auf SSL/TLS</a:t>
+            </a:r>
+          </a:p>
+          <a:p>
+            <a:endParaRPr lang="en-GB" dirty="0"/>
+          </a:p>
+          <a:p>
+            <a:r>
+              <a:rPr lang="en-GB" dirty="0"/>
+              <a:t>Downgrade auf </a:t>
+            </a:r>
+            <a:r>
+              <a:rPr lang="en-GB" dirty="0" err="1"/>
+              <a:t>ältere</a:t>
+            </a:r>
+            <a:r>
+              <a:rPr lang="en-GB" dirty="0"/>
+              <a:t> </a:t>
+            </a:r>
+            <a:r>
+              <a:rPr lang="en-GB" dirty="0" err="1"/>
+              <a:t>Versionen</a:t>
+            </a:r>
+            <a:endParaRPr lang="en-GB" dirty="0"/>
+          </a:p>
+          <a:p>
+            <a:endParaRPr lang="en-GB" dirty="0"/>
+          </a:p>
+          <a:p>
+            <a:r>
+              <a:rPr lang="en-GB" dirty="0" err="1"/>
+              <a:t>Bekannte</a:t>
+            </a:r>
+            <a:r>
+              <a:rPr lang="en-GB" dirty="0"/>
+              <a:t> Bugs </a:t>
+            </a:r>
+            <a:r>
+              <a:rPr lang="en-GB" dirty="0" err="1"/>
+              <a:t>ausnutzen</a:t>
+            </a:r>
+            <a:r>
+              <a:rPr lang="en-GB" dirty="0"/>
+              <a:t> (DROWN, POODLE)</a:t>
+            </a:r>
+          </a:p>
+        </p:txBody>
+      </p:sp>
+      <p:sp>
+        <p:nvSpPr>
+          <p:cNvPr id="4" name="Slide Number Placeholder 3">
+            <a:extLst>
+              <a:ext uri="{FF2B5EF4-FFF2-40B4-BE49-F238E27FC236}">
+                <a16:creationId xmlns:a16="http://schemas.microsoft.com/office/drawing/2014/main" id="{540325DE-FE42-435E-A407-5AC3F837E2E4}"/>
+              </a:ext>
+            </a:extLst>
+          </p:cNvPr>
+          <p:cNvSpPr>
+            <a:spLocks noGrp="1"/>
+          </p:cNvSpPr>
+          <p:nvPr>
+            <p:ph type="sldNum" sz="quarter" idx="12"/>
+          </p:nvPr>
+        </p:nvSpPr>
+        <p:spPr/>
+        <p:txBody>
+          <a:bodyPr/>
+          <a:lstStyle/>
+          <a:p>
+            <a:fld id="{90688A79-C3E9-46B5-89C9-85A34B18BF9C}" type="slidenum">
+              <a:rPr lang="en-GB" smtClean="0"/>
+              <a:t>9</a:t>
+            </a:fld>
+            <a:endParaRPr lang="en-GB"/>
+          </a:p>
+        </p:txBody>
+      </p:sp>
     </p:spTree>
     <p:extLst>
       <p:ext uri="{BB962C8B-B14F-4D97-AF65-F5344CB8AC3E}">
-        <p14:creationId xmlns:p14="http://schemas.microsoft.com/office/powerpoint/2010/main" val="2753927759"/>
+        <p14:creationId xmlns:p14="http://schemas.microsoft.com/office/powerpoint/2010/main" val="2631955730"/>
       </p:ext>
     </p:extLst>
   </p:cSld>
@@ -7463,4 +8438,299 @@
     </a:ext>
   </a:extLst>
 </a:theme>
+</file>
+
+<file path=ppt/theme/theme2.xml><?xml version="1.0" encoding="utf-8"?>
+<a:theme xmlns:a="http://schemas.openxmlformats.org/drawingml/2006/main" name="Office Theme">
+  <a:themeElements>
+    <a:clrScheme name="Office">
+      <a:dk1>
+        <a:sysClr val="windowText" lastClr="000000"/>
+      </a:dk1>
+      <a:lt1>
+        <a:sysClr val="window" lastClr="FFFFFF"/>
+      </a:lt1>
+      <a:dk2>
+        <a:srgbClr val="44546A"/>
+      </a:dk2>
+      <a:lt2>
+        <a:srgbClr val="E7E6E6"/>
+      </a:lt2>
+      <a:accent1>
+        <a:srgbClr val="4472C4"/>
+      </a:accent1>
+      <a:accent2>
+        <a:srgbClr val="ED7D31"/>
+      </a:accent2>
+      <a:accent3>
+        <a:srgbClr val="A5A5A5"/>
+      </a:accent3>
+      <a:accent4>
+        <a:srgbClr val="FFC000"/>
+      </a:accent4>
+      <a:accent5>
+        <a:srgbClr val="5B9BD5"/>
+      </a:accent5>
+      <a:accent6>
+        <a:srgbClr val="70AD47"/>
+      </a:accent6>
+      <a:hlink>
+        <a:srgbClr val="0563C1"/>
+      </a:hlink>
+      <a:folHlink>
+        <a:srgbClr val="954F72"/>
+      </a:folHlink>
+    </a:clrScheme>
+    <a:fontScheme name="Office">
+      <a:majorFont>
+        <a:latin typeface="Calibri Light" panose="020F0302020204030204"/>
+        <a:ea typeface=""/>
+        <a:cs typeface=""/>
+        <a:font script="Jpan" typeface="游ゴシック Light"/>
+        <a:font script="Hang" typeface="맑은 고딕"/>
+        <a:font script="Hans" typeface="等线 Light"/>
+        <a:font script="Hant" typeface="新細明體"/>
+        <a:font script="Arab" typeface="Times New Roman"/>
+        <a:font script="Hebr" typeface="Times New Roman"/>
+        <a:font script="Thai" typeface="Angsana New"/>
+        <a:font script="Ethi" typeface="Nyala"/>
+        <a:font script="Beng" typeface="Vrinda"/>
+        <a:font script="Gujr" typeface="Shruti"/>
+        <a:font script="Khmr" typeface="MoolBoran"/>
+        <a:font script="Knda" typeface="Tunga"/>
+        <a:font script="Guru" typeface="Raavi"/>
+        <a:font script="Cans" typeface="Euphemia"/>
+        <a:font script="Cher" typeface="Plantagenet Cherokee"/>
+        <a:font script="Yiii" typeface="Microsoft Yi Baiti"/>
+        <a:font script="Tibt" typeface="Microsoft Himalaya"/>
+        <a:font script="Thaa" typeface="MV Boli"/>
+        <a:font script="Deva" typeface="Mangal"/>
+        <a:font script="Telu" typeface="Gautami"/>
+        <a:font script="Taml" typeface="Latha"/>
+        <a:font script="Syrc" typeface="Estrangelo Edessa"/>
+        <a:font script="Orya" typeface="Kalinga"/>
+        <a:font script="Mlym" typeface="Kartika"/>
+        <a:font script="Laoo" typeface="DokChampa"/>
+        <a:font script="Sinh" typeface="Iskoola Pota"/>
+        <a:font script="Mong" typeface="Mongolian Baiti"/>
+        <a:font script="Viet" typeface="Times New Roman"/>
+        <a:font script="Uigh" typeface="Microsoft Uighur"/>
+        <a:font script="Geor" typeface="Sylfaen"/>
+        <a:font script="Armn" typeface="Arial"/>
+        <a:font script="Bugi" typeface="Leelawadee UI"/>
+        <a:font script="Bopo" typeface="Microsoft JhengHei"/>
+        <a:font script="Java" typeface="Javanese Text"/>
+        <a:font script="Lisu" typeface="Segoe UI"/>
+        <a:font script="Mymr" typeface="Myanmar Text"/>
+        <a:font script="Nkoo" typeface="Ebrima"/>
+        <a:font script="Olck" typeface="Nirmala UI"/>
+        <a:font script="Osma" typeface="Ebrima"/>
+        <a:font script="Phag" typeface="Phagspa"/>
+        <a:font script="Syrn" typeface="Estrangelo Edessa"/>
+        <a:font script="Syrj" typeface="Estrangelo Edessa"/>
+        <a:font script="Syre" typeface="Estrangelo Edessa"/>
+        <a:font script="Sora" typeface="Nirmala UI"/>
+        <a:font script="Tale" typeface="Microsoft Tai Le"/>
+        <a:font script="Talu" typeface="Microsoft New Tai Lue"/>
+        <a:font script="Tfng" typeface="Ebrima"/>
+      </a:majorFont>
+      <a:minorFont>
+        <a:latin typeface="Calibri" panose="020F0502020204030204"/>
+        <a:ea typeface=""/>
+        <a:cs typeface=""/>
+        <a:font script="Jpan" typeface="游ゴシック"/>
+        <a:font script="Hang" typeface="맑은 고딕"/>
+        <a:font script="Hans" typeface="等线"/>
+        <a:font script="Hant" typeface="新細明體"/>
+        <a:font script="Arab" typeface="Arial"/>
+        <a:font script="Hebr" typeface="Arial"/>
+        <a:font script="Thai" typeface="Cordia New"/>
+        <a:font script="Ethi" typeface="Nyala"/>
+        <a:font script="Beng" typeface="Vrinda"/>
+        <a:font script="Gujr" typeface="Shruti"/>
+        <a:font script="Khmr" typeface="DaunPenh"/>
+        <a:font script="Knda" typeface="Tunga"/>
+        <a:font script="Guru" typeface="Raavi"/>
+        <a:font script="Cans" typeface="Euphemia"/>
+        <a:font script="Cher" typeface="Plantagenet Cherokee"/>
+        <a:font script="Yiii" typeface="Microsoft Yi Baiti"/>
+        <a:font script="Tibt" typeface="Microsoft Himalaya"/>
+        <a:font script="Thaa" typeface="MV Boli"/>
+        <a:font script="Deva" typeface="Mangal"/>
+        <a:font script="Telu" typeface="Gautami"/>
+        <a:font script="Taml" typeface="Latha"/>
+        <a:font script="Syrc" typeface="Estrangelo Edessa"/>
+        <a:font script="Orya" typeface="Kalinga"/>
+        <a:font script="Mlym" typeface="Kartika"/>
+        <a:font script="Laoo" typeface="DokChampa"/>
+        <a:font script="Sinh" typeface="Iskoola Pota"/>
+        <a:font script="Mong" typeface="Mongolian Baiti"/>
+        <a:font script="Viet" typeface="Arial"/>
+        <a:font script="Uigh" typeface="Microsoft Uighur"/>
+        <a:font script="Geor" typeface="Sylfaen"/>
+        <a:font script="Armn" typeface="Arial"/>
+        <a:font script="Bugi" typeface="Leelawadee UI"/>
+        <a:font script="Bopo" typeface="Microsoft JhengHei"/>
+        <a:font script="Java" typeface="Javanese Text"/>
+        <a:font script="Lisu" typeface="Segoe UI"/>
+        <a:font script="Mymr" typeface="Myanmar Text"/>
+        <a:font script="Nkoo" typeface="Ebrima"/>
+        <a:font script="Olck" typeface="Nirmala UI"/>
+        <a:font script="Osma" typeface="Ebrima"/>
+        <a:font script="Phag" typeface="Phagspa"/>
+        <a:font script="Syrn" typeface="Estrangelo Edessa"/>
+        <a:font script="Syrj" typeface="Estrangelo Edessa"/>
+        <a:font script="Syre" typeface="Estrangelo Edessa"/>
+        <a:font script="Sora" typeface="Nirmala UI"/>
+        <a:font script="Tale" typeface="Microsoft Tai Le"/>
+        <a:font script="Talu" typeface="Microsoft New Tai Lue"/>
+        <a:font script="Tfng" typeface="Ebrima"/>
+      </a:minorFont>
+    </a:fontScheme>
+    <a:fmtScheme name="Office">
+      <a:fillStyleLst>
+        <a:solidFill>
+          <a:schemeClr val="phClr"/>
+        </a:solidFill>
+        <a:gradFill rotWithShape="1">
+          <a:gsLst>
+            <a:gs pos="0">
+              <a:schemeClr val="phClr">
+                <a:lumMod val="110000"/>
+                <a:satMod val="105000"/>
+                <a:tint val="67000"/>
+              </a:schemeClr>
+            </a:gs>
+            <a:gs pos="50000">
+              <a:schemeClr val="phClr">
+                <a:lumMod val="105000"/>
+                <a:satMod val="103000"/>
+                <a:tint val="73000"/>
+              </a:schemeClr>
+            </a:gs>
+            <a:gs pos="100000">
+              <a:schemeClr val="phClr">
+                <a:lumMod val="105000"/>
+                <a:satMod val="109000"/>
+                <a:tint val="81000"/>
+              </a:schemeClr>
+            </a:gs>
+          </a:gsLst>
+          <a:lin ang="5400000" scaled="0"/>
+        </a:gradFill>
+        <a:gradFill rotWithShape="1">
+          <a:gsLst>
+            <a:gs pos="0">
+              <a:schemeClr val="phClr">
+                <a:satMod val="103000"/>
+                <a:lumMod val="102000"/>
+                <a:tint val="94000"/>
+              </a:schemeClr>
+            </a:gs>
+            <a:gs pos="50000">
+              <a:schemeClr val="phClr">
+                <a:satMod val="110000"/>
+                <a:lumMod val="100000"/>
+                <a:shade val="100000"/>
+              </a:schemeClr>
+            </a:gs>
+            <a:gs pos="100000">
+              <a:schemeClr val="phClr">
+                <a:lumMod val="99000"/>
+                <a:satMod val="120000"/>
+                <a:shade val="78000"/>
+              </a:schemeClr>
+            </a:gs>
+          </a:gsLst>
+          <a:lin ang="5400000" scaled="0"/>
+        </a:gradFill>
+      </a:fillStyleLst>
+      <a:lnStyleLst>
+        <a:ln w="6350" cap="flat" cmpd="sng" algn="ctr">
+          <a:solidFill>
+            <a:schemeClr val="phClr"/>
+          </a:solidFill>
+          <a:prstDash val="solid"/>
+          <a:miter lim="800000"/>
+        </a:ln>
+        <a:ln w="12700" cap="flat" cmpd="sng" algn="ctr">
+          <a:solidFill>
+            <a:schemeClr val="phClr"/>
+          </a:solidFill>
+          <a:prstDash val="solid"/>
+          <a:miter lim="800000"/>
+        </a:ln>
+        <a:ln w="19050" cap="flat" cmpd="sng" algn="ctr">
+          <a:solidFill>
+            <a:schemeClr val="phClr"/>
+          </a:solidFill>
+          <a:prstDash val="solid"/>
+          <a:miter lim="800000"/>
+        </a:ln>
+      </a:lnStyleLst>
+      <a:effectStyleLst>
+        <a:effectStyle>
+          <a:effectLst/>
+        </a:effectStyle>
+        <a:effectStyle>
+          <a:effectLst/>
+        </a:effectStyle>
+        <a:effectStyle>
+          <a:effectLst>
+            <a:outerShdw blurRad="57150" dist="19050" dir="5400000" algn="ctr" rotWithShape="0">
+              <a:srgbClr val="000000">
+                <a:alpha val="63000"/>
+              </a:srgbClr>
+            </a:outerShdw>
+          </a:effectLst>
+        </a:effectStyle>
+      </a:effectStyleLst>
+      <a:bgFillStyleLst>
+        <a:solidFill>
+          <a:schemeClr val="phClr"/>
+        </a:solidFill>
+        <a:solidFill>
+          <a:schemeClr val="phClr">
+            <a:tint val="95000"/>
+            <a:satMod val="170000"/>
+          </a:schemeClr>
+        </a:solidFill>
+        <a:gradFill rotWithShape="1">
+          <a:gsLst>
+            <a:gs pos="0">
+              <a:schemeClr val="phClr">
+                <a:tint val="93000"/>
+                <a:satMod val="150000"/>
+                <a:shade val="98000"/>
+                <a:lumMod val="102000"/>
+              </a:schemeClr>
+            </a:gs>
+            <a:gs pos="50000">
+              <a:schemeClr val="phClr">
+                <a:tint val="98000"/>
+                <a:satMod val="130000"/>
+                <a:shade val="90000"/>
+                <a:lumMod val="103000"/>
+              </a:schemeClr>
+            </a:gs>
+            <a:gs pos="100000">
+              <a:schemeClr val="phClr">
+                <a:shade val="63000"/>
+                <a:satMod val="120000"/>
+              </a:schemeClr>
+            </a:gs>
+          </a:gsLst>
+          <a:lin ang="5400000" scaled="0"/>
+        </a:gradFill>
+      </a:bgFillStyleLst>
+    </a:fmtScheme>
+  </a:themeElements>
+  <a:objectDefaults/>
+  <a:extraClrSchemeLst/>
+  <a:extLst>
+    <a:ext uri="{05A4C25C-085E-4340-85A3-A5531E510DB2}">
+      <thm15:themeFamily xmlns:thm15="http://schemas.microsoft.com/office/thememl/2012/main" name="Office Theme" id="{62F939B6-93AF-4DB8-9C6B-D6C7DFDC589F}" vid="{4A3C46E8-61CC-4603-A589-7422A47A8E4A}"/>
+    </a:ext>
+  </a:extLst>
+</a:theme>
 </file>
</xml_diff>

<commit_message>
phase 3 pre: added alexa slide, slight changes to all slides
</commit_message>
<xml_diff>
--- a/phase3_pres.pptx
+++ b/phase3_pres.pptx
@@ -5,19 +5,20 @@
     <p:sldMasterId id="2147483648" r:id="rId1"/>
   </p:sldMasterIdLst>
   <p:notesMasterIdLst>
-    <p:notesMasterId r:id="rId12"/>
+    <p:notesMasterId r:id="rId13"/>
   </p:notesMasterIdLst>
   <p:sldIdLst>
     <p:sldId id="258" r:id="rId2"/>
-    <p:sldId id="261" r:id="rId3"/>
+    <p:sldId id="267" r:id="rId3"/>
     <p:sldId id="264" r:id="rId4"/>
     <p:sldId id="256" r:id="rId5"/>
     <p:sldId id="259" r:id="rId6"/>
     <p:sldId id="260" r:id="rId7"/>
     <p:sldId id="257" r:id="rId8"/>
     <p:sldId id="263" r:id="rId9"/>
-    <p:sldId id="265" r:id="rId10"/>
+    <p:sldId id="266" r:id="rId10"/>
     <p:sldId id="262" r:id="rId11"/>
+    <p:sldId id="265" r:id="rId12"/>
   </p:sldIdLst>
   <p:sldSz cx="12192000" cy="6858000"/>
   <p:notesSz cx="6858000" cy="9144000"/>
@@ -3824,7 +3825,7 @@
             </a:r>
             <a:r>
               <a:rPr lang="en-GB" dirty="0"/>
-              <a:t> </a:t>
+              <a:t> | </a:t>
             </a:r>
             <a:r>
               <a:rPr lang="en-GB" dirty="0" err="1"/>
@@ -3832,7 +3833,7 @@
             </a:r>
             <a:r>
               <a:rPr lang="en-GB" dirty="0"/>
-              <a:t> Maul </a:t>
+              <a:t> Maul | </a:t>
             </a:r>
             <a:r>
               <a:rPr lang="en-GB" dirty="0" err="1"/>
@@ -3844,11 +3845,11 @@
             </a:r>
             <a:r>
               <a:rPr lang="en-GB" dirty="0" err="1"/>
-              <a:t>Stöckin</a:t>
+              <a:t>Stöcklin</a:t>
             </a:r>
             <a:r>
               <a:rPr lang="en-GB" dirty="0"/>
-              <a:t> Sebastian Philipp </a:t>
+              <a:t> | Sebastian Philipp </a:t>
             </a:r>
           </a:p>
           <a:p>
@@ -3862,7 +3863,7 @@
             </a:r>
             <a:r>
               <a:rPr lang="en-GB" dirty="0"/>
-              <a:t> Fabian Neumeier  Lukas </a:t>
+              <a:t> | Fabian Neumeier |  Lukas </a:t>
             </a:r>
             <a:r>
               <a:rPr lang="en-GB" dirty="0" err="1"/>
@@ -3870,7 +3871,7 @@
             </a:r>
             <a:r>
               <a:rPr lang="en-GB" dirty="0"/>
-              <a:t> Manuel </a:t>
+              <a:t> | Manuel </a:t>
             </a:r>
             <a:r>
               <a:rPr lang="en-GB" dirty="0" err="1"/>
@@ -3900,7 +3901,7 @@
             </a:r>
             <a:r>
               <a:rPr lang="en-GB" dirty="0"/>
-              <a:t> Samuel Hugger Clement Francois Joel </a:t>
+              <a:t> |Samuel Hugger | Clement Francois | Joel </a:t>
             </a:r>
             <a:r>
               <a:rPr lang="en-GB" dirty="0" err="1"/>
@@ -3973,8 +3974,8 @@
           </a:p>
         </p:txBody>
       </p:sp>
-      <mc:AlternateContent xmlns:mc="http://schemas.openxmlformats.org/markup-compatibility/2006" xmlns:a14="http://schemas.microsoft.com/office/drawing/2010/main">
-        <mc:Choice Requires="a14">
+      <mc:AlternateContent xmlns:mc="http://schemas.openxmlformats.org/markup-compatibility/2006">
+        <mc:Choice xmlns:a14="http://schemas.microsoft.com/office/drawing/2010/main" Requires="a14">
           <p:sp>
             <p:nvSpPr>
               <p:cNvPr id="3" name="Content Placeholder 2">
@@ -3993,13 +3994,13 @@
             </p:nvSpPr>
             <p:spPr>
               <a:xfrm>
-                <a:off x="838200" y="1825624"/>
-                <a:ext cx="10515600" cy="4590415"/>
+                <a:off x="838200" y="1522072"/>
+                <a:ext cx="10515600" cy="4893968"/>
               </a:xfrm>
             </p:spPr>
             <p:txBody>
               <a:bodyPr>
-                <a:normAutofit lnSpcReduction="10000"/>
+                <a:normAutofit/>
               </a:bodyPr>
               <a:lstStyle/>
               <a:p>
@@ -4070,7 +4071,7 @@
                 </a:r>
                 <a:r>
                   <a:rPr lang="en-GB" dirty="0" err="1"/>
-                  <a:t>verscchlüsselt</a:t>
+                  <a:t>verschlüsselt</a:t>
                 </a:r>
                 <a:endParaRPr lang="en-GB" dirty="0"/>
               </a:p>
@@ -4134,22 +4135,17 @@
                 <a:endParaRPr lang="en-GB" dirty="0"/>
               </a:p>
               <a:p>
-                <a:pPr marL="457200" lvl="1" indent="0">
-                  <a:buNone/>
-                </a:pPr>
-                <a:endParaRPr lang="en-GB" dirty="0"/>
-              </a:p>
-              <a:p>
-                <a:pPr marL="457200" lvl="1" indent="0">
+                <a:pPr marL="0" indent="0">
                   <a:buNone/>
                 </a:pPr>
                 <a:r>
-                  <a:rPr lang="en-GB" dirty="0"/>
-                  <a:t>“Reducing security for the sake of interoperability”</a:t>
+                  <a:rPr lang="en-GB" dirty="0">
+                    <a:solidFill>
+                      <a:schemeClr val="accent6"/>
+                    </a:solidFill>
+                  </a:rPr>
+                  <a:t> </a:t>
                 </a:r>
-              </a:p>
-              <a:p>
-                <a:endParaRPr lang="en-GB" dirty="0"/>
               </a:p>
               <a:p>
                 <a:pPr marL="0" indent="0">
@@ -4161,11 +4157,11 @@
                       <a:schemeClr val="accent6"/>
                     </a:solidFill>
                   </a:rPr>
-                  <a:t> ✔ </a:t>
+                  <a:t>✔ </a:t>
                 </a:r>
                 <a:r>
                   <a:rPr lang="en-GB" dirty="0"/>
-                  <a:t>LED-Matrix</a:t>
+                  <a:t>LED-Matrix | Alexa</a:t>
                 </a:r>
                 <a:endParaRPr lang="en-GB" dirty="0">
                   <a:solidFill>
@@ -4254,12 +4250,27 @@
                 <a:pPr marL="457200" lvl="1" indent="0">
                   <a:buNone/>
                 </a:pPr>
+                <a14:m>
+                  <m:oMath xmlns:m="http://schemas.openxmlformats.org/officeDocument/2006/math">
+                    <m:r>
+                      <a:rPr lang="en-GB" sz="2800" i="1">
+                        <a:latin typeface="Cambria Math" panose="02040503050406030204" pitchFamily="18" charset="0"/>
+                        <a:ea typeface="Cambria Math" panose="02040503050406030204" pitchFamily="18" charset="0"/>
+                      </a:rPr>
+                      <m:t>⇒</m:t>
+                    </m:r>
+                  </m:oMath>
+                </a14:m>
+                <a:r>
+                  <a:rPr lang="en-GB" sz="2800" i="1" dirty="0"/>
+                  <a:t> “Reducing security for the sake of interoperability”</a:t>
+                </a:r>
                 <a:endParaRPr lang="en-GB" sz="2800" dirty="0"/>
               </a:p>
             </p:txBody>
           </p:sp>
         </mc:Choice>
-        <mc:Fallback xmlns="">
+        <mc:Fallback>
           <p:sp>
             <p:nvSpPr>
               <p:cNvPr id="3" name="Content Placeholder 2">
@@ -4278,13 +4289,13 @@
             </p:nvSpPr>
             <p:spPr>
               <a:xfrm>
-                <a:off x="838200" y="1825624"/>
-                <a:ext cx="10515600" cy="4590415"/>
+                <a:off x="838200" y="1522072"/>
+                <a:ext cx="10515600" cy="4893968"/>
               </a:xfrm>
               <a:blipFill>
                 <a:blip r:embed="rId2"/>
                 <a:stretch>
-                  <a:fillRect l="-464" t="-2922"/>
+                  <a:fillRect l="-1217" t="-2117"/>
                 </a:stretch>
               </a:blipFill>
             </p:spPr>
@@ -4336,6 +4347,182 @@
     <p:extLst>
       <p:ext uri="{BB962C8B-B14F-4D97-AF65-F5344CB8AC3E}">
         <p14:creationId xmlns:p14="http://schemas.microsoft.com/office/powerpoint/2010/main" val="2753927759"/>
+      </p:ext>
+    </p:extLst>
+  </p:cSld>
+  <p:clrMapOvr>
+    <a:masterClrMapping/>
+  </p:clrMapOvr>
+</p:sld>
+</file>
+
+<file path=ppt/slides/slide11.xml><?xml version="1.0" encoding="utf-8"?>
+<p:sld xmlns:a="http://schemas.openxmlformats.org/drawingml/2006/main" xmlns:r="http://schemas.openxmlformats.org/officeDocument/2006/relationships" xmlns:p="http://schemas.openxmlformats.org/presentationml/2006/main">
+  <p:cSld>
+    <p:spTree>
+      <p:nvGrpSpPr>
+        <p:cNvPr id="1" name=""/>
+        <p:cNvGrpSpPr/>
+        <p:nvPr/>
+      </p:nvGrpSpPr>
+      <p:grpSpPr>
+        <a:xfrm>
+          <a:off x="0" y="0"/>
+          <a:ext cx="0" cy="0"/>
+          <a:chOff x="0" y="0"/>
+          <a:chExt cx="0" cy="0"/>
+        </a:xfrm>
+      </p:grpSpPr>
+      <p:sp>
+        <p:nvSpPr>
+          <p:cNvPr id="2" name="Title 1">
+            <a:extLst>
+              <a:ext uri="{FF2B5EF4-FFF2-40B4-BE49-F238E27FC236}">
+                <a16:creationId xmlns:a16="http://schemas.microsoft.com/office/drawing/2014/main" id="{50555132-E7A5-4AF7-93D8-39B6ED3DBC78}"/>
+              </a:ext>
+            </a:extLst>
+          </p:cNvPr>
+          <p:cNvSpPr>
+            <a:spLocks noGrp="1"/>
+          </p:cNvSpPr>
+          <p:nvPr>
+            <p:ph type="title"/>
+          </p:nvPr>
+        </p:nvSpPr>
+        <p:spPr/>
+        <p:txBody>
+          <a:bodyPr/>
+          <a:lstStyle/>
+          <a:p>
+            <a:r>
+              <a:rPr lang="en-GB" dirty="0"/>
+              <a:t>VII.	Was nun?</a:t>
+            </a:r>
+          </a:p>
+        </p:txBody>
+      </p:sp>
+      <p:sp>
+        <p:nvSpPr>
+          <p:cNvPr id="3" name="Content Placeholder 2">
+            <a:extLst>
+              <a:ext uri="{FF2B5EF4-FFF2-40B4-BE49-F238E27FC236}">
+                <a16:creationId xmlns:a16="http://schemas.microsoft.com/office/drawing/2014/main" id="{E148372F-2A5B-4550-93F3-C83577A6E214}"/>
+              </a:ext>
+            </a:extLst>
+          </p:cNvPr>
+          <p:cNvSpPr>
+            <a:spLocks noGrp="1"/>
+          </p:cNvSpPr>
+          <p:nvPr>
+            <p:ph idx="1"/>
+          </p:nvPr>
+        </p:nvSpPr>
+        <p:spPr/>
+        <p:txBody>
+          <a:bodyPr/>
+          <a:lstStyle/>
+          <a:p>
+            <a:r>
+              <a:rPr lang="en-GB" dirty="0"/>
+              <a:t>Philips Hue: HTTP </a:t>
+            </a:r>
+            <a:r>
+              <a:rPr lang="en-GB" dirty="0" err="1"/>
+              <a:t>Protokoll</a:t>
+            </a:r>
+            <a:endParaRPr lang="en-GB" dirty="0"/>
+          </a:p>
+          <a:p>
+            <a:endParaRPr lang="en-GB" dirty="0"/>
+          </a:p>
+          <a:p>
+            <a:r>
+              <a:rPr lang="en-GB" dirty="0" err="1"/>
+              <a:t>Angriffe</a:t>
+            </a:r>
+            <a:r>
+              <a:rPr lang="en-GB" dirty="0"/>
+              <a:t> auf SSL/TLS</a:t>
+            </a:r>
+          </a:p>
+          <a:p>
+            <a:endParaRPr lang="en-GB" dirty="0"/>
+          </a:p>
+          <a:p>
+            <a:r>
+              <a:rPr lang="en-GB" dirty="0"/>
+              <a:t>Downgrade auf </a:t>
+            </a:r>
+            <a:r>
+              <a:rPr lang="en-GB" dirty="0" err="1"/>
+              <a:t>ältere</a:t>
+            </a:r>
+            <a:r>
+              <a:rPr lang="en-GB" dirty="0"/>
+              <a:t> </a:t>
+            </a:r>
+            <a:r>
+              <a:rPr lang="en-GB" dirty="0" err="1"/>
+              <a:t>Versionen</a:t>
+            </a:r>
+            <a:endParaRPr lang="en-GB" dirty="0"/>
+          </a:p>
+          <a:p>
+            <a:endParaRPr lang="en-GB" dirty="0"/>
+          </a:p>
+          <a:p>
+            <a:r>
+              <a:rPr lang="en-GB" dirty="0" err="1"/>
+              <a:t>Bekannte</a:t>
+            </a:r>
+            <a:r>
+              <a:rPr lang="en-GB" dirty="0"/>
+              <a:t> Bugs </a:t>
+            </a:r>
+            <a:r>
+              <a:rPr lang="en-GB" dirty="0" err="1"/>
+              <a:t>ausnutzen</a:t>
+            </a:r>
+            <a:r>
+              <a:rPr lang="en-GB" dirty="0"/>
+              <a:t> (DROWN, POODLE,…)</a:t>
+            </a:r>
+          </a:p>
+        </p:txBody>
+      </p:sp>
+      <p:sp>
+        <p:nvSpPr>
+          <p:cNvPr id="4" name="Slide Number Placeholder 3">
+            <a:extLst>
+              <a:ext uri="{FF2B5EF4-FFF2-40B4-BE49-F238E27FC236}">
+                <a16:creationId xmlns:a16="http://schemas.microsoft.com/office/drawing/2014/main" id="{540325DE-FE42-435E-A407-5AC3F837E2E4}"/>
+              </a:ext>
+            </a:extLst>
+          </p:cNvPr>
+          <p:cNvSpPr>
+            <a:spLocks noGrp="1"/>
+          </p:cNvSpPr>
+          <p:nvPr>
+            <p:ph type="sldNum" sz="quarter" idx="12"/>
+          </p:nvPr>
+        </p:nvSpPr>
+        <p:spPr/>
+        <p:txBody>
+          <a:bodyPr/>
+          <a:lstStyle/>
+          <a:p>
+            <a:fld id="{90688A79-C3E9-46B5-89C9-85A34B18BF9C}" type="slidenum">
+              <a:rPr lang="en-GB" smtClean="0"/>
+              <a:t>11</a:t>
+            </a:fld>
+            <a:endParaRPr lang="en-GB"/>
+          </a:p>
+        </p:txBody>
+      </p:sp>
+    </p:spTree>
+    <p:extLst>
+      <p:ext uri="{BB962C8B-B14F-4D97-AF65-F5344CB8AC3E}">
+        <p14:creationId xmlns:p14="http://schemas.microsoft.com/office/powerpoint/2010/main" val="2631955730"/>
       </p:ext>
     </p:extLst>
   </p:cSld>
@@ -4367,7 +4554,7 @@
           <p:cNvPr id="2" name="Title 1">
             <a:extLst>
               <a:ext uri="{FF2B5EF4-FFF2-40B4-BE49-F238E27FC236}">
-                <a16:creationId xmlns:a16="http://schemas.microsoft.com/office/drawing/2014/main" id="{6042EBAB-1B4C-4466-87D4-0DF19A4A042B}"/>
+                <a16:creationId xmlns:a16="http://schemas.microsoft.com/office/drawing/2014/main" id="{40D12BB4-83D1-45BD-8342-9A99996FC179}"/>
               </a:ext>
             </a:extLst>
           </p:cNvPr>
@@ -4396,7 +4583,7 @@
           <p:cNvPr id="3" name="Content Placeholder 2">
             <a:extLst>
               <a:ext uri="{FF2B5EF4-FFF2-40B4-BE49-F238E27FC236}">
-                <a16:creationId xmlns:a16="http://schemas.microsoft.com/office/drawing/2014/main" id="{37FDE17E-6E6E-424D-AFAE-0DDBD94F43DC}"/>
+                <a16:creationId xmlns:a16="http://schemas.microsoft.com/office/drawing/2014/main" id="{F92CC548-2C7C-44CC-807D-33C133F59E58}"/>
               </a:ext>
             </a:extLst>
           </p:cNvPr>
@@ -4409,9 +4596,7 @@
         </p:nvSpPr>
         <p:spPr/>
         <p:txBody>
-          <a:bodyPr>
-            <a:normAutofit/>
-          </a:bodyPr>
+          <a:bodyPr/>
           <a:lstStyle/>
           <a:p>
             <a:pPr marL="571500" indent="-571500">
@@ -4445,26 +4630,6 @@
             </a:r>
           </a:p>
           <a:p>
-            <a:pPr marL="1028700" lvl="1" indent="-571500">
-              <a:buFont typeface="+mj-lt"/>
-              <a:buAutoNum type="romanLcPeriod"/>
-            </a:pPr>
-            <a:r>
-              <a:rPr lang="en-GB" dirty="0"/>
-              <a:t>ARP-Spoof | SSL Strip</a:t>
-            </a:r>
-          </a:p>
-          <a:p>
-            <a:pPr marL="1028700" lvl="1" indent="-571500">
-              <a:buFont typeface="+mj-lt"/>
-              <a:buAutoNum type="romanLcPeriod"/>
-            </a:pPr>
-            <a:r>
-              <a:rPr lang="en-GB" dirty="0"/>
-              <a:t>Playback</a:t>
-            </a:r>
-          </a:p>
-          <a:p>
             <a:pPr marL="571500" indent="-571500">
               <a:buFont typeface="+mj-lt"/>
               <a:buAutoNum type="romanUcPeriod"/>
@@ -4481,7 +4646,7 @@
             </a:pPr>
             <a:r>
               <a:rPr lang="en-GB" dirty="0"/>
-              <a:t>Was nun?</a:t>
+              <a:t>Alexa</a:t>
             </a:r>
           </a:p>
           <a:p>
@@ -4496,12 +4661,43 @@
             <a:endParaRPr lang="en-GB" dirty="0"/>
           </a:p>
           <a:p>
-            <a:pPr lvl="1"/>
+            <a:pPr marL="571500" indent="-571500">
+              <a:buFont typeface="+mj-lt"/>
+              <a:buAutoNum type="romanUcPeriod"/>
+            </a:pPr>
+            <a:r>
+              <a:rPr lang="en-GB" dirty="0"/>
+              <a:t>Was nun?</a:t>
+            </a:r>
+          </a:p>
+          <a:p>
+            <a:pPr marL="571500" indent="-571500">
+              <a:buFont typeface="+mj-lt"/>
+              <a:buAutoNum type="romanUcPeriod"/>
+            </a:pPr>
             <a:endParaRPr lang="en-GB" dirty="0"/>
           </a:p>
           <a:p>
+            <a:pPr marL="571500" indent="-571500">
+              <a:buFont typeface="+mj-lt"/>
+              <a:buAutoNum type="romanUcPeriod"/>
+            </a:pPr>
             <a:endParaRPr lang="en-GB" dirty="0"/>
           </a:p>
+          <a:p>
+            <a:pPr marL="571500" indent="-571500">
+              <a:buFont typeface="+mj-lt"/>
+              <a:buAutoNum type="romanUcPeriod"/>
+            </a:pPr>
+            <a:endParaRPr lang="en-GB" dirty="0"/>
+          </a:p>
+          <a:p>
+            <a:pPr marL="571500" indent="-571500">
+              <a:buFont typeface="+mj-lt"/>
+              <a:buAutoNum type="romanUcPeriod"/>
+            </a:pPr>
+            <a:endParaRPr lang="en-GB" dirty="0"/>
+          </a:p>
         </p:txBody>
       </p:sp>
       <p:sp>
@@ -4509,7 +4705,7 @@
           <p:cNvPr id="4" name="Slide Number Placeholder 3">
             <a:extLst>
               <a:ext uri="{FF2B5EF4-FFF2-40B4-BE49-F238E27FC236}">
-                <a16:creationId xmlns:a16="http://schemas.microsoft.com/office/drawing/2014/main" id="{A263A85F-5ECB-4ACA-AE09-503D3C54A6B3}"/>
+                <a16:creationId xmlns:a16="http://schemas.microsoft.com/office/drawing/2014/main" id="{D2CA8A5D-E785-4B90-B482-1DCD6688011F}"/>
               </a:ext>
             </a:extLst>
           </p:cNvPr>
@@ -4536,7 +4732,7 @@
     </p:spTree>
     <p:extLst>
       <p:ext uri="{BB962C8B-B14F-4D97-AF65-F5344CB8AC3E}">
-        <p14:creationId xmlns:p14="http://schemas.microsoft.com/office/powerpoint/2010/main" val="484358203"/>
+        <p14:creationId xmlns:p14="http://schemas.microsoft.com/office/powerpoint/2010/main" val="1137918642"/>
       </p:ext>
     </p:extLst>
   </p:cSld>
@@ -6075,8 +6271,8 @@
           </a:p>
         </p:txBody>
       </p:sp>
-      <mc:AlternateContent xmlns:mc="http://schemas.openxmlformats.org/markup-compatibility/2006" xmlns:a14="http://schemas.microsoft.com/office/drawing/2010/main">
-        <mc:Choice Requires="a14">
+      <mc:AlternateContent xmlns:mc="http://schemas.openxmlformats.org/markup-compatibility/2006">
+        <mc:Choice xmlns:a14="http://schemas.microsoft.com/office/drawing/2010/main" Requires="a14">
           <p:sp>
             <p:nvSpPr>
               <p:cNvPr id="3" name="Content Placeholder 2">
@@ -6103,6 +6299,17 @@
               <a:bodyPr/>
               <a:lstStyle/>
               <a:p>
+                <a:pPr marL="0" indent="0">
+                  <a:buNone/>
+                </a:pPr>
+                <a:r>
+                  <a:rPr lang="en-GB" dirty="0">
+                    <a:solidFill>
+                      <a:schemeClr val="accent6"/>
+                    </a:solidFill>
+                  </a:rPr>
+                  <a:t>✔ </a:t>
+                </a:r>
                 <a:r>
                   <a:rPr lang="en-GB" dirty="0"/>
                   <a:t>Faking the Gateway | ARP spoofing</a:t>
@@ -6172,6 +6379,17 @@
                 <a:endParaRPr lang="en-GB" dirty="0"/>
               </a:p>
               <a:p>
+                <a:pPr marL="0" indent="0">
+                  <a:buNone/>
+                </a:pPr>
+                <a:r>
+                  <a:rPr lang="en-GB" dirty="0">
+                    <a:solidFill>
+                      <a:schemeClr val="accent6"/>
+                    </a:solidFill>
+                  </a:rPr>
+                  <a:t>✔ </a:t>
+                </a:r>
                 <a:r>
                   <a:rPr lang="en-GB" dirty="0"/>
                   <a:t>SSL Strip</a:t>
@@ -6203,7 +6421,7 @@
             </p:txBody>
           </p:sp>
         </mc:Choice>
-        <mc:Fallback xmlns="">
+        <mc:Fallback>
           <p:sp>
             <p:nvSpPr>
               <p:cNvPr id="3" name="Content Placeholder 2">
@@ -6228,7 +6446,7 @@
               <a:blipFill>
                 <a:blip r:embed="rId2"/>
                 <a:stretch>
-                  <a:fillRect l="-1043" t="-2241"/>
+                  <a:fillRect l="-1217" t="-2661"/>
                 </a:stretch>
               </a:blipFill>
             </p:spPr>
@@ -6334,8 +6552,8 @@
           </a:p>
         </p:txBody>
       </p:sp>
-      <mc:AlternateContent xmlns:mc="http://schemas.openxmlformats.org/markup-compatibility/2006" xmlns:a14="http://schemas.microsoft.com/office/drawing/2010/main">
-        <mc:Choice Requires="a14">
+      <mc:AlternateContent xmlns:mc="http://schemas.openxmlformats.org/markup-compatibility/2006">
+        <mc:Choice xmlns:a14="http://schemas.microsoft.com/office/drawing/2010/main" Requires="a14">
           <p:sp>
             <p:nvSpPr>
               <p:cNvPr id="3" name="Content Placeholder 2">
@@ -6357,6 +6575,17 @@
               <a:bodyPr/>
               <a:lstStyle/>
               <a:p>
+                <a:pPr marL="0" indent="0">
+                  <a:buNone/>
+                </a:pPr>
+                <a:r>
+                  <a:rPr lang="en-GB" dirty="0">
+                    <a:solidFill>
+                      <a:schemeClr val="accent6"/>
+                    </a:solidFill>
+                  </a:rPr>
+                  <a:t>✔ </a:t>
+                </a:r>
                 <a:r>
                   <a:rPr lang="en-GB" dirty="0" err="1"/>
                   <a:t>Blockieren</a:t>
@@ -6401,58 +6630,30 @@
                   <a:rPr lang="en-GB" dirty="0"/>
                   <a:t>Single Sign On Session</a:t>
                 </a:r>
+              </a:p>
+              <a:p>
+                <a:pPr lvl="1"/>
                 <a:endParaRPr lang="en-GB" b="0" dirty="0"/>
               </a:p>
               <a:p>
-                <a:endParaRPr lang="en-GB" dirty="0"/>
+                <a:pPr lvl="1"/>
+                <a:endParaRPr lang="en-GB" b="0" dirty="0"/>
               </a:p>
               <a:p>
+                <a:pPr marL="0" indent="0">
+                  <a:buNone/>
+                </a:pPr>
+                <a:r>
+                  <a:rPr lang="en-GB" dirty="0">
+                    <a:solidFill>
+                      <a:schemeClr val="accent6"/>
+                    </a:solidFill>
+                  </a:rPr>
+                  <a:t>✔ </a:t>
+                </a:r>
                 <a:r>
                   <a:rPr lang="en-GB" dirty="0"/>
-                  <a:t>TCP-Replay 	</a:t>
-                </a:r>
-                <a:r>
-                  <a:rPr lang="en-GB" dirty="0" err="1">
-                    <a:latin typeface="Courier New" panose="02070309020205020404" pitchFamily="49" charset="0"/>
-                    <a:cs typeface="Courier New" panose="02070309020205020404" pitchFamily="49" charset="0"/>
-                  </a:rPr>
-                  <a:t>tcpreplay</a:t>
-                </a:r>
-                <a:r>
-                  <a:rPr lang="en-GB" dirty="0">
-                    <a:latin typeface="Courier New" panose="02070309020205020404" pitchFamily="49" charset="0"/>
-                    <a:cs typeface="Courier New" panose="02070309020205020404" pitchFamily="49" charset="0"/>
-                  </a:rPr>
-                  <a:t> –</a:t>
-                </a:r>
-                <a:r>
-                  <a:rPr lang="en-GB" dirty="0" err="1">
-                    <a:latin typeface="Courier New" panose="02070309020205020404" pitchFamily="49" charset="0"/>
-                    <a:cs typeface="Courier New" panose="02070309020205020404" pitchFamily="49" charset="0"/>
-                  </a:rPr>
-                  <a:t>intf</a:t>
-                </a:r>
-                <a:r>
-                  <a:rPr lang="en-GB" dirty="0">
-                    <a:latin typeface="Courier New" panose="02070309020205020404" pitchFamily="49" charset="0"/>
-                    <a:cs typeface="Courier New" panose="02070309020205020404" pitchFamily="49" charset="0"/>
-                  </a:rPr>
-                  <a:t>=wlan0 </a:t>
-                </a:r>
-                <a:r>
-                  <a:rPr lang="en-GB" dirty="0" err="1">
-                    <a:latin typeface="Courier New" panose="02070309020205020404" pitchFamily="49" charset="0"/>
-                    <a:cs typeface="Courier New" panose="02070309020205020404" pitchFamily="49" charset="0"/>
-                  </a:rPr>
-                  <a:t>capt.pcap</a:t>
-                </a:r>
-                <a:endParaRPr lang="en-GB" dirty="0"/>
-              </a:p>
-              <a:p>
-                <a:pPr lvl="1"/>
-                <a:r>
-                  <a:rPr lang="en-GB" dirty="0"/>
-                  <a:t>REVERSE ENGINEERING</a:t>
+                  <a:t>Reverse engineering</a:t>
                 </a:r>
               </a:p>
               <a:p>
@@ -6488,7 +6689,7 @@
                 </a:r>
                 <a:r>
                   <a:rPr lang="en-GB" dirty="0" err="1"/>
-                  <a:t>abgefangen</a:t>
+                  <a:t>abfangen</a:t>
                 </a:r>
                 <a:r>
                   <a:rPr lang="en-GB" dirty="0"/>
@@ -6520,7 +6721,7 @@
             </p:txBody>
           </p:sp>
         </mc:Choice>
-        <mc:Fallback xmlns="">
+        <mc:Fallback>
           <p:sp>
             <p:nvSpPr>
               <p:cNvPr id="3" name="Content Placeholder 2">
@@ -6541,7 +6742,7 @@
               <a:blipFill>
                 <a:blip r:embed="rId2"/>
                 <a:stretch>
-                  <a:fillRect l="-1043" t="-2241"/>
+                  <a:fillRect l="-1217" t="-2661"/>
                 </a:stretch>
               </a:blipFill>
             </p:spPr>
@@ -6756,7 +6957,7 @@
             </a:r>
             <a:r>
               <a:rPr lang="en-GB" sz="2800" dirty="0"/>
-              <a:t>-Chip ATWINC 1500 </a:t>
+              <a:t>-Chip ATWINC1500 </a:t>
             </a:r>
             <a:r>
               <a:rPr lang="en-GB" sz="2800" dirty="0" err="1"/>
@@ -7826,107 +8027,189 @@
           </a:p>
         </p:txBody>
       </p:sp>
-      <p:sp>
-        <p:nvSpPr>
-          <p:cNvPr id="3" name="Content Placeholder 2">
-            <a:extLst>
-              <a:ext uri="{FF2B5EF4-FFF2-40B4-BE49-F238E27FC236}">
-                <a16:creationId xmlns:a16="http://schemas.microsoft.com/office/drawing/2014/main" id="{785FB957-94DA-4751-8DA3-4A9737E2E23F}"/>
-              </a:ext>
-            </a:extLst>
-          </p:cNvPr>
-          <p:cNvSpPr>
-            <a:spLocks noGrp="1"/>
-          </p:cNvSpPr>
-          <p:nvPr>
-            <p:ph idx="1"/>
-          </p:nvPr>
-        </p:nvSpPr>
-        <p:spPr/>
-        <p:txBody>
-          <a:bodyPr/>
-          <a:lstStyle/>
-          <a:p>
-            <a:r>
-              <a:rPr lang="en-GB" dirty="0" err="1"/>
-              <a:t>Blockieren</a:t>
-            </a:r>
-            <a:r>
-              <a:rPr lang="en-GB" dirty="0"/>
-              <a:t> Port 443, </a:t>
-            </a:r>
-            <a:r>
-              <a:rPr lang="en-GB" dirty="0" err="1"/>
-              <a:t>Ausweichen</a:t>
-            </a:r>
-            <a:r>
-              <a:rPr lang="en-GB" dirty="0"/>
-              <a:t> auf Port 80</a:t>
-            </a:r>
-          </a:p>
-          <a:p>
-            <a:pPr lvl="1"/>
-            <a:r>
-              <a:rPr lang="en-GB" dirty="0" err="1"/>
-              <a:t>Keine</a:t>
-            </a:r>
-            <a:r>
-              <a:rPr lang="en-GB" dirty="0"/>
-              <a:t> </a:t>
-            </a:r>
-            <a:r>
-              <a:rPr lang="en-GB" dirty="0" err="1"/>
-              <a:t>Verbindung</a:t>
-            </a:r>
-            <a:endParaRPr lang="en-GB" dirty="0"/>
-          </a:p>
-          <a:p>
-            <a:endParaRPr lang="en-GB" dirty="0"/>
-          </a:p>
-          <a:p>
-            <a:r>
-              <a:rPr lang="en-GB" dirty="0"/>
-              <a:t>ARP-Spoof &amp; SSL-Strip</a:t>
-            </a:r>
-          </a:p>
-          <a:p>
-            <a:pPr lvl="1"/>
-            <a:r>
-              <a:rPr lang="en-GB" dirty="0" err="1"/>
-              <a:t>nutzlos</a:t>
-            </a:r>
-            <a:endParaRPr lang="en-GB" dirty="0"/>
-          </a:p>
-          <a:p>
-            <a:endParaRPr lang="en-GB" dirty="0"/>
-          </a:p>
-          <a:p>
-            <a:r>
-              <a:rPr lang="en-GB" dirty="0"/>
-              <a:t>SSL-Sniff</a:t>
-            </a:r>
-          </a:p>
-          <a:p>
-            <a:pPr lvl="1"/>
-            <a:r>
-              <a:rPr lang="en-GB" dirty="0"/>
-              <a:t>Auch </a:t>
-            </a:r>
-            <a:r>
-              <a:rPr lang="en-GB" dirty="0" err="1"/>
-              <a:t>nicht</a:t>
-            </a:r>
-            <a:endParaRPr lang="en-GB" dirty="0"/>
-          </a:p>
-          <a:p>
-            <a:pPr lvl="1"/>
-            <a:endParaRPr lang="en-GB" dirty="0"/>
-          </a:p>
-          <a:p>
-            <a:endParaRPr lang="en-GB" dirty="0"/>
-          </a:p>
-        </p:txBody>
-      </p:sp>
+      <mc:AlternateContent xmlns:mc="http://schemas.openxmlformats.org/markup-compatibility/2006">
+        <mc:Choice xmlns:a14="http://schemas.microsoft.com/office/drawing/2010/main" Requires="a14">
+          <p:sp>
+            <p:nvSpPr>
+              <p:cNvPr id="3" name="Content Placeholder 2">
+                <a:extLst>
+                  <a:ext uri="{FF2B5EF4-FFF2-40B4-BE49-F238E27FC236}">
+                    <a16:creationId xmlns:a16="http://schemas.microsoft.com/office/drawing/2014/main" id="{785FB957-94DA-4751-8DA3-4A9737E2E23F}"/>
+                  </a:ext>
+                </a:extLst>
+              </p:cNvPr>
+              <p:cNvSpPr>
+                <a:spLocks noGrp="1"/>
+              </p:cNvSpPr>
+              <p:nvPr>
+                <p:ph idx="1"/>
+              </p:nvPr>
+            </p:nvSpPr>
+            <p:spPr/>
+            <p:txBody>
+              <a:bodyPr/>
+              <a:lstStyle/>
+              <a:p>
+                <a:pPr marL="0" indent="0">
+                  <a:buNone/>
+                </a:pPr>
+                <a14:m>
+                  <m:oMath xmlns:m="http://schemas.openxmlformats.org/officeDocument/2006/math">
+                    <m:r>
+                      <a:rPr lang="en-GB" b="1" i="1">
+                        <a:solidFill>
+                          <a:srgbClr val="FF0000"/>
+                        </a:solidFill>
+                        <a:latin typeface="Cambria Math" panose="02040503050406030204" pitchFamily="18" charset="0"/>
+                        <a:ea typeface="Cambria Math" panose="02040503050406030204" pitchFamily="18" charset="0"/>
+                      </a:rPr>
+                      <m:t>× </m:t>
+                    </m:r>
+                  </m:oMath>
+                </a14:m>
+                <a:r>
+                  <a:rPr lang="en-GB" dirty="0" err="1"/>
+                  <a:t>blockieren</a:t>
+                </a:r>
+                <a:r>
+                  <a:rPr lang="en-GB" dirty="0"/>
+                  <a:t> Port 443, </a:t>
+                </a:r>
+                <a:r>
+                  <a:rPr lang="en-GB" dirty="0" err="1"/>
+                  <a:t>Ausweichen</a:t>
+                </a:r>
+                <a:r>
+                  <a:rPr lang="en-GB" dirty="0"/>
+                  <a:t> auf Port 80</a:t>
+                </a:r>
+              </a:p>
+              <a:p>
+                <a:pPr lvl="1"/>
+                <a:r>
+                  <a:rPr lang="en-GB" dirty="0" err="1"/>
+                  <a:t>Keine</a:t>
+                </a:r>
+                <a:r>
+                  <a:rPr lang="en-GB" dirty="0"/>
+                  <a:t> </a:t>
+                </a:r>
+                <a:r>
+                  <a:rPr lang="en-GB" dirty="0" err="1"/>
+                  <a:t>Verbindung</a:t>
+                </a:r>
+                <a:endParaRPr lang="en-GB" dirty="0"/>
+              </a:p>
+              <a:p>
+                <a:endParaRPr lang="en-GB" dirty="0"/>
+              </a:p>
+              <a:p>
+                <a:pPr marL="0" indent="0">
+                  <a:buNone/>
+                </a:pPr>
+                <a14:m>
+                  <m:oMath xmlns:m="http://schemas.openxmlformats.org/officeDocument/2006/math">
+                    <m:r>
+                      <a:rPr lang="en-GB" b="1" i="1">
+                        <a:solidFill>
+                          <a:srgbClr val="FF0000"/>
+                        </a:solidFill>
+                        <a:latin typeface="Cambria Math" panose="02040503050406030204" pitchFamily="18" charset="0"/>
+                        <a:ea typeface="Cambria Math" panose="02040503050406030204" pitchFamily="18" charset="0"/>
+                      </a:rPr>
+                      <m:t>× </m:t>
+                    </m:r>
+                  </m:oMath>
+                </a14:m>
+                <a:r>
+                  <a:rPr lang="en-GB" dirty="0"/>
+                  <a:t>ARP-Spoof &amp; SSL-Strip</a:t>
+                </a:r>
+              </a:p>
+              <a:p>
+                <a:pPr lvl="1"/>
+                <a:r>
+                  <a:rPr lang="en-GB" dirty="0" err="1"/>
+                  <a:t>nutzlos</a:t>
+                </a:r>
+                <a:endParaRPr lang="en-GB" dirty="0"/>
+              </a:p>
+              <a:p>
+                <a:endParaRPr lang="en-GB" dirty="0"/>
+              </a:p>
+              <a:p>
+                <a:pPr marL="0" indent="0">
+                  <a:buNone/>
+                </a:pPr>
+                <a14:m>
+                  <m:oMath xmlns:m="http://schemas.openxmlformats.org/officeDocument/2006/math">
+                    <m:r>
+                      <a:rPr lang="en-GB" b="1" i="1">
+                        <a:solidFill>
+                          <a:srgbClr val="FF0000"/>
+                        </a:solidFill>
+                        <a:latin typeface="Cambria Math" panose="02040503050406030204" pitchFamily="18" charset="0"/>
+                        <a:ea typeface="Cambria Math" panose="02040503050406030204" pitchFamily="18" charset="0"/>
+                      </a:rPr>
+                      <m:t>× </m:t>
+                    </m:r>
+                  </m:oMath>
+                </a14:m>
+                <a:r>
+                  <a:rPr lang="en-GB" dirty="0"/>
+                  <a:t>SSL-Sniff</a:t>
+                </a:r>
+              </a:p>
+              <a:p>
+                <a:pPr lvl="1"/>
+                <a:endParaRPr lang="en-GB" dirty="0"/>
+              </a:p>
+              <a:p>
+                <a:endParaRPr lang="en-GB" dirty="0"/>
+              </a:p>
+            </p:txBody>
+          </p:sp>
+        </mc:Choice>
+        <mc:Fallback>
+          <p:sp>
+            <p:nvSpPr>
+              <p:cNvPr id="3" name="Content Placeholder 2">
+                <a:extLst>
+                  <a:ext uri="{FF2B5EF4-FFF2-40B4-BE49-F238E27FC236}">
+                    <a16:creationId xmlns:a16="http://schemas.microsoft.com/office/drawing/2014/main" id="{785FB957-94DA-4751-8DA3-4A9737E2E23F}"/>
+                  </a:ext>
+                </a:extLst>
+              </p:cNvPr>
+              <p:cNvSpPr>
+                <a:spLocks noGrp="1" noRot="1" noChangeAspect="1" noMove="1" noResize="1" noEditPoints="1" noAdjustHandles="1" noChangeArrowheads="1" noChangeShapeType="1" noTextEdit="1"/>
+              </p:cNvSpPr>
+              <p:nvPr>
+                <p:ph idx="1"/>
+              </p:nvPr>
+            </p:nvSpPr>
+            <p:spPr>
+              <a:blipFill>
+                <a:blip r:embed="rId2"/>
+                <a:stretch>
+                  <a:fillRect t="-2241"/>
+                </a:stretch>
+              </a:blipFill>
+            </p:spPr>
+            <p:txBody>
+              <a:bodyPr/>
+              <a:lstStyle/>
+              <a:p>
+                <a:r>
+                  <a:rPr lang="en-GB">
+                    <a:noFill/>
+                  </a:rPr>
+                  <a:t> </a:t>
+                </a:r>
+              </a:p>
+            </p:txBody>
+          </p:sp>
+        </mc:Fallback>
+      </mc:AlternateContent>
       <p:sp>
         <p:nvSpPr>
           <p:cNvPr id="4" name="Slide Number Placeholder 3">
@@ -7991,7 +8274,7 @@
           <p:cNvPr id="2" name="Title 1">
             <a:extLst>
               <a:ext uri="{FF2B5EF4-FFF2-40B4-BE49-F238E27FC236}">
-                <a16:creationId xmlns:a16="http://schemas.microsoft.com/office/drawing/2014/main" id="{50555132-E7A5-4AF7-93D8-39B6ED3DBC78}"/>
+                <a16:creationId xmlns:a16="http://schemas.microsoft.com/office/drawing/2014/main" id="{FA67DADD-4830-4D25-BAB5-512E826375E3}"/>
               </a:ext>
             </a:extLst>
           </p:cNvPr>
@@ -8009,7 +8292,7 @@
           <a:p>
             <a:r>
               <a:rPr lang="en-GB" dirty="0"/>
-              <a:t>V.	Was nun?</a:t>
+              <a:t>V. Alexa</a:t>
             </a:r>
           </a:p>
         </p:txBody>
@@ -8019,7 +8302,7 @@
           <p:cNvPr id="3" name="Content Placeholder 2">
             <a:extLst>
               <a:ext uri="{FF2B5EF4-FFF2-40B4-BE49-F238E27FC236}">
-                <a16:creationId xmlns:a16="http://schemas.microsoft.com/office/drawing/2014/main" id="{E148372F-2A5B-4550-93F3-C83577A6E214}"/>
+                <a16:creationId xmlns:a16="http://schemas.microsoft.com/office/drawing/2014/main" id="{CAC024D7-8870-435E-A69E-38F6A4DCD8C2}"/>
               </a:ext>
             </a:extLst>
           </p:cNvPr>
@@ -8036,39 +8319,16 @@
           <a:lstStyle/>
           <a:p>
             <a:r>
+              <a:rPr lang="en-GB" dirty="0" err="1"/>
+              <a:t>Versucht</a:t>
+            </a:r>
+            <a:r>
               <a:rPr lang="en-GB" dirty="0"/>
-              <a:t>Philips Hue: HTTP </a:t>
+              <a:t>: </a:t>
             </a:r>
             <a:r>
               <a:rPr lang="en-GB" dirty="0" err="1"/>
-              <a:t>Protokoll</a:t>
-            </a:r>
-            <a:endParaRPr lang="en-GB" dirty="0"/>
-          </a:p>
-          <a:p>
-            <a:endParaRPr lang="en-GB" dirty="0"/>
-          </a:p>
-          <a:p>
-            <a:r>
-              <a:rPr lang="en-GB" dirty="0" err="1"/>
-              <a:t>Angriffe</a:t>
-            </a:r>
-            <a:r>
-              <a:rPr lang="en-GB" dirty="0"/>
-              <a:t> auf SSL/TLS</a:t>
-            </a:r>
-          </a:p>
-          <a:p>
-            <a:endParaRPr lang="en-GB" dirty="0"/>
-          </a:p>
-          <a:p>
-            <a:r>
-              <a:rPr lang="en-GB" dirty="0"/>
-              <a:t>Downgrade auf </a:t>
-            </a:r>
-            <a:r>
-              <a:rPr lang="en-GB" dirty="0" err="1"/>
-              <a:t>ältere</a:t>
+              <a:t>Resultate</a:t>
             </a:r>
             <a:r>
               <a:rPr lang="en-GB" dirty="0"/>
@@ -8076,8 +8336,22 @@
             </a:r>
             <a:r>
               <a:rPr lang="en-GB" dirty="0" err="1"/>
-              <a:t>Versionen</a:t>
-            </a:r>
+              <a:t>wie</a:t>
+            </a:r>
+            <a:r>
+              <a:rPr lang="en-GB" dirty="0"/>
+              <a:t> </a:t>
+            </a:r>
+            <a:r>
+              <a:rPr lang="en-GB" dirty="0" err="1"/>
+              <a:t>bei</a:t>
+            </a:r>
+            <a:r>
+              <a:rPr lang="en-GB" dirty="0"/>
+              <a:t> LED-Matrix</a:t>
+            </a:r>
+          </a:p>
+          <a:p>
             <a:endParaRPr lang="en-GB" dirty="0"/>
           </a:p>
           <a:p>
@@ -8085,21 +8359,42 @@
           </a:p>
           <a:p>
             <a:r>
+              <a:rPr lang="en-GB" dirty="0"/>
+              <a:t>Certificate Pinning</a:t>
+            </a:r>
+          </a:p>
+          <a:p>
+            <a:pPr marL="457200" lvl="1" indent="0">
+              <a:buNone/>
+            </a:pPr>
+            <a:r>
+              <a:rPr lang="en-GB"/>
+              <a:t>SSL-Sniff</a:t>
+            </a:r>
+            <a:endParaRPr lang="en-GB" dirty="0"/>
+          </a:p>
+          <a:p>
+            <a:pPr lvl="1"/>
+            <a:r>
               <a:rPr lang="en-GB" dirty="0" err="1"/>
-              <a:t>Bekannte</a:t>
+              <a:t>ähnlich</a:t>
             </a:r>
             <a:r>
               <a:rPr lang="en-GB" dirty="0"/>
-              <a:t> Bugs </a:t>
+              <a:t> </a:t>
             </a:r>
             <a:r>
               <a:rPr lang="en-GB" dirty="0" err="1"/>
-              <a:t>ausnutzen</a:t>
+              <a:t>auch</a:t>
             </a:r>
             <a:r>
               <a:rPr lang="en-GB" dirty="0"/>
-              <a:t> (DROWN, POODLE)</a:t>
-            </a:r>
+              <a:t> auf ATWINC1500 </a:t>
+            </a:r>
+          </a:p>
+          <a:p>
+            <a:pPr lvl="1"/>
+            <a:endParaRPr lang="en-GB" dirty="0"/>
           </a:p>
         </p:txBody>
       </p:sp>
@@ -8108,7 +8403,7 @@
           <p:cNvPr id="4" name="Slide Number Placeholder 3">
             <a:extLst>
               <a:ext uri="{FF2B5EF4-FFF2-40B4-BE49-F238E27FC236}">
-                <a16:creationId xmlns:a16="http://schemas.microsoft.com/office/drawing/2014/main" id="{540325DE-FE42-435E-A407-5AC3F837E2E4}"/>
+                <a16:creationId xmlns:a16="http://schemas.microsoft.com/office/drawing/2014/main" id="{762C7DEC-383A-4861-A465-33E9691D3D39}"/>
               </a:ext>
             </a:extLst>
           </p:cNvPr>
@@ -8135,7 +8430,7 @@
     </p:spTree>
     <p:extLst>
       <p:ext uri="{BB962C8B-B14F-4D97-AF65-F5344CB8AC3E}">
-        <p14:creationId xmlns:p14="http://schemas.microsoft.com/office/powerpoint/2010/main" val="2631955730"/>
+        <p14:creationId xmlns:p14="http://schemas.microsoft.com/office/powerpoint/2010/main" val="45456570"/>
       </p:ext>
     </p:extLst>
   </p:cSld>

</xml_diff>

<commit_message>
phase 3 pre: edited those slides (bullets and the like)
</commit_message>
<xml_diff>
--- a/phase3_pres.pptx
+++ b/phase3_pres.pptx
@@ -4008,16 +4008,162 @@
                   <a:buNone/>
                 </a:pPr>
                 <a:r>
-                  <a:rPr lang="en-GB" b="1" dirty="0">
+                  <a:rPr lang="en-GB" dirty="0">
                     <a:solidFill>
                       <a:srgbClr val="FF0000"/>
                     </a:solidFill>
-                    <a:ea typeface="Cambria Math" panose="02040503050406030204" pitchFamily="18" charset="0"/>
+                  </a:rPr>
+                  <a:t>✔</a:t>
+                </a:r>
+                <a:r>
+                  <a:rPr lang="en-GB" dirty="0">
+                    <a:solidFill>
+                      <a:schemeClr val="accent6"/>
+                    </a:solidFill>
                   </a:rPr>
                   <a:t> </a:t>
                 </a:r>
+                <a:r>
+                  <a:rPr lang="en-GB" dirty="0"/>
+                  <a:t>Philips Hue 						</a:t>
+                </a:r>
+              </a:p>
+              <a:p>
+                <a:pPr lvl="1"/>
+                <a:r>
+                  <a:rPr lang="en-GB" dirty="0" err="1"/>
+                  <a:t>Kommunikation</a:t>
+                </a:r>
+                <a:r>
+                  <a:rPr lang="en-GB" dirty="0"/>
+                  <a:t> </a:t>
+                </a:r>
+                <a:r>
+                  <a:rPr lang="en-GB" dirty="0" err="1"/>
+                  <a:t>mit</a:t>
+                </a:r>
+                <a:r>
+                  <a:rPr lang="en-GB" dirty="0"/>
+                  <a:t> den </a:t>
+                </a:r>
+                <a:r>
+                  <a:rPr lang="en-GB" dirty="0" err="1"/>
+                  <a:t>Servern</a:t>
+                </a:r>
+                <a:r>
+                  <a:rPr lang="en-GB" dirty="0"/>
+                  <a:t> </a:t>
+                </a:r>
+                <a:r>
+                  <a:rPr lang="en-GB" dirty="0" err="1"/>
+                  <a:t>ist</a:t>
+                </a:r>
+                <a:r>
+                  <a:rPr lang="en-GB" dirty="0"/>
+                  <a:t> </a:t>
+                </a:r>
+                <a:r>
+                  <a:rPr lang="en-GB" dirty="0" err="1"/>
+                  <a:t>verschlüsselt</a:t>
+                </a:r>
+                <a:endParaRPr lang="en-GB" dirty="0"/>
+              </a:p>
+              <a:p>
+                <a:pPr marL="457200" lvl="1" indent="0">
+                  <a:buNone/>
+                </a:pPr>
+                <a:r>
+                  <a:rPr lang="en-GB" dirty="0"/>
+                  <a:t>	ABER</a:t>
+                </a:r>
+              </a:p>
+              <a:p>
+                <a:pPr lvl="1"/>
+                <a:r>
+                  <a:rPr lang="en-GB" dirty="0" err="1"/>
+                  <a:t>Im</a:t>
+                </a:r>
+                <a:r>
+                  <a:rPr lang="en-GB" dirty="0"/>
+                  <a:t> </a:t>
+                </a:r>
+                <a:r>
+                  <a:rPr lang="en-GB" dirty="0" err="1"/>
+                  <a:t>Netzwerk</a:t>
+                </a:r>
+                <a:r>
+                  <a:rPr lang="en-GB" dirty="0"/>
+                  <a:t> </a:t>
+                </a:r>
+                <a:r>
+                  <a:rPr lang="en-GB" dirty="0" err="1"/>
+                  <a:t>kann</a:t>
+                </a:r>
+                <a:r>
+                  <a:rPr lang="en-GB" dirty="0"/>
+                  <a:t> man </a:t>
+                </a:r>
+                <a:r>
+                  <a:rPr lang="en-GB" sz="2300" dirty="0">
+                    <a:cs typeface="Courier New" panose="02070309020205020404" pitchFamily="49" charset="0"/>
+                  </a:rPr>
+                  <a:t>HTTP</a:t>
+                </a:r>
+                <a:r>
+                  <a:rPr lang="en-GB" dirty="0"/>
+                  <a:t> </a:t>
+                </a:r>
+                <a:r>
+                  <a:rPr lang="en-GB" dirty="0" err="1"/>
+                  <a:t>Pakete</a:t>
+                </a:r>
+                <a:r>
+                  <a:rPr lang="en-GB" dirty="0"/>
+                  <a:t> </a:t>
+                </a:r>
+                <a:r>
+                  <a:rPr lang="en-GB" dirty="0" err="1"/>
+                  <a:t>verschicken</a:t>
+                </a:r>
+                <a:endParaRPr lang="en-GB" dirty="0"/>
+              </a:p>
+              <a:p>
+                <a:pPr marL="0" indent="0">
+                  <a:buNone/>
+                </a:pPr>
+                <a:r>
+                  <a:rPr lang="en-GB" dirty="0">
+                    <a:solidFill>
+                      <a:schemeClr val="accent6"/>
+                    </a:solidFill>
+                  </a:rPr>
+                  <a:t> </a:t>
+                </a:r>
+              </a:p>
+              <a:p>
+                <a:pPr marL="0" indent="0">
+                  <a:buNone/>
+                </a:pPr>
+                <a:r>
+                  <a:rPr lang="en-GB" dirty="0">
+                    <a:solidFill>
+                      <a:schemeClr val="accent6"/>
+                    </a:solidFill>
+                  </a:rPr>
+                  <a:t> </a:t>
+                </a:r>
                 <a14:m>
                   <m:oMath xmlns:m="http://schemas.openxmlformats.org/officeDocument/2006/math">
+                    <m:r>
+                      <a:rPr lang="en-GB" b="1" i="1" smtClean="0">
+                        <a:solidFill>
+                          <a:schemeClr val="accent6"/>
+                        </a:solidFill>
+                        <a:latin typeface="Cambria Math" panose="02040503050406030204" pitchFamily="18" charset="0"/>
+                        <a:ea typeface="Cambria Math" panose="02040503050406030204" pitchFamily="18" charset="0"/>
+                      </a:rPr>
+                      <m:t>×</m:t>
+                    </m:r>
                     <m:r>
                       <a:rPr lang="en-GB" b="1" i="1">
                         <a:solidFill>
@@ -4026,139 +4172,10 @@
                         <a:latin typeface="Cambria Math" panose="02040503050406030204" pitchFamily="18" charset="0"/>
                         <a:ea typeface="Cambria Math" panose="02040503050406030204" pitchFamily="18" charset="0"/>
                       </a:rPr>
-                      <m:t>×</m:t>
+                      <m:t> </m:t>
                     </m:r>
                   </m:oMath>
                 </a14:m>
-                <a:r>
-                  <a:rPr lang="en-GB" dirty="0"/>
-                  <a:t> Philips Hue 						</a:t>
-                </a:r>
-              </a:p>
-              <a:p>
-                <a:pPr lvl="1"/>
-                <a:r>
-                  <a:rPr lang="en-GB" dirty="0" err="1"/>
-                  <a:t>Kommunikation</a:t>
-                </a:r>
-                <a:r>
-                  <a:rPr lang="en-GB" dirty="0"/>
-                  <a:t> </a:t>
-                </a:r>
-                <a:r>
-                  <a:rPr lang="en-GB" dirty="0" err="1"/>
-                  <a:t>mit</a:t>
-                </a:r>
-                <a:r>
-                  <a:rPr lang="en-GB" dirty="0"/>
-                  <a:t> den </a:t>
-                </a:r>
-                <a:r>
-                  <a:rPr lang="en-GB" dirty="0" err="1"/>
-                  <a:t>Servern</a:t>
-                </a:r>
-                <a:r>
-                  <a:rPr lang="en-GB" dirty="0"/>
-                  <a:t> </a:t>
-                </a:r>
-                <a:r>
-                  <a:rPr lang="en-GB" dirty="0" err="1"/>
-                  <a:t>ist</a:t>
-                </a:r>
-                <a:r>
-                  <a:rPr lang="en-GB" dirty="0"/>
-                  <a:t> </a:t>
-                </a:r>
-                <a:r>
-                  <a:rPr lang="en-GB" dirty="0" err="1"/>
-                  <a:t>verschlüsselt</a:t>
-                </a:r>
-                <a:endParaRPr lang="en-GB" dirty="0"/>
-              </a:p>
-              <a:p>
-                <a:pPr marL="457200" lvl="1" indent="0">
-                  <a:buNone/>
-                </a:pPr>
-                <a:r>
-                  <a:rPr lang="en-GB" dirty="0"/>
-                  <a:t>	ABER</a:t>
-                </a:r>
-              </a:p>
-              <a:p>
-                <a:pPr lvl="1"/>
-                <a:r>
-                  <a:rPr lang="en-GB" dirty="0" err="1"/>
-                  <a:t>Im</a:t>
-                </a:r>
-                <a:r>
-                  <a:rPr lang="en-GB" dirty="0"/>
-                  <a:t> </a:t>
-                </a:r>
-                <a:r>
-                  <a:rPr lang="en-GB" dirty="0" err="1"/>
-                  <a:t>Netzwerk</a:t>
-                </a:r>
-                <a:r>
-                  <a:rPr lang="en-GB" dirty="0"/>
-                  <a:t> </a:t>
-                </a:r>
-                <a:r>
-                  <a:rPr lang="en-GB" dirty="0" err="1"/>
-                  <a:t>kann</a:t>
-                </a:r>
-                <a:r>
-                  <a:rPr lang="en-GB" dirty="0"/>
-                  <a:t> man </a:t>
-                </a:r>
-                <a:r>
-                  <a:rPr lang="en-GB" sz="2300" dirty="0">
-                    <a:cs typeface="Courier New" panose="02070309020205020404" pitchFamily="49" charset="0"/>
-                  </a:rPr>
-                  <a:t>HTTP</a:t>
-                </a:r>
-                <a:r>
-                  <a:rPr lang="en-GB" dirty="0"/>
-                  <a:t> </a:t>
-                </a:r>
-                <a:r>
-                  <a:rPr lang="en-GB" dirty="0" err="1"/>
-                  <a:t>Pakete</a:t>
-                </a:r>
-                <a:r>
-                  <a:rPr lang="en-GB" dirty="0"/>
-                  <a:t> </a:t>
-                </a:r>
-                <a:r>
-                  <a:rPr lang="en-GB" dirty="0" err="1"/>
-                  <a:t>verschicken</a:t>
-                </a:r>
-                <a:endParaRPr lang="en-GB" dirty="0"/>
-              </a:p>
-              <a:p>
-                <a:pPr marL="0" indent="0">
-                  <a:buNone/>
-                </a:pPr>
-                <a:r>
-                  <a:rPr lang="en-GB" dirty="0">
-                    <a:solidFill>
-                      <a:schemeClr val="accent6"/>
-                    </a:solidFill>
-                  </a:rPr>
-                  <a:t> </a:t>
-                </a:r>
-              </a:p>
-              <a:p>
-                <a:pPr marL="0" indent="0">
-                  <a:buNone/>
-                </a:pPr>
-                <a:r>
-                  <a:rPr lang="en-GB" dirty="0">
-                    <a:solidFill>
-                      <a:schemeClr val="accent6"/>
-                    </a:solidFill>
-                  </a:rPr>
-                  <a:t>✔ </a:t>
-                </a:r>
                 <a:r>
                   <a:rPr lang="en-GB" dirty="0"/>
                   <a:t>LED-Matrix | Alexa</a:t>
@@ -4295,7 +4312,7 @@
               <a:blipFill>
                 <a:blip r:embed="rId2"/>
                 <a:stretch>
-                  <a:fillRect l="-1217" t="-2117"/>
+                  <a:fillRect l="-1217" t="-2491"/>
                 </a:stretch>
               </a:blipFill>
             </p:spPr>
@@ -4516,6 +4533,68 @@
               <a:t>11</a:t>
             </a:fld>
             <a:endParaRPr lang="en-GB"/>
+          </a:p>
+        </p:txBody>
+      </p:sp>
+      <p:sp>
+        <p:nvSpPr>
+          <p:cNvPr id="5" name="Title 1">
+            <a:extLst>
+              <a:ext uri="{FF2B5EF4-FFF2-40B4-BE49-F238E27FC236}">
+                <a16:creationId xmlns:a16="http://schemas.microsoft.com/office/drawing/2014/main" id="{76B4233A-9EA3-48B7-B1AF-52F51AB3D4BA}"/>
+              </a:ext>
+            </a:extLst>
+          </p:cNvPr>
+          <p:cNvSpPr txBox="1">
+            <a:spLocks/>
+          </p:cNvSpPr>
+          <p:nvPr/>
+        </p:nvSpPr>
+        <p:spPr>
+          <a:xfrm>
+            <a:off x="9560689" y="5462184"/>
+            <a:ext cx="2540643" cy="1325563"/>
+          </a:xfrm>
+          <a:prstGeom prst="rect">
+            <a:avLst/>
+          </a:prstGeom>
+        </p:spPr>
+        <p:txBody>
+          <a:bodyPr vert="horz" lIns="91440" tIns="45720" rIns="91440" bIns="45720" rtlCol="0" anchor="ctr">
+            <a:normAutofit/>
+          </a:bodyPr>
+          <a:lstStyle>
+            <a:lvl1pPr algn="l" defTabSz="914400" rtl="0" eaLnBrk="1" latinLnBrk="0" hangingPunct="1">
+              <a:lnSpc>
+                <a:spcPct val="90000"/>
+              </a:lnSpc>
+              <a:spcBef>
+                <a:spcPct val="0"/>
+              </a:spcBef>
+              <a:buNone/>
+              <a:defRPr sz="4400" kern="1200">
+                <a:solidFill>
+                  <a:schemeClr val="tx1"/>
+                </a:solidFill>
+                <a:latin typeface="+mj-lt"/>
+                <a:ea typeface="+mj-ea"/>
+                <a:cs typeface="+mj-cs"/>
+              </a:defRPr>
+            </a:lvl1pPr>
+          </a:lstStyle>
+          <a:p>
+            <a:r>
+              <a:rPr lang="en-GB" dirty="0"/>
+              <a:t>  </a:t>
+            </a:r>
+            <a:r>
+              <a:rPr lang="en-GB" dirty="0" err="1"/>
+              <a:t>Fragen</a:t>
+            </a:r>
+            <a:r>
+              <a:rPr lang="en-GB" dirty="0"/>
+              <a:t>?</a:t>
+            </a:r>
           </a:p>
         </p:txBody>
       </p:sp>
@@ -6271,8 +6350,8 @@
           </a:p>
         </p:txBody>
       </p:sp>
-      <mc:AlternateContent xmlns:mc="http://schemas.openxmlformats.org/markup-compatibility/2006">
-        <mc:Choice xmlns:a14="http://schemas.microsoft.com/office/drawing/2010/main" Requires="a14">
+      <mc:AlternateContent xmlns:mc="http://schemas.openxmlformats.org/markup-compatibility/2006" xmlns:a14="http://schemas.microsoft.com/office/drawing/2010/main">
+        <mc:Choice Requires="a14">
           <p:sp>
             <p:nvSpPr>
               <p:cNvPr id="3" name="Content Placeholder 2">
@@ -6421,7 +6500,7 @@
             </p:txBody>
           </p:sp>
         </mc:Choice>
-        <mc:Fallback>
+        <mc:Fallback xmlns="">
           <p:sp>
             <p:nvSpPr>
               <p:cNvPr id="3" name="Content Placeholder 2">
@@ -6552,8 +6631,8 @@
           </a:p>
         </p:txBody>
       </p:sp>
-      <mc:AlternateContent xmlns:mc="http://schemas.openxmlformats.org/markup-compatibility/2006">
-        <mc:Choice xmlns:a14="http://schemas.microsoft.com/office/drawing/2010/main" Requires="a14">
+      <mc:AlternateContent xmlns:mc="http://schemas.openxmlformats.org/markup-compatibility/2006" xmlns:a14="http://schemas.microsoft.com/office/drawing/2010/main">
+        <mc:Choice Requires="a14">
           <p:sp>
             <p:nvSpPr>
               <p:cNvPr id="3" name="Content Placeholder 2">
@@ -6721,7 +6800,7 @@
             </p:txBody>
           </p:sp>
         </mc:Choice>
-        <mc:Fallback>
+        <mc:Fallback xmlns="">
           <p:sp>
             <p:nvSpPr>
               <p:cNvPr id="3" name="Content Placeholder 2">
@@ -8027,8 +8106,8 @@
           </a:p>
         </p:txBody>
       </p:sp>
-      <mc:AlternateContent xmlns:mc="http://schemas.openxmlformats.org/markup-compatibility/2006">
-        <mc:Choice xmlns:a14="http://schemas.microsoft.com/office/drawing/2010/main" Requires="a14">
+      <mc:AlternateContent xmlns:mc="http://schemas.openxmlformats.org/markup-compatibility/2006" xmlns:a14="http://schemas.microsoft.com/office/drawing/2010/main">
+        <mc:Choice Requires="a14">
           <p:sp>
             <p:nvSpPr>
               <p:cNvPr id="3" name="Content Placeholder 2">
@@ -8170,7 +8249,7 @@
             </p:txBody>
           </p:sp>
         </mc:Choice>
-        <mc:Fallback>
+        <mc:Fallback xmlns="">
           <p:sp>
             <p:nvSpPr>
               <p:cNvPr id="3" name="Content Placeholder 2">
@@ -8297,107 +8376,166 @@
           </a:p>
         </p:txBody>
       </p:sp>
-      <p:sp>
-        <p:nvSpPr>
-          <p:cNvPr id="3" name="Content Placeholder 2">
-            <a:extLst>
-              <a:ext uri="{FF2B5EF4-FFF2-40B4-BE49-F238E27FC236}">
-                <a16:creationId xmlns:a16="http://schemas.microsoft.com/office/drawing/2014/main" id="{CAC024D7-8870-435E-A69E-38F6A4DCD8C2}"/>
-              </a:ext>
-            </a:extLst>
-          </p:cNvPr>
-          <p:cNvSpPr>
-            <a:spLocks noGrp="1"/>
-          </p:cNvSpPr>
-          <p:nvPr>
-            <p:ph idx="1"/>
-          </p:nvPr>
-        </p:nvSpPr>
-        <p:spPr/>
-        <p:txBody>
-          <a:bodyPr/>
-          <a:lstStyle/>
-          <a:p>
-            <a:r>
-              <a:rPr lang="en-GB" dirty="0" err="1"/>
-              <a:t>Versucht</a:t>
-            </a:r>
-            <a:r>
-              <a:rPr lang="en-GB" dirty="0"/>
-              <a:t>: </a:t>
-            </a:r>
-            <a:r>
-              <a:rPr lang="en-GB" dirty="0" err="1"/>
-              <a:t>Resultate</a:t>
-            </a:r>
-            <a:r>
-              <a:rPr lang="en-GB" dirty="0"/>
-              <a:t> </a:t>
-            </a:r>
-            <a:r>
-              <a:rPr lang="en-GB" dirty="0" err="1"/>
-              <a:t>wie</a:t>
-            </a:r>
-            <a:r>
-              <a:rPr lang="en-GB" dirty="0"/>
-              <a:t> </a:t>
-            </a:r>
-            <a:r>
-              <a:rPr lang="en-GB" dirty="0" err="1"/>
-              <a:t>bei</a:t>
-            </a:r>
-            <a:r>
-              <a:rPr lang="en-GB" dirty="0"/>
-              <a:t> LED-Matrix</a:t>
-            </a:r>
-          </a:p>
-          <a:p>
-            <a:endParaRPr lang="en-GB" dirty="0"/>
-          </a:p>
-          <a:p>
-            <a:endParaRPr lang="en-GB" dirty="0"/>
-          </a:p>
-          <a:p>
-            <a:r>
-              <a:rPr lang="en-GB" dirty="0"/>
-              <a:t>Certificate Pinning</a:t>
-            </a:r>
-          </a:p>
-          <a:p>
-            <a:pPr marL="457200" lvl="1" indent="0">
-              <a:buNone/>
-            </a:pPr>
-            <a:r>
-              <a:rPr lang="en-GB"/>
-              <a:t>SSL-Sniff</a:t>
-            </a:r>
-            <a:endParaRPr lang="en-GB" dirty="0"/>
-          </a:p>
-          <a:p>
-            <a:pPr lvl="1"/>
-            <a:r>
-              <a:rPr lang="en-GB" dirty="0" err="1"/>
-              <a:t>ähnlich</a:t>
-            </a:r>
-            <a:r>
-              <a:rPr lang="en-GB" dirty="0"/>
-              <a:t> </a:t>
-            </a:r>
-            <a:r>
-              <a:rPr lang="en-GB" dirty="0" err="1"/>
-              <a:t>auch</a:t>
-            </a:r>
-            <a:r>
-              <a:rPr lang="en-GB" dirty="0"/>
-              <a:t> auf ATWINC1500 </a:t>
-            </a:r>
-          </a:p>
-          <a:p>
-            <a:pPr lvl="1"/>
-            <a:endParaRPr lang="en-GB" dirty="0"/>
-          </a:p>
-        </p:txBody>
-      </p:sp>
+      <mc:AlternateContent xmlns:mc="http://schemas.openxmlformats.org/markup-compatibility/2006">
+        <mc:Choice xmlns:a14="http://schemas.microsoft.com/office/drawing/2010/main" Requires="a14">
+          <p:sp>
+            <p:nvSpPr>
+              <p:cNvPr id="3" name="Content Placeholder 2">
+                <a:extLst>
+                  <a:ext uri="{FF2B5EF4-FFF2-40B4-BE49-F238E27FC236}">
+                    <a16:creationId xmlns:a16="http://schemas.microsoft.com/office/drawing/2014/main" id="{CAC024D7-8870-435E-A69E-38F6A4DCD8C2}"/>
+                  </a:ext>
+                </a:extLst>
+              </p:cNvPr>
+              <p:cNvSpPr>
+                <a:spLocks noGrp="1"/>
+              </p:cNvSpPr>
+              <p:nvPr>
+                <p:ph idx="1"/>
+              </p:nvPr>
+            </p:nvSpPr>
+            <p:spPr/>
+            <p:txBody>
+              <a:bodyPr/>
+              <a:lstStyle/>
+              <a:p>
+                <a:pPr marL="0" indent="0">
+                  <a:buNone/>
+                </a:pPr>
+                <a14:m>
+                  <m:oMath xmlns:m="http://schemas.openxmlformats.org/officeDocument/2006/math">
+                    <m:r>
+                      <a:rPr lang="en-GB" b="1" i="1">
+                        <a:solidFill>
+                          <a:srgbClr val="FF0000"/>
+                        </a:solidFill>
+                        <a:latin typeface="Cambria Math" panose="02040503050406030204" pitchFamily="18" charset="0"/>
+                        <a:ea typeface="Cambria Math" panose="02040503050406030204" pitchFamily="18" charset="0"/>
+                      </a:rPr>
+                      <m:t>× </m:t>
+                    </m:r>
+                  </m:oMath>
+                </a14:m>
+                <a:r>
+                  <a:rPr lang="en-GB" dirty="0" err="1"/>
+                  <a:t>Versucht</a:t>
+                </a:r>
+                <a:r>
+                  <a:rPr lang="en-GB" dirty="0"/>
+                  <a:t>: </a:t>
+                </a:r>
+                <a:r>
+                  <a:rPr lang="en-GB" dirty="0" err="1"/>
+                  <a:t>Resultate</a:t>
+                </a:r>
+                <a:r>
+                  <a:rPr lang="en-GB" dirty="0"/>
+                  <a:t> </a:t>
+                </a:r>
+                <a:r>
+                  <a:rPr lang="en-GB" dirty="0" err="1"/>
+                  <a:t>wie</a:t>
+                </a:r>
+                <a:r>
+                  <a:rPr lang="en-GB" dirty="0"/>
+                  <a:t> </a:t>
+                </a:r>
+                <a:r>
+                  <a:rPr lang="en-GB" dirty="0" err="1"/>
+                  <a:t>bei</a:t>
+                </a:r>
+                <a:r>
+                  <a:rPr lang="en-GB" dirty="0"/>
+                  <a:t> LED-Matrix</a:t>
+                </a:r>
+              </a:p>
+              <a:p>
+                <a:endParaRPr lang="en-GB" dirty="0"/>
+              </a:p>
+              <a:p>
+                <a:endParaRPr lang="en-GB" dirty="0"/>
+              </a:p>
+              <a:p>
+                <a:r>
+                  <a:rPr lang="en-GB" dirty="0"/>
+                  <a:t>Certificate Pinning</a:t>
+                </a:r>
+              </a:p>
+              <a:p>
+                <a:pPr marL="457200" lvl="1" indent="0">
+                  <a:buNone/>
+                </a:pPr>
+                <a:r>
+                  <a:rPr lang="en-GB" dirty="0"/>
+                  <a:t>SSL-Sniff</a:t>
+                </a:r>
+              </a:p>
+              <a:p>
+                <a:pPr lvl="1"/>
+                <a:r>
+                  <a:rPr lang="en-GB" dirty="0" err="1"/>
+                  <a:t>ähnlich</a:t>
+                </a:r>
+                <a:r>
+                  <a:rPr lang="en-GB" dirty="0"/>
+                  <a:t> </a:t>
+                </a:r>
+                <a:r>
+                  <a:rPr lang="en-GB" dirty="0" err="1"/>
+                  <a:t>auch</a:t>
+                </a:r>
+                <a:r>
+                  <a:rPr lang="en-GB" dirty="0"/>
+                  <a:t> auf ATWINC1500 </a:t>
+                </a:r>
+              </a:p>
+              <a:p>
+                <a:pPr lvl="1"/>
+                <a:endParaRPr lang="en-GB" dirty="0"/>
+              </a:p>
+            </p:txBody>
+          </p:sp>
+        </mc:Choice>
+        <mc:Fallback>
+          <p:sp>
+            <p:nvSpPr>
+              <p:cNvPr id="3" name="Content Placeholder 2">
+                <a:extLst>
+                  <a:ext uri="{FF2B5EF4-FFF2-40B4-BE49-F238E27FC236}">
+                    <a16:creationId xmlns:a16="http://schemas.microsoft.com/office/drawing/2014/main" id="{CAC024D7-8870-435E-A69E-38F6A4DCD8C2}"/>
+                  </a:ext>
+                </a:extLst>
+              </p:cNvPr>
+              <p:cNvSpPr>
+                <a:spLocks noGrp="1" noRot="1" noChangeAspect="1" noMove="1" noResize="1" noEditPoints="1" noAdjustHandles="1" noChangeArrowheads="1" noChangeShapeType="1" noTextEdit="1"/>
+              </p:cNvSpPr>
+              <p:nvPr>
+                <p:ph idx="1"/>
+              </p:nvPr>
+            </p:nvSpPr>
+            <p:spPr>
+              <a:blipFill>
+                <a:blip r:embed="rId2"/>
+                <a:stretch>
+                  <a:fillRect l="-1043" t="-2241"/>
+                </a:stretch>
+              </a:blipFill>
+            </p:spPr>
+            <p:txBody>
+              <a:bodyPr/>
+              <a:lstStyle/>
+              <a:p>
+                <a:r>
+                  <a:rPr lang="en-GB">
+                    <a:noFill/>
+                  </a:rPr>
+                  <a:t> </a:t>
+                </a:r>
+              </a:p>
+            </p:txBody>
+          </p:sp>
+        </mc:Fallback>
+      </mc:AlternateContent>
       <p:sp>
         <p:nvSpPr>
           <p:cNvPr id="4" name="Slide Number Placeholder 3">

</xml_diff>